<commit_message>
Add multigroup illustration figure
</commit_message>
<xml_diff>
--- a/Miscellaneous/Presentation1.pptx
+++ b/Miscellaneous/Presentation1.pptx
@@ -5,8 +5,8 @@
     <p:sldMasterId id="2147483648" r:id="rId1"/>
   </p:sldMasterIdLst>
   <p:sldIdLst>
-    <p:sldId id="256" r:id="rId2"/>
-    <p:sldId id="257" r:id="rId3"/>
+    <p:sldId id="257" r:id="rId2"/>
+    <p:sldId id="258" r:id="rId3"/>
   </p:sldIdLst>
   <p:sldSz cx="9144000" cy="6858000" type="screen4x3"/>
   <p:notesSz cx="6858000" cy="9144000"/>
@@ -289,7 +289,7 @@
           <a:p>
             <a:fld id="{1D5FC7BF-D5F9-4CD9-BD2A-D1C9342DD0BF}" type="datetimeFigureOut">
               <a:rPr lang="en-US" smtClean="0"/>
-              <a:t>10/3/2016</a:t>
+              <a:t>10/20/2016</a:t>
             </a:fld>
             <a:endParaRPr lang="en-US"/>
           </a:p>
@@ -459,7 +459,7 @@
           <a:p>
             <a:fld id="{1D5FC7BF-D5F9-4CD9-BD2A-D1C9342DD0BF}" type="datetimeFigureOut">
               <a:rPr lang="en-US" smtClean="0"/>
-              <a:t>10/3/2016</a:t>
+              <a:t>10/20/2016</a:t>
             </a:fld>
             <a:endParaRPr lang="en-US"/>
           </a:p>
@@ -639,7 +639,7 @@
           <a:p>
             <a:fld id="{1D5FC7BF-D5F9-4CD9-BD2A-D1C9342DD0BF}" type="datetimeFigureOut">
               <a:rPr lang="en-US" smtClean="0"/>
-              <a:t>10/3/2016</a:t>
+              <a:t>10/20/2016</a:t>
             </a:fld>
             <a:endParaRPr lang="en-US"/>
           </a:p>
@@ -809,7 +809,7 @@
           <a:p>
             <a:fld id="{1D5FC7BF-D5F9-4CD9-BD2A-D1C9342DD0BF}" type="datetimeFigureOut">
               <a:rPr lang="en-US" smtClean="0"/>
-              <a:t>10/3/2016</a:t>
+              <a:t>10/20/2016</a:t>
             </a:fld>
             <a:endParaRPr lang="en-US"/>
           </a:p>
@@ -1055,7 +1055,7 @@
           <a:p>
             <a:fld id="{1D5FC7BF-D5F9-4CD9-BD2A-D1C9342DD0BF}" type="datetimeFigureOut">
               <a:rPr lang="en-US" smtClean="0"/>
-              <a:t>10/3/2016</a:t>
+              <a:t>10/20/2016</a:t>
             </a:fld>
             <a:endParaRPr lang="en-US"/>
           </a:p>
@@ -1343,7 +1343,7 @@
           <a:p>
             <a:fld id="{1D5FC7BF-D5F9-4CD9-BD2A-D1C9342DD0BF}" type="datetimeFigureOut">
               <a:rPr lang="en-US" smtClean="0"/>
-              <a:t>10/3/2016</a:t>
+              <a:t>10/20/2016</a:t>
             </a:fld>
             <a:endParaRPr lang="en-US"/>
           </a:p>
@@ -1765,7 +1765,7 @@
           <a:p>
             <a:fld id="{1D5FC7BF-D5F9-4CD9-BD2A-D1C9342DD0BF}" type="datetimeFigureOut">
               <a:rPr lang="en-US" smtClean="0"/>
-              <a:t>10/3/2016</a:t>
+              <a:t>10/20/2016</a:t>
             </a:fld>
             <a:endParaRPr lang="en-US"/>
           </a:p>
@@ -1883,7 +1883,7 @@
           <a:p>
             <a:fld id="{1D5FC7BF-D5F9-4CD9-BD2A-D1C9342DD0BF}" type="datetimeFigureOut">
               <a:rPr lang="en-US" smtClean="0"/>
-              <a:t>10/3/2016</a:t>
+              <a:t>10/20/2016</a:t>
             </a:fld>
             <a:endParaRPr lang="en-US"/>
           </a:p>
@@ -1978,7 +1978,7 @@
           <a:p>
             <a:fld id="{1D5FC7BF-D5F9-4CD9-BD2A-D1C9342DD0BF}" type="datetimeFigureOut">
               <a:rPr lang="en-US" smtClean="0"/>
-              <a:t>10/3/2016</a:t>
+              <a:t>10/20/2016</a:t>
             </a:fld>
             <a:endParaRPr lang="en-US"/>
           </a:p>
@@ -2255,7 +2255,7 @@
           <a:p>
             <a:fld id="{1D5FC7BF-D5F9-4CD9-BD2A-D1C9342DD0BF}" type="datetimeFigureOut">
               <a:rPr lang="en-US" smtClean="0"/>
-              <a:t>10/3/2016</a:t>
+              <a:t>10/20/2016</a:t>
             </a:fld>
             <a:endParaRPr lang="en-US"/>
           </a:p>
@@ -2508,7 +2508,7 @@
           <a:p>
             <a:fld id="{1D5FC7BF-D5F9-4CD9-BD2A-D1C9342DD0BF}" type="datetimeFigureOut">
               <a:rPr lang="en-US" smtClean="0"/>
-              <a:t>10/3/2016</a:t>
+              <a:t>10/20/2016</a:t>
             </a:fld>
             <a:endParaRPr lang="en-US"/>
           </a:p>
@@ -2721,7 +2721,7 @@
           <a:p>
             <a:fld id="{1D5FC7BF-D5F9-4CD9-BD2A-D1C9342DD0BF}" type="datetimeFigureOut">
               <a:rPr lang="en-US" smtClean="0"/>
-              <a:t>10/3/2016</a:t>
+              <a:t>10/20/2016</a:t>
             </a:fld>
             <a:endParaRPr lang="en-US"/>
           </a:p>
@@ -3080,842 +3080,6 @@
 </file>
 
 <file path=ppt/slides/slide1.xml><?xml version="1.0" encoding="utf-8"?>
-<p:sld xmlns:a="http://schemas.openxmlformats.org/drawingml/2006/main" xmlns:r="http://schemas.openxmlformats.org/officeDocument/2006/relationships" xmlns:p="http://schemas.openxmlformats.org/presentationml/2006/main">
-  <p:cSld>
-    <p:spTree>
-      <p:nvGrpSpPr>
-        <p:cNvPr id="1" name=""/>
-        <p:cNvGrpSpPr/>
-        <p:nvPr/>
-      </p:nvGrpSpPr>
-      <p:grpSpPr>
-        <a:xfrm>
-          <a:off x="0" y="0"/>
-          <a:ext cx="0" cy="0"/>
-          <a:chOff x="0" y="0"/>
-          <a:chExt cx="0" cy="0"/>
-        </a:xfrm>
-      </p:grpSpPr>
-      <p:grpSp>
-        <p:nvGrpSpPr>
-          <p:cNvPr id="30" name="Group 29"/>
-          <p:cNvGrpSpPr/>
-          <p:nvPr/>
-        </p:nvGrpSpPr>
-        <p:grpSpPr>
-          <a:xfrm>
-            <a:off x="1731034" y="1200903"/>
-            <a:ext cx="5660366" cy="4358514"/>
-            <a:chOff x="1731034" y="1200903"/>
-            <a:chExt cx="5660366" cy="4358514"/>
-          </a:xfrm>
-        </p:grpSpPr>
-        <p:grpSp>
-          <p:nvGrpSpPr>
-            <p:cNvPr id="29" name="Group 28"/>
-            <p:cNvGrpSpPr/>
-            <p:nvPr/>
-          </p:nvGrpSpPr>
-          <p:grpSpPr>
-            <a:xfrm>
-              <a:off x="1731034" y="1200903"/>
-              <a:ext cx="3352800" cy="4358514"/>
-              <a:chOff x="1731034" y="1200903"/>
-              <a:chExt cx="3352800" cy="4358514"/>
-            </a:xfrm>
-          </p:grpSpPr>
-          <p:sp>
-            <p:nvSpPr>
-              <p:cNvPr id="4" name="Rectangle 3"/>
-              <p:cNvSpPr/>
-              <p:nvPr/>
-            </p:nvSpPr>
-            <p:spPr>
-              <a:xfrm>
-                <a:off x="1731034" y="1200903"/>
-                <a:ext cx="3352800" cy="4345255"/>
-              </a:xfrm>
-              <a:prstGeom prst="rect">
-                <a:avLst/>
-              </a:prstGeom>
-              <a:noFill/>
-              <a:ln>
-                <a:solidFill>
-                  <a:schemeClr val="tx1"/>
-                </a:solidFill>
-              </a:ln>
-            </p:spPr>
-            <p:style>
-              <a:lnRef idx="2">
-                <a:schemeClr val="accent1">
-                  <a:shade val="50000"/>
-                </a:schemeClr>
-              </a:lnRef>
-              <a:fillRef idx="1">
-                <a:schemeClr val="accent1"/>
-              </a:fillRef>
-              <a:effectRef idx="0">
-                <a:schemeClr val="accent1"/>
-              </a:effectRef>
-              <a:fontRef idx="minor">
-                <a:schemeClr val="lt1"/>
-              </a:fontRef>
-            </p:style>
-            <p:txBody>
-              <a:bodyPr rtlCol="0" anchor="ctr"/>
-              <a:lstStyle/>
-              <a:p>
-                <a:pPr algn="ctr"/>
-                <a:endParaRPr lang="en-US"/>
-              </a:p>
-            </p:txBody>
-          </p:sp>
-          <p:sp>
-            <p:nvSpPr>
-              <p:cNvPr id="5" name="Rectangle 4"/>
-              <p:cNvSpPr/>
-              <p:nvPr/>
-            </p:nvSpPr>
-            <p:spPr>
-              <a:xfrm>
-                <a:off x="2553419" y="1200903"/>
-                <a:ext cx="1771291" cy="2172627"/>
-              </a:xfrm>
-              <a:prstGeom prst="rect">
-                <a:avLst/>
-              </a:prstGeom>
-              <a:noFill/>
-            </p:spPr>
-            <p:style>
-              <a:lnRef idx="2">
-                <a:schemeClr val="accent1">
-                  <a:shade val="50000"/>
-                </a:schemeClr>
-              </a:lnRef>
-              <a:fillRef idx="1">
-                <a:schemeClr val="accent1"/>
-              </a:fillRef>
-              <a:effectRef idx="0">
-                <a:schemeClr val="accent1"/>
-              </a:effectRef>
-              <a:fontRef idx="minor">
-                <a:schemeClr val="lt1"/>
-              </a:fontRef>
-            </p:style>
-            <p:txBody>
-              <a:bodyPr rtlCol="0" anchor="ctr"/>
-              <a:lstStyle/>
-              <a:p>
-                <a:pPr algn="ctr"/>
-                <a:endParaRPr lang="en-US"/>
-              </a:p>
-            </p:txBody>
-          </p:sp>
-          <p:cxnSp>
-            <p:nvCxnSpPr>
-              <p:cNvPr id="7" name="Straight Connector 6"/>
-              <p:cNvCxnSpPr/>
-              <p:nvPr/>
-            </p:nvCxnSpPr>
-            <p:spPr>
-              <a:xfrm>
-                <a:off x="1731034" y="3386790"/>
-                <a:ext cx="3352800" cy="0"/>
-              </a:xfrm>
-              <a:prstGeom prst="line">
-                <a:avLst/>
-              </a:prstGeom>
-              <a:ln>
-                <a:solidFill>
-                  <a:schemeClr val="tx1"/>
-                </a:solidFill>
-                <a:prstDash val="dash"/>
-              </a:ln>
-            </p:spPr>
-            <p:style>
-              <a:lnRef idx="1">
-                <a:schemeClr val="accent1"/>
-              </a:lnRef>
-              <a:fillRef idx="0">
-                <a:schemeClr val="accent1"/>
-              </a:fillRef>
-              <a:effectRef idx="0">
-                <a:schemeClr val="accent1"/>
-              </a:effectRef>
-              <a:fontRef idx="minor">
-                <a:schemeClr val="tx1"/>
-              </a:fontRef>
-            </p:style>
-          </p:cxnSp>
-          <p:cxnSp>
-            <p:nvCxnSpPr>
-              <p:cNvPr id="8" name="Straight Connector 7"/>
-              <p:cNvCxnSpPr/>
-              <p:nvPr/>
-            </p:nvCxnSpPr>
-            <p:spPr>
-              <a:xfrm>
-                <a:off x="1731034" y="4142306"/>
-                <a:ext cx="3352800" cy="0"/>
-              </a:xfrm>
-              <a:prstGeom prst="line">
-                <a:avLst/>
-              </a:prstGeom>
-              <a:ln>
-                <a:solidFill>
-                  <a:schemeClr val="tx1"/>
-                </a:solidFill>
-                <a:prstDash val="dash"/>
-              </a:ln>
-            </p:spPr>
-            <p:style>
-              <a:lnRef idx="1">
-                <a:schemeClr val="accent1"/>
-              </a:lnRef>
-              <a:fillRef idx="0">
-                <a:schemeClr val="accent1"/>
-              </a:fillRef>
-              <a:effectRef idx="0">
-                <a:schemeClr val="accent1"/>
-              </a:effectRef>
-              <a:fontRef idx="minor">
-                <a:schemeClr val="tx1"/>
-              </a:fontRef>
-            </p:style>
-          </p:cxnSp>
-          <p:cxnSp>
-            <p:nvCxnSpPr>
-              <p:cNvPr id="9" name="Straight Connector 8"/>
-              <p:cNvCxnSpPr/>
-              <p:nvPr/>
-            </p:nvCxnSpPr>
-            <p:spPr>
-              <a:xfrm>
-                <a:off x="1731034" y="4810807"/>
-                <a:ext cx="3352800" cy="0"/>
-              </a:xfrm>
-              <a:prstGeom prst="line">
-                <a:avLst/>
-              </a:prstGeom>
-              <a:ln>
-                <a:solidFill>
-                  <a:schemeClr val="tx1"/>
-                </a:solidFill>
-                <a:prstDash val="dash"/>
-              </a:ln>
-            </p:spPr>
-            <p:style>
-              <a:lnRef idx="1">
-                <a:schemeClr val="accent1"/>
-              </a:lnRef>
-              <a:fillRef idx="0">
-                <a:schemeClr val="accent1"/>
-              </a:fillRef>
-              <a:effectRef idx="0">
-                <a:schemeClr val="accent1"/>
-              </a:effectRef>
-              <a:fontRef idx="minor">
-                <a:schemeClr val="tx1"/>
-              </a:fontRef>
-            </p:style>
-          </p:cxnSp>
-          <p:cxnSp>
-            <p:nvCxnSpPr>
-              <p:cNvPr id="10" name="Straight Connector 9"/>
-              <p:cNvCxnSpPr/>
-              <p:nvPr/>
-            </p:nvCxnSpPr>
-            <p:spPr>
-              <a:xfrm>
-                <a:off x="1731034" y="2671605"/>
-                <a:ext cx="3352800" cy="0"/>
-              </a:xfrm>
-              <a:prstGeom prst="line">
-                <a:avLst/>
-              </a:prstGeom>
-              <a:ln>
-                <a:solidFill>
-                  <a:schemeClr val="tx1"/>
-                </a:solidFill>
-                <a:prstDash val="dash"/>
-              </a:ln>
-            </p:spPr>
-            <p:style>
-              <a:lnRef idx="1">
-                <a:schemeClr val="accent1"/>
-              </a:lnRef>
-              <a:fillRef idx="0">
-                <a:schemeClr val="accent1"/>
-              </a:fillRef>
-              <a:effectRef idx="0">
-                <a:schemeClr val="accent1"/>
-              </a:effectRef>
-              <a:fontRef idx="minor">
-                <a:schemeClr val="tx1"/>
-              </a:fontRef>
-            </p:style>
-          </p:cxnSp>
-          <p:cxnSp>
-            <p:nvCxnSpPr>
-              <p:cNvPr id="11" name="Straight Connector 10"/>
-              <p:cNvCxnSpPr/>
-              <p:nvPr/>
-            </p:nvCxnSpPr>
-            <p:spPr>
-              <a:xfrm>
-                <a:off x="1731034" y="1869404"/>
-                <a:ext cx="3352800" cy="0"/>
-              </a:xfrm>
-              <a:prstGeom prst="line">
-                <a:avLst/>
-              </a:prstGeom>
-              <a:ln>
-                <a:solidFill>
-                  <a:schemeClr val="tx1"/>
-                </a:solidFill>
-                <a:prstDash val="dash"/>
-              </a:ln>
-            </p:spPr>
-            <p:style>
-              <a:lnRef idx="1">
-                <a:schemeClr val="accent1"/>
-              </a:lnRef>
-              <a:fillRef idx="0">
-                <a:schemeClr val="accent1"/>
-              </a:fillRef>
-              <a:effectRef idx="0">
-                <a:schemeClr val="accent1"/>
-              </a:effectRef>
-              <a:fontRef idx="minor">
-                <a:schemeClr val="tx1"/>
-              </a:fontRef>
-            </p:style>
-          </p:cxnSp>
-          <p:cxnSp>
-            <p:nvCxnSpPr>
-              <p:cNvPr id="12" name="Straight Connector 11"/>
-              <p:cNvCxnSpPr/>
-              <p:nvPr/>
-            </p:nvCxnSpPr>
-            <p:spPr>
-              <a:xfrm>
-                <a:off x="3059502" y="1200903"/>
-                <a:ext cx="0" cy="4345255"/>
-              </a:xfrm>
-              <a:prstGeom prst="line">
-                <a:avLst/>
-              </a:prstGeom>
-              <a:ln>
-                <a:solidFill>
-                  <a:schemeClr val="tx1"/>
-                </a:solidFill>
-                <a:prstDash val="dash"/>
-              </a:ln>
-            </p:spPr>
-            <p:style>
-              <a:lnRef idx="1">
-                <a:schemeClr val="accent1"/>
-              </a:lnRef>
-              <a:fillRef idx="0">
-                <a:schemeClr val="accent1"/>
-              </a:fillRef>
-              <a:effectRef idx="0">
-                <a:schemeClr val="accent1"/>
-              </a:effectRef>
-              <a:fontRef idx="minor">
-                <a:schemeClr val="tx1"/>
-              </a:fontRef>
-            </p:style>
-          </p:cxnSp>
-          <p:cxnSp>
-            <p:nvCxnSpPr>
-              <p:cNvPr id="15" name="Straight Connector 14"/>
-              <p:cNvCxnSpPr/>
-              <p:nvPr/>
-            </p:nvCxnSpPr>
-            <p:spPr>
-              <a:xfrm>
-                <a:off x="3818626" y="1200903"/>
-                <a:ext cx="0" cy="4345255"/>
-              </a:xfrm>
-              <a:prstGeom prst="line">
-                <a:avLst/>
-              </a:prstGeom>
-              <a:ln>
-                <a:solidFill>
-                  <a:schemeClr val="tx1"/>
-                </a:solidFill>
-                <a:prstDash val="dash"/>
-              </a:ln>
-            </p:spPr>
-            <p:style>
-              <a:lnRef idx="1">
-                <a:schemeClr val="accent1"/>
-              </a:lnRef>
-              <a:fillRef idx="0">
-                <a:schemeClr val="accent1"/>
-              </a:fillRef>
-              <a:effectRef idx="0">
-                <a:schemeClr val="accent1"/>
-              </a:effectRef>
-              <a:fontRef idx="minor">
-                <a:schemeClr val="tx1"/>
-              </a:fontRef>
-            </p:style>
-          </p:cxnSp>
-          <p:cxnSp>
-            <p:nvCxnSpPr>
-              <p:cNvPr id="16" name="Straight Connector 15"/>
-              <p:cNvCxnSpPr/>
-              <p:nvPr/>
-            </p:nvCxnSpPr>
-            <p:spPr>
-              <a:xfrm>
-                <a:off x="2806460" y="1214162"/>
-                <a:ext cx="0" cy="4345255"/>
-              </a:xfrm>
-              <a:prstGeom prst="line">
-                <a:avLst/>
-              </a:prstGeom>
-              <a:ln>
-                <a:solidFill>
-                  <a:schemeClr val="tx1"/>
-                </a:solidFill>
-                <a:prstDash val="dash"/>
-              </a:ln>
-            </p:spPr>
-            <p:style>
-              <a:lnRef idx="1">
-                <a:schemeClr val="accent1"/>
-              </a:lnRef>
-              <a:fillRef idx="0">
-                <a:schemeClr val="accent1"/>
-              </a:fillRef>
-              <a:effectRef idx="0">
-                <a:schemeClr val="accent1"/>
-              </a:effectRef>
-              <a:fontRef idx="minor">
-                <a:schemeClr val="tx1"/>
-              </a:fontRef>
-            </p:style>
-          </p:cxnSp>
-          <p:cxnSp>
-            <p:nvCxnSpPr>
-              <p:cNvPr id="17" name="Straight Connector 16"/>
-              <p:cNvCxnSpPr/>
-              <p:nvPr/>
-            </p:nvCxnSpPr>
-            <p:spPr>
-              <a:xfrm>
-                <a:off x="4071668" y="1214162"/>
-                <a:ext cx="0" cy="4345255"/>
-              </a:xfrm>
-              <a:prstGeom prst="line">
-                <a:avLst/>
-              </a:prstGeom>
-              <a:ln>
-                <a:solidFill>
-                  <a:schemeClr val="tx1"/>
-                </a:solidFill>
-                <a:prstDash val="dash"/>
-              </a:ln>
-            </p:spPr>
-            <p:style>
-              <a:lnRef idx="1">
-                <a:schemeClr val="accent1"/>
-              </a:lnRef>
-              <a:fillRef idx="0">
-                <a:schemeClr val="accent1"/>
-              </a:fillRef>
-              <a:effectRef idx="0">
-                <a:schemeClr val="accent1"/>
-              </a:effectRef>
-              <a:fontRef idx="minor">
-                <a:schemeClr val="tx1"/>
-              </a:fontRef>
-            </p:style>
-          </p:cxnSp>
-          <p:cxnSp>
-            <p:nvCxnSpPr>
-              <p:cNvPr id="18" name="Straight Connector 17"/>
-              <p:cNvCxnSpPr/>
-              <p:nvPr/>
-            </p:nvCxnSpPr>
-            <p:spPr>
-              <a:xfrm>
-                <a:off x="3312543" y="1214162"/>
-                <a:ext cx="0" cy="4345255"/>
-              </a:xfrm>
-              <a:prstGeom prst="line">
-                <a:avLst/>
-              </a:prstGeom>
-              <a:ln>
-                <a:solidFill>
-                  <a:schemeClr val="tx1"/>
-                </a:solidFill>
-                <a:prstDash val="dash"/>
-              </a:ln>
-            </p:spPr>
-            <p:style>
-              <a:lnRef idx="1">
-                <a:schemeClr val="accent1"/>
-              </a:lnRef>
-              <a:fillRef idx="0">
-                <a:schemeClr val="accent1"/>
-              </a:fillRef>
-              <a:effectRef idx="0">
-                <a:schemeClr val="accent1"/>
-              </a:effectRef>
-              <a:fontRef idx="minor">
-                <a:schemeClr val="tx1"/>
-              </a:fontRef>
-            </p:style>
-          </p:cxnSp>
-          <p:cxnSp>
-            <p:nvCxnSpPr>
-              <p:cNvPr id="19" name="Straight Connector 18"/>
-              <p:cNvCxnSpPr/>
-              <p:nvPr/>
-            </p:nvCxnSpPr>
-            <p:spPr>
-              <a:xfrm>
-                <a:off x="3565585" y="1214162"/>
-                <a:ext cx="0" cy="4345255"/>
-              </a:xfrm>
-              <a:prstGeom prst="line">
-                <a:avLst/>
-              </a:prstGeom>
-              <a:ln>
-                <a:solidFill>
-                  <a:schemeClr val="tx1"/>
-                </a:solidFill>
-                <a:prstDash val="dash"/>
-              </a:ln>
-            </p:spPr>
-            <p:style>
-              <a:lnRef idx="1">
-                <a:schemeClr val="accent1"/>
-              </a:lnRef>
-              <a:fillRef idx="0">
-                <a:schemeClr val="accent1"/>
-              </a:fillRef>
-              <a:effectRef idx="0">
-                <a:schemeClr val="accent1"/>
-              </a:effectRef>
-              <a:fontRef idx="minor">
-                <a:schemeClr val="tx1"/>
-              </a:fontRef>
-            </p:style>
-          </p:cxnSp>
-          <p:cxnSp>
-            <p:nvCxnSpPr>
-              <p:cNvPr id="20" name="Straight Connector 19"/>
-              <p:cNvCxnSpPr/>
-              <p:nvPr/>
-            </p:nvCxnSpPr>
-            <p:spPr>
-              <a:xfrm>
-                <a:off x="2544009" y="1214162"/>
-                <a:ext cx="0" cy="4345255"/>
-              </a:xfrm>
-              <a:prstGeom prst="line">
-                <a:avLst/>
-              </a:prstGeom>
-              <a:ln>
-                <a:solidFill>
-                  <a:schemeClr val="tx1"/>
-                </a:solidFill>
-                <a:prstDash val="dash"/>
-              </a:ln>
-            </p:spPr>
-            <p:style>
-              <a:lnRef idx="1">
-                <a:schemeClr val="accent1"/>
-              </a:lnRef>
-              <a:fillRef idx="0">
-                <a:schemeClr val="accent1"/>
-              </a:fillRef>
-              <a:effectRef idx="0">
-                <a:schemeClr val="accent1"/>
-              </a:effectRef>
-              <a:fontRef idx="minor">
-                <a:schemeClr val="tx1"/>
-              </a:fontRef>
-            </p:style>
-          </p:cxnSp>
-          <p:cxnSp>
-            <p:nvCxnSpPr>
-              <p:cNvPr id="21" name="Straight Connector 20"/>
-              <p:cNvCxnSpPr/>
-              <p:nvPr/>
-            </p:nvCxnSpPr>
-            <p:spPr>
-              <a:xfrm>
-                <a:off x="4334120" y="1200903"/>
-                <a:ext cx="0" cy="4345255"/>
-              </a:xfrm>
-              <a:prstGeom prst="line">
-                <a:avLst/>
-              </a:prstGeom>
-              <a:ln>
-                <a:solidFill>
-                  <a:schemeClr val="tx1"/>
-                </a:solidFill>
-                <a:prstDash val="dash"/>
-              </a:ln>
-            </p:spPr>
-            <p:style>
-              <a:lnRef idx="1">
-                <a:schemeClr val="accent1"/>
-              </a:lnRef>
-              <a:fillRef idx="0">
-                <a:schemeClr val="accent1"/>
-              </a:fillRef>
-              <a:effectRef idx="0">
-                <a:schemeClr val="accent1"/>
-              </a:effectRef>
-              <a:fontRef idx="minor">
-                <a:schemeClr val="tx1"/>
-              </a:fontRef>
-            </p:style>
-          </p:cxnSp>
-          <p:cxnSp>
-            <p:nvCxnSpPr>
-              <p:cNvPr id="22" name="Straight Connector 21"/>
-              <p:cNvCxnSpPr/>
-              <p:nvPr/>
-            </p:nvCxnSpPr>
-            <p:spPr>
-              <a:xfrm>
-                <a:off x="2173857" y="1200903"/>
-                <a:ext cx="0" cy="4345255"/>
-              </a:xfrm>
-              <a:prstGeom prst="line">
-                <a:avLst/>
-              </a:prstGeom>
-              <a:ln>
-                <a:solidFill>
-                  <a:schemeClr val="tx1"/>
-                </a:solidFill>
-                <a:prstDash val="dash"/>
-              </a:ln>
-            </p:spPr>
-            <p:style>
-              <a:lnRef idx="1">
-                <a:schemeClr val="accent1"/>
-              </a:lnRef>
-              <a:fillRef idx="0">
-                <a:schemeClr val="accent1"/>
-              </a:fillRef>
-              <a:effectRef idx="0">
-                <a:schemeClr val="accent1"/>
-              </a:effectRef>
-              <a:fontRef idx="minor">
-                <a:schemeClr val="tx1"/>
-              </a:fontRef>
-            </p:style>
-          </p:cxnSp>
-          <p:cxnSp>
-            <p:nvCxnSpPr>
-              <p:cNvPr id="23" name="Straight Connector 22"/>
-              <p:cNvCxnSpPr/>
-              <p:nvPr/>
-            </p:nvCxnSpPr>
-            <p:spPr>
-              <a:xfrm>
-                <a:off x="4694172" y="1200903"/>
-                <a:ext cx="0" cy="4345255"/>
-              </a:xfrm>
-              <a:prstGeom prst="line">
-                <a:avLst/>
-              </a:prstGeom>
-              <a:ln>
-                <a:solidFill>
-                  <a:schemeClr val="tx1"/>
-                </a:solidFill>
-                <a:prstDash val="dash"/>
-              </a:ln>
-            </p:spPr>
-            <p:style>
-              <a:lnRef idx="1">
-                <a:schemeClr val="accent1"/>
-              </a:lnRef>
-              <a:fillRef idx="0">
-                <a:schemeClr val="accent1"/>
-              </a:fillRef>
-              <a:effectRef idx="0">
-                <a:schemeClr val="accent1"/>
-              </a:effectRef>
-              <a:fontRef idx="minor">
-                <a:schemeClr val="tx1"/>
-              </a:fontRef>
-            </p:style>
-          </p:cxnSp>
-        </p:grpSp>
-        <p:sp>
-          <p:nvSpPr>
-            <p:cNvPr id="25" name="Right Brace 24"/>
-            <p:cNvSpPr/>
-            <p:nvPr/>
-          </p:nvSpPr>
-          <p:spPr>
-            <a:xfrm>
-              <a:off x="5181600" y="1200903"/>
-              <a:ext cx="304800" cy="2157138"/>
-            </a:xfrm>
-            <a:prstGeom prst="rightBrace">
-              <a:avLst/>
-            </a:prstGeom>
-            <a:ln w="19050">
-              <a:solidFill>
-                <a:schemeClr val="tx1"/>
-              </a:solidFill>
-            </a:ln>
-          </p:spPr>
-          <p:style>
-            <a:lnRef idx="1">
-              <a:schemeClr val="accent1"/>
-            </a:lnRef>
-            <a:fillRef idx="0">
-              <a:schemeClr val="accent1"/>
-            </a:fillRef>
-            <a:effectRef idx="0">
-              <a:schemeClr val="accent1"/>
-            </a:effectRef>
-            <a:fontRef idx="minor">
-              <a:schemeClr val="tx1"/>
-            </a:fontRef>
-          </p:style>
-          <p:txBody>
-            <a:bodyPr rtlCol="0" anchor="ctr"/>
-            <a:lstStyle/>
-            <a:p>
-              <a:pPr algn="ctr"/>
-              <a:endParaRPr lang="en-US"/>
-            </a:p>
-          </p:txBody>
-        </p:sp>
-        <p:sp>
-          <p:nvSpPr>
-            <p:cNvPr id="26" name="Right Brace 25"/>
-            <p:cNvSpPr/>
-            <p:nvPr/>
-          </p:nvSpPr>
-          <p:spPr>
-            <a:xfrm>
-              <a:off x="5182230" y="3386790"/>
-              <a:ext cx="304800" cy="2157137"/>
-            </a:xfrm>
-            <a:prstGeom prst="rightBrace">
-              <a:avLst>
-                <a:gd name="adj1" fmla="val 30647"/>
-                <a:gd name="adj2" fmla="val 50000"/>
-              </a:avLst>
-            </a:prstGeom>
-            <a:ln w="19050">
-              <a:solidFill>
-                <a:schemeClr val="tx1"/>
-              </a:solidFill>
-            </a:ln>
-          </p:spPr>
-          <p:style>
-            <a:lnRef idx="1">
-              <a:schemeClr val="accent1"/>
-            </a:lnRef>
-            <a:fillRef idx="0">
-              <a:schemeClr val="accent1"/>
-            </a:fillRef>
-            <a:effectRef idx="0">
-              <a:schemeClr val="accent1"/>
-            </a:effectRef>
-            <a:fontRef idx="minor">
-              <a:schemeClr val="tx1"/>
-            </a:fontRef>
-          </p:style>
-          <p:txBody>
-            <a:bodyPr rtlCol="0" anchor="ctr"/>
-            <a:lstStyle/>
-            <a:p>
-              <a:pPr algn="ctr"/>
-              <a:endParaRPr lang="en-US"/>
-            </a:p>
-          </p:txBody>
-        </p:sp>
-        <p:sp>
-          <p:nvSpPr>
-            <p:cNvPr id="27" name="TextBox 26"/>
-            <p:cNvSpPr txBox="1"/>
-            <p:nvPr/>
-          </p:nvSpPr>
-          <p:spPr>
-            <a:xfrm>
-              <a:off x="5562600" y="2094806"/>
-              <a:ext cx="1828800" cy="369332"/>
-            </a:xfrm>
-            <a:prstGeom prst="rect">
-              <a:avLst/>
-            </a:prstGeom>
-            <a:noFill/>
-          </p:spPr>
-          <p:txBody>
-            <a:bodyPr wrap="square" rtlCol="0">
-              <a:spAutoFit/>
-            </a:bodyPr>
-            <a:lstStyle/>
-            <a:p>
-              <a:r>
-                <a:rPr lang="en-US" dirty="0" smtClean="0"/>
-                <a:t>Rodded CP</a:t>
-              </a:r>
-              <a:endParaRPr lang="en-US" dirty="0"/>
-            </a:p>
-          </p:txBody>
-        </p:sp>
-        <p:sp>
-          <p:nvSpPr>
-            <p:cNvPr id="28" name="TextBox 27"/>
-            <p:cNvSpPr txBox="1"/>
-            <p:nvPr/>
-          </p:nvSpPr>
-          <p:spPr>
-            <a:xfrm>
-              <a:off x="5562600" y="4280692"/>
-              <a:ext cx="1828800" cy="369332"/>
-            </a:xfrm>
-            <a:prstGeom prst="rect">
-              <a:avLst/>
-            </a:prstGeom>
-            <a:noFill/>
-          </p:spPr>
-          <p:txBody>
-            <a:bodyPr wrap="square" rtlCol="0">
-              <a:spAutoFit/>
-            </a:bodyPr>
-            <a:lstStyle/>
-            <a:p>
-              <a:r>
-                <a:rPr lang="en-US" dirty="0" smtClean="0"/>
-                <a:t>Unrodded CP</a:t>
-              </a:r>
-              <a:endParaRPr lang="en-US" dirty="0"/>
-            </a:p>
-          </p:txBody>
-        </p:sp>
-      </p:grpSp>
-    </p:spTree>
-    <p:extLst>
-      <p:ext uri="{BB962C8B-B14F-4D97-AF65-F5344CB8AC3E}">
-        <p14:creationId xmlns:p14="http://schemas.microsoft.com/office/powerpoint/2010/main" val="2322801346"/>
-      </p:ext>
-    </p:extLst>
-  </p:cSld>
-  <p:clrMapOvr>
-    <a:masterClrMapping/>
-  </p:clrMapOvr>
-</p:sld>
-</file>
-
-<file path=ppt/slides/slide2.xml><?xml version="1.0" encoding="utf-8"?>
 <p:sld xmlns:a="http://schemas.openxmlformats.org/drawingml/2006/main" xmlns:r="http://schemas.openxmlformats.org/officeDocument/2006/relationships" xmlns:p="http://schemas.openxmlformats.org/presentationml/2006/main">
   <p:cSld>
     <p:spTree>
@@ -6061,6 +5225,1206 @@
 </p:sld>
 </file>
 
+<file path=ppt/slides/slide2.xml><?xml version="1.0" encoding="utf-8"?>
+<p:sld xmlns:a="http://schemas.openxmlformats.org/drawingml/2006/main" xmlns:r="http://schemas.openxmlformats.org/officeDocument/2006/relationships" xmlns:p="http://schemas.openxmlformats.org/presentationml/2006/main">
+  <p:cSld>
+    <p:spTree>
+      <p:nvGrpSpPr>
+        <p:cNvPr id="1" name=""/>
+        <p:cNvGrpSpPr/>
+        <p:nvPr/>
+      </p:nvGrpSpPr>
+      <p:grpSpPr>
+        <a:xfrm>
+          <a:off x="0" y="0"/>
+          <a:ext cx="0" cy="0"/>
+          <a:chOff x="0" y="0"/>
+          <a:chExt cx="0" cy="0"/>
+        </a:xfrm>
+      </p:grpSpPr>
+      <p:grpSp>
+        <p:nvGrpSpPr>
+          <p:cNvPr id="32" name="Group 31"/>
+          <p:cNvGrpSpPr/>
+          <p:nvPr/>
+        </p:nvGrpSpPr>
+        <p:grpSpPr>
+          <a:xfrm>
+            <a:off x="1085850" y="1682698"/>
+            <a:ext cx="5962650" cy="1099232"/>
+            <a:chOff x="1085850" y="1682698"/>
+            <a:chExt cx="5962650" cy="1099232"/>
+          </a:xfrm>
+        </p:grpSpPr>
+        <p:cxnSp>
+          <p:nvCxnSpPr>
+            <p:cNvPr id="5" name="Straight Connector 4"/>
+            <p:cNvCxnSpPr/>
+            <p:nvPr/>
+          </p:nvCxnSpPr>
+          <p:spPr>
+            <a:xfrm>
+              <a:off x="1295400" y="2667000"/>
+              <a:ext cx="5486400" cy="0"/>
+            </a:xfrm>
+            <a:prstGeom prst="line">
+              <a:avLst/>
+            </a:prstGeom>
+            <a:ln w="28575">
+              <a:solidFill>
+                <a:schemeClr val="tx1"/>
+              </a:solidFill>
+            </a:ln>
+          </p:spPr>
+          <p:style>
+            <a:lnRef idx="1">
+              <a:schemeClr val="accent1"/>
+            </a:lnRef>
+            <a:fillRef idx="0">
+              <a:schemeClr val="accent1"/>
+            </a:fillRef>
+            <a:effectRef idx="0">
+              <a:schemeClr val="accent1"/>
+            </a:effectRef>
+            <a:fontRef idx="minor">
+              <a:schemeClr val="tx1"/>
+            </a:fontRef>
+          </p:style>
+        </p:cxnSp>
+        <p:cxnSp>
+          <p:nvCxnSpPr>
+            <p:cNvPr id="8" name="Straight Connector 7"/>
+            <p:cNvCxnSpPr/>
+            <p:nvPr/>
+          </p:nvCxnSpPr>
+          <p:spPr>
+            <a:xfrm>
+              <a:off x="1295400" y="2552700"/>
+              <a:ext cx="0" cy="228600"/>
+            </a:xfrm>
+            <a:prstGeom prst="line">
+              <a:avLst/>
+            </a:prstGeom>
+            <a:ln w="28575">
+              <a:solidFill>
+                <a:schemeClr val="tx1"/>
+              </a:solidFill>
+            </a:ln>
+          </p:spPr>
+          <p:style>
+            <a:lnRef idx="1">
+              <a:schemeClr val="accent1"/>
+            </a:lnRef>
+            <a:fillRef idx="0">
+              <a:schemeClr val="accent1"/>
+            </a:fillRef>
+            <a:effectRef idx="0">
+              <a:schemeClr val="accent1"/>
+            </a:effectRef>
+            <a:fontRef idx="minor">
+              <a:schemeClr val="tx1"/>
+            </a:fontRef>
+          </p:style>
+        </p:cxnSp>
+        <p:cxnSp>
+          <p:nvCxnSpPr>
+            <p:cNvPr id="9" name="Straight Connector 8"/>
+            <p:cNvCxnSpPr/>
+            <p:nvPr/>
+          </p:nvCxnSpPr>
+          <p:spPr>
+            <a:xfrm>
+              <a:off x="2362200" y="2552700"/>
+              <a:ext cx="0" cy="228600"/>
+            </a:xfrm>
+            <a:prstGeom prst="line">
+              <a:avLst/>
+            </a:prstGeom>
+            <a:ln w="28575">
+              <a:solidFill>
+                <a:schemeClr val="tx1"/>
+              </a:solidFill>
+            </a:ln>
+          </p:spPr>
+          <p:style>
+            <a:lnRef idx="1">
+              <a:schemeClr val="accent1"/>
+            </a:lnRef>
+            <a:fillRef idx="0">
+              <a:schemeClr val="accent1"/>
+            </a:fillRef>
+            <a:effectRef idx="0">
+              <a:schemeClr val="accent1"/>
+            </a:effectRef>
+            <a:fontRef idx="minor">
+              <a:schemeClr val="tx1"/>
+            </a:fontRef>
+          </p:style>
+        </p:cxnSp>
+        <p:cxnSp>
+          <p:nvCxnSpPr>
+            <p:cNvPr id="10" name="Straight Connector 9"/>
+            <p:cNvCxnSpPr/>
+            <p:nvPr/>
+          </p:nvCxnSpPr>
+          <p:spPr>
+            <a:xfrm>
+              <a:off x="3352800" y="2552700"/>
+              <a:ext cx="0" cy="228600"/>
+            </a:xfrm>
+            <a:prstGeom prst="line">
+              <a:avLst/>
+            </a:prstGeom>
+            <a:ln w="28575">
+              <a:solidFill>
+                <a:schemeClr val="tx1"/>
+              </a:solidFill>
+            </a:ln>
+          </p:spPr>
+          <p:style>
+            <a:lnRef idx="1">
+              <a:schemeClr val="accent1"/>
+            </a:lnRef>
+            <a:fillRef idx="0">
+              <a:schemeClr val="accent1"/>
+            </a:fillRef>
+            <a:effectRef idx="0">
+              <a:schemeClr val="accent1"/>
+            </a:effectRef>
+            <a:fontRef idx="minor">
+              <a:schemeClr val="tx1"/>
+            </a:fontRef>
+          </p:style>
+        </p:cxnSp>
+        <p:cxnSp>
+          <p:nvCxnSpPr>
+            <p:cNvPr id="11" name="Straight Connector 10"/>
+            <p:cNvCxnSpPr/>
+            <p:nvPr/>
+          </p:nvCxnSpPr>
+          <p:spPr>
+            <a:xfrm>
+              <a:off x="4800600" y="2552700"/>
+              <a:ext cx="0" cy="228600"/>
+            </a:xfrm>
+            <a:prstGeom prst="line">
+              <a:avLst/>
+            </a:prstGeom>
+            <a:ln w="28575">
+              <a:solidFill>
+                <a:schemeClr val="tx1"/>
+              </a:solidFill>
+            </a:ln>
+          </p:spPr>
+          <p:style>
+            <a:lnRef idx="1">
+              <a:schemeClr val="accent1"/>
+            </a:lnRef>
+            <a:fillRef idx="0">
+              <a:schemeClr val="accent1"/>
+            </a:fillRef>
+            <a:effectRef idx="0">
+              <a:schemeClr val="accent1"/>
+            </a:effectRef>
+            <a:fontRef idx="minor">
+              <a:schemeClr val="tx1"/>
+            </a:fontRef>
+          </p:style>
+        </p:cxnSp>
+        <p:cxnSp>
+          <p:nvCxnSpPr>
+            <p:cNvPr id="12" name="Straight Connector 11"/>
+            <p:cNvCxnSpPr/>
+            <p:nvPr/>
+          </p:nvCxnSpPr>
+          <p:spPr>
+            <a:xfrm>
+              <a:off x="5791200" y="2552700"/>
+              <a:ext cx="0" cy="228600"/>
+            </a:xfrm>
+            <a:prstGeom prst="line">
+              <a:avLst/>
+            </a:prstGeom>
+            <a:ln w="28575">
+              <a:solidFill>
+                <a:schemeClr val="tx1"/>
+              </a:solidFill>
+            </a:ln>
+          </p:spPr>
+          <p:style>
+            <a:lnRef idx="1">
+              <a:schemeClr val="accent1"/>
+            </a:lnRef>
+            <a:fillRef idx="0">
+              <a:schemeClr val="accent1"/>
+            </a:fillRef>
+            <a:effectRef idx="0">
+              <a:schemeClr val="accent1"/>
+            </a:effectRef>
+            <a:fontRef idx="minor">
+              <a:schemeClr val="tx1"/>
+            </a:fontRef>
+          </p:style>
+        </p:cxnSp>
+        <p:cxnSp>
+          <p:nvCxnSpPr>
+            <p:cNvPr id="13" name="Straight Connector 12"/>
+            <p:cNvCxnSpPr/>
+            <p:nvPr/>
+          </p:nvCxnSpPr>
+          <p:spPr>
+            <a:xfrm>
+              <a:off x="6781800" y="2553330"/>
+              <a:ext cx="0" cy="228600"/>
+            </a:xfrm>
+            <a:prstGeom prst="line">
+              <a:avLst/>
+            </a:prstGeom>
+            <a:ln w="28575">
+              <a:solidFill>
+                <a:schemeClr val="tx1"/>
+              </a:solidFill>
+            </a:ln>
+          </p:spPr>
+          <p:style>
+            <a:lnRef idx="1">
+              <a:schemeClr val="accent1"/>
+            </a:lnRef>
+            <a:fillRef idx="0">
+              <a:schemeClr val="accent1"/>
+            </a:fillRef>
+            <a:effectRef idx="0">
+              <a:schemeClr val="accent1"/>
+            </a:effectRef>
+            <a:fontRef idx="minor">
+              <a:schemeClr val="tx1"/>
+            </a:fontRef>
+          </p:style>
+        </p:cxnSp>
+        <p:sp>
+          <p:nvSpPr>
+            <p:cNvPr id="18" name="Oval 17"/>
+            <p:cNvSpPr/>
+            <p:nvPr/>
+          </p:nvSpPr>
+          <p:spPr>
+            <a:xfrm>
+              <a:off x="3885569" y="2326636"/>
+              <a:ext cx="45720" cy="45720"/>
+            </a:xfrm>
+            <a:prstGeom prst="ellipse">
+              <a:avLst/>
+            </a:prstGeom>
+            <a:solidFill>
+              <a:schemeClr val="tx1"/>
+            </a:solidFill>
+            <a:ln>
+              <a:noFill/>
+            </a:ln>
+          </p:spPr>
+          <p:style>
+            <a:lnRef idx="2">
+              <a:schemeClr val="accent1">
+                <a:shade val="50000"/>
+              </a:schemeClr>
+            </a:lnRef>
+            <a:fillRef idx="1">
+              <a:schemeClr val="accent1"/>
+            </a:fillRef>
+            <a:effectRef idx="0">
+              <a:schemeClr val="accent1"/>
+            </a:effectRef>
+            <a:fontRef idx="minor">
+              <a:schemeClr val="lt1"/>
+            </a:fontRef>
+          </p:style>
+          <p:txBody>
+            <a:bodyPr rtlCol="0" anchor="ctr"/>
+            <a:lstStyle/>
+            <a:p>
+              <a:pPr algn="ctr"/>
+              <a:endParaRPr lang="en-US"/>
+            </a:p>
+          </p:txBody>
+        </p:sp>
+        <p:sp>
+          <p:nvSpPr>
+            <p:cNvPr id="19" name="Oval 18"/>
+            <p:cNvSpPr/>
+            <p:nvPr/>
+          </p:nvSpPr>
+          <p:spPr>
+            <a:xfrm>
+              <a:off x="4094648" y="2326636"/>
+              <a:ext cx="45720" cy="45720"/>
+            </a:xfrm>
+            <a:prstGeom prst="ellipse">
+              <a:avLst/>
+            </a:prstGeom>
+            <a:solidFill>
+              <a:schemeClr val="tx1"/>
+            </a:solidFill>
+            <a:ln>
+              <a:noFill/>
+            </a:ln>
+          </p:spPr>
+          <p:style>
+            <a:lnRef idx="2">
+              <a:schemeClr val="accent1">
+                <a:shade val="50000"/>
+              </a:schemeClr>
+            </a:lnRef>
+            <a:fillRef idx="1">
+              <a:schemeClr val="accent1"/>
+            </a:fillRef>
+            <a:effectRef idx="0">
+              <a:schemeClr val="accent1"/>
+            </a:effectRef>
+            <a:fontRef idx="minor">
+              <a:schemeClr val="lt1"/>
+            </a:fontRef>
+          </p:style>
+          <p:txBody>
+            <a:bodyPr rtlCol="0" anchor="ctr"/>
+            <a:lstStyle/>
+            <a:p>
+              <a:pPr algn="ctr"/>
+              <a:endParaRPr lang="en-US"/>
+            </a:p>
+          </p:txBody>
+        </p:sp>
+        <p:sp>
+          <p:nvSpPr>
+            <p:cNvPr id="20" name="Oval 19"/>
+            <p:cNvSpPr/>
+            <p:nvPr/>
+          </p:nvSpPr>
+          <p:spPr>
+            <a:xfrm>
+              <a:off x="4320729" y="2335137"/>
+              <a:ext cx="45720" cy="45720"/>
+            </a:xfrm>
+            <a:prstGeom prst="ellipse">
+              <a:avLst/>
+            </a:prstGeom>
+            <a:solidFill>
+              <a:schemeClr val="tx1"/>
+            </a:solidFill>
+            <a:ln>
+              <a:noFill/>
+            </a:ln>
+          </p:spPr>
+          <p:style>
+            <a:lnRef idx="2">
+              <a:schemeClr val="accent1">
+                <a:shade val="50000"/>
+              </a:schemeClr>
+            </a:lnRef>
+            <a:fillRef idx="1">
+              <a:schemeClr val="accent1"/>
+            </a:fillRef>
+            <a:effectRef idx="0">
+              <a:schemeClr val="accent1"/>
+            </a:effectRef>
+            <a:fontRef idx="minor">
+              <a:schemeClr val="lt1"/>
+            </a:fontRef>
+          </p:style>
+          <p:txBody>
+            <a:bodyPr rtlCol="0" anchor="ctr"/>
+            <a:lstStyle/>
+            <a:p>
+              <a:pPr algn="ctr"/>
+              <a:endParaRPr lang="en-US"/>
+            </a:p>
+          </p:txBody>
+        </p:sp>
+        <mc:AlternateContent xmlns:mc="http://schemas.openxmlformats.org/markup-compatibility/2006">
+          <mc:Choice xmlns:a14="http://schemas.microsoft.com/office/drawing/2010/main" Requires="a14">
+            <p:sp>
+              <p:nvSpPr>
+                <p:cNvPr id="21" name="TextBox 20"/>
+                <p:cNvSpPr txBox="1"/>
+                <p:nvPr/>
+              </p:nvSpPr>
+              <p:spPr>
+                <a:xfrm>
+                  <a:off x="1085850" y="2187690"/>
+                  <a:ext cx="419100" cy="369332"/>
+                </a:xfrm>
+                <a:prstGeom prst="rect">
+                  <a:avLst/>
+                </a:prstGeom>
+                <a:noFill/>
+              </p:spPr>
+              <p:txBody>
+                <a:bodyPr wrap="square" rtlCol="0">
+                  <a:spAutoFit/>
+                </a:bodyPr>
+                <a:lstStyle/>
+                <a:p>
+                  <a14:m>
+                    <m:oMathPara xmlns:m="http://schemas.openxmlformats.org/officeDocument/2006/math">
+                      <m:oMathParaPr>
+                        <m:jc m:val="centerGroup"/>
+                      </m:oMathParaPr>
+                      <m:oMath xmlns:m="http://schemas.openxmlformats.org/officeDocument/2006/math">
+                        <m:sSub>
+                          <m:sSubPr>
+                            <m:ctrlPr>
+                              <a:rPr lang="en-US" i="1" smtClean="0">
+                                <a:latin typeface="Cambria Math"/>
+                              </a:rPr>
+                            </m:ctrlPr>
+                          </m:sSubPr>
+                          <m:e>
+                            <m:r>
+                              <a:rPr lang="en-US" b="0" i="1" smtClean="0">
+                                <a:latin typeface="Cambria Math"/>
+                              </a:rPr>
+                              <m:t>𝐸</m:t>
+                            </m:r>
+                          </m:e>
+                          <m:sub>
+                            <m:r>
+                              <a:rPr lang="en-US" b="0" i="1" smtClean="0">
+                                <a:latin typeface="Cambria Math"/>
+                              </a:rPr>
+                              <m:t>𝐺</m:t>
+                            </m:r>
+                          </m:sub>
+                        </m:sSub>
+                      </m:oMath>
+                    </m:oMathPara>
+                  </a14:m>
+                  <a:endParaRPr lang="en-US" dirty="0"/>
+                </a:p>
+              </p:txBody>
+            </p:sp>
+          </mc:Choice>
+          <mc:Fallback>
+            <p:sp>
+              <p:nvSpPr>
+                <p:cNvPr id="21" name="TextBox 20"/>
+                <p:cNvSpPr txBox="1">
+                  <a:spLocks noRot="1" noChangeAspect="1" noMove="1" noResize="1" noEditPoints="1" noAdjustHandles="1" noChangeArrowheads="1" noChangeShapeType="1" noTextEdit="1"/>
+                </p:cNvSpPr>
+                <p:nvPr/>
+              </p:nvSpPr>
+              <p:spPr>
+                <a:xfrm>
+                  <a:off x="1085850" y="2187690"/>
+                  <a:ext cx="419100" cy="369332"/>
+                </a:xfrm>
+                <a:prstGeom prst="rect">
+                  <a:avLst/>
+                </a:prstGeom>
+                <a:blipFill rotWithShape="1">
+                  <a:blip r:embed="rId2"/>
+                  <a:stretch>
+                    <a:fillRect/>
+                  </a:stretch>
+                </a:blipFill>
+              </p:spPr>
+              <p:txBody>
+                <a:bodyPr/>
+                <a:lstStyle/>
+                <a:p>
+                  <a:r>
+                    <a:rPr lang="en-US">
+                      <a:noFill/>
+                    </a:rPr>
+                    <a:t> </a:t>
+                  </a:r>
+                </a:p>
+              </p:txBody>
+            </p:sp>
+          </mc:Fallback>
+        </mc:AlternateContent>
+        <mc:AlternateContent xmlns:mc="http://schemas.openxmlformats.org/markup-compatibility/2006">
+          <mc:Choice xmlns:a14="http://schemas.microsoft.com/office/drawing/2010/main" Requires="a14">
+            <p:sp>
+              <p:nvSpPr>
+                <p:cNvPr id="22" name="TextBox 21"/>
+                <p:cNvSpPr txBox="1"/>
+                <p:nvPr/>
+              </p:nvSpPr>
+              <p:spPr>
+                <a:xfrm>
+                  <a:off x="2095500" y="2183368"/>
+                  <a:ext cx="533400" cy="369332"/>
+                </a:xfrm>
+                <a:prstGeom prst="rect">
+                  <a:avLst/>
+                </a:prstGeom>
+                <a:noFill/>
+              </p:spPr>
+              <p:txBody>
+                <a:bodyPr wrap="square" rtlCol="0">
+                  <a:spAutoFit/>
+                </a:bodyPr>
+                <a:lstStyle/>
+                <a:p>
+                  <a14:m>
+                    <m:oMathPara xmlns:m="http://schemas.openxmlformats.org/officeDocument/2006/math">
+                      <m:oMathParaPr>
+                        <m:jc m:val="centerGroup"/>
+                      </m:oMathParaPr>
+                      <m:oMath xmlns:m="http://schemas.openxmlformats.org/officeDocument/2006/math">
+                        <m:sSub>
+                          <m:sSubPr>
+                            <m:ctrlPr>
+                              <a:rPr lang="en-US" i="1" smtClean="0">
+                                <a:latin typeface="Cambria Math"/>
+                              </a:rPr>
+                            </m:ctrlPr>
+                          </m:sSubPr>
+                          <m:e>
+                            <m:r>
+                              <a:rPr lang="en-US" b="0" i="1" smtClean="0">
+                                <a:latin typeface="Cambria Math"/>
+                              </a:rPr>
+                              <m:t>𝐸</m:t>
+                            </m:r>
+                          </m:e>
+                          <m:sub>
+                            <m:r>
+                              <a:rPr lang="en-US" b="0" i="1" smtClean="0">
+                                <a:latin typeface="Cambria Math"/>
+                              </a:rPr>
+                              <m:t>𝐺</m:t>
+                            </m:r>
+                            <m:r>
+                              <a:rPr lang="en-US" b="0" i="1" smtClean="0">
+                                <a:latin typeface="Cambria Math"/>
+                              </a:rPr>
+                              <m:t>−1</m:t>
+                            </m:r>
+                          </m:sub>
+                        </m:sSub>
+                      </m:oMath>
+                    </m:oMathPara>
+                  </a14:m>
+                  <a:endParaRPr lang="en-US" dirty="0"/>
+                </a:p>
+              </p:txBody>
+            </p:sp>
+          </mc:Choice>
+          <mc:Fallback>
+            <p:sp>
+              <p:nvSpPr>
+                <p:cNvPr id="22" name="TextBox 21"/>
+                <p:cNvSpPr txBox="1">
+                  <a:spLocks noRot="1" noChangeAspect="1" noMove="1" noResize="1" noEditPoints="1" noAdjustHandles="1" noChangeArrowheads="1" noChangeShapeType="1" noTextEdit="1"/>
+                </p:cNvSpPr>
+                <p:nvPr/>
+              </p:nvSpPr>
+              <p:spPr>
+                <a:xfrm>
+                  <a:off x="2095500" y="2183368"/>
+                  <a:ext cx="533400" cy="369332"/>
+                </a:xfrm>
+                <a:prstGeom prst="rect">
+                  <a:avLst/>
+                </a:prstGeom>
+                <a:blipFill rotWithShape="1">
+                  <a:blip r:embed="rId3"/>
+                  <a:stretch>
+                    <a:fillRect r="-16092"/>
+                  </a:stretch>
+                </a:blipFill>
+              </p:spPr>
+              <p:txBody>
+                <a:bodyPr/>
+                <a:lstStyle/>
+                <a:p>
+                  <a:r>
+                    <a:rPr lang="en-US">
+                      <a:noFill/>
+                    </a:rPr>
+                    <a:t> </a:t>
+                  </a:r>
+                </a:p>
+              </p:txBody>
+            </p:sp>
+          </mc:Fallback>
+        </mc:AlternateContent>
+        <mc:AlternateContent xmlns:mc="http://schemas.openxmlformats.org/markup-compatibility/2006">
+          <mc:Choice xmlns:a14="http://schemas.microsoft.com/office/drawing/2010/main" Requires="a14">
+            <p:sp>
+              <p:nvSpPr>
+                <p:cNvPr id="23" name="TextBox 22"/>
+                <p:cNvSpPr txBox="1"/>
+                <p:nvPr/>
+              </p:nvSpPr>
+              <p:spPr>
+                <a:xfrm>
+                  <a:off x="3086100" y="2151102"/>
+                  <a:ext cx="533400" cy="369332"/>
+                </a:xfrm>
+                <a:prstGeom prst="rect">
+                  <a:avLst/>
+                </a:prstGeom>
+                <a:noFill/>
+              </p:spPr>
+              <p:txBody>
+                <a:bodyPr wrap="square" rtlCol="0">
+                  <a:spAutoFit/>
+                </a:bodyPr>
+                <a:lstStyle/>
+                <a:p>
+                  <a14:m>
+                    <m:oMathPara xmlns:m="http://schemas.openxmlformats.org/officeDocument/2006/math">
+                      <m:oMathParaPr>
+                        <m:jc m:val="centerGroup"/>
+                      </m:oMathParaPr>
+                      <m:oMath xmlns:m="http://schemas.openxmlformats.org/officeDocument/2006/math">
+                        <m:sSub>
+                          <m:sSubPr>
+                            <m:ctrlPr>
+                              <a:rPr lang="en-US" i="1" smtClean="0">
+                                <a:latin typeface="Cambria Math"/>
+                              </a:rPr>
+                            </m:ctrlPr>
+                          </m:sSubPr>
+                          <m:e>
+                            <m:r>
+                              <a:rPr lang="en-US" b="0" i="1" smtClean="0">
+                                <a:latin typeface="Cambria Math"/>
+                              </a:rPr>
+                              <m:t>𝐸</m:t>
+                            </m:r>
+                          </m:e>
+                          <m:sub>
+                            <m:r>
+                              <a:rPr lang="en-US" b="0" i="1" smtClean="0">
+                                <a:latin typeface="Cambria Math"/>
+                              </a:rPr>
+                              <m:t>𝐺</m:t>
+                            </m:r>
+                            <m:r>
+                              <a:rPr lang="en-US" b="0" i="1" smtClean="0">
+                                <a:latin typeface="Cambria Math"/>
+                              </a:rPr>
+                              <m:t>−2</m:t>
+                            </m:r>
+                          </m:sub>
+                        </m:sSub>
+                      </m:oMath>
+                    </m:oMathPara>
+                  </a14:m>
+                  <a:endParaRPr lang="en-US" dirty="0"/>
+                </a:p>
+              </p:txBody>
+            </p:sp>
+          </mc:Choice>
+          <mc:Fallback>
+            <p:sp>
+              <p:nvSpPr>
+                <p:cNvPr id="23" name="TextBox 22"/>
+                <p:cNvSpPr txBox="1">
+                  <a:spLocks noRot="1" noChangeAspect="1" noMove="1" noResize="1" noEditPoints="1" noAdjustHandles="1" noChangeArrowheads="1" noChangeShapeType="1" noTextEdit="1"/>
+                </p:cNvSpPr>
+                <p:nvPr/>
+              </p:nvSpPr>
+              <p:spPr>
+                <a:xfrm>
+                  <a:off x="3086100" y="2151102"/>
+                  <a:ext cx="533400" cy="369332"/>
+                </a:xfrm>
+                <a:prstGeom prst="rect">
+                  <a:avLst/>
+                </a:prstGeom>
+                <a:blipFill rotWithShape="1">
+                  <a:blip r:embed="rId4"/>
+                  <a:stretch>
+                    <a:fillRect r="-15909"/>
+                  </a:stretch>
+                </a:blipFill>
+              </p:spPr>
+              <p:txBody>
+                <a:bodyPr/>
+                <a:lstStyle/>
+                <a:p>
+                  <a:r>
+                    <a:rPr lang="en-US">
+                      <a:noFill/>
+                    </a:rPr>
+                    <a:t> </a:t>
+                  </a:r>
+                </a:p>
+              </p:txBody>
+            </p:sp>
+          </mc:Fallback>
+        </mc:AlternateContent>
+        <mc:AlternateContent xmlns:mc="http://schemas.openxmlformats.org/markup-compatibility/2006">
+          <mc:Choice xmlns:a14="http://schemas.microsoft.com/office/drawing/2010/main" Requires="a14">
+            <p:sp>
+              <p:nvSpPr>
+                <p:cNvPr id="24" name="TextBox 23"/>
+                <p:cNvSpPr txBox="1"/>
+                <p:nvPr/>
+              </p:nvSpPr>
+              <p:spPr>
+                <a:xfrm>
+                  <a:off x="5524500" y="2183368"/>
+                  <a:ext cx="533400" cy="369332"/>
+                </a:xfrm>
+                <a:prstGeom prst="rect">
+                  <a:avLst/>
+                </a:prstGeom>
+                <a:noFill/>
+              </p:spPr>
+              <p:txBody>
+                <a:bodyPr wrap="square" rtlCol="0">
+                  <a:spAutoFit/>
+                </a:bodyPr>
+                <a:lstStyle/>
+                <a:p>
+                  <a14:m>
+                    <m:oMathPara xmlns:m="http://schemas.openxmlformats.org/officeDocument/2006/math">
+                      <m:oMathParaPr>
+                        <m:jc m:val="centerGroup"/>
+                      </m:oMathParaPr>
+                      <m:oMath xmlns:m="http://schemas.openxmlformats.org/officeDocument/2006/math">
+                        <m:sSub>
+                          <m:sSubPr>
+                            <m:ctrlPr>
+                              <a:rPr lang="en-US" i="1" smtClean="0">
+                                <a:latin typeface="Cambria Math"/>
+                              </a:rPr>
+                            </m:ctrlPr>
+                          </m:sSubPr>
+                          <m:e>
+                            <m:r>
+                              <a:rPr lang="en-US" b="0" i="1" smtClean="0">
+                                <a:latin typeface="Cambria Math"/>
+                              </a:rPr>
+                              <m:t>𝐸</m:t>
+                            </m:r>
+                          </m:e>
+                          <m:sub>
+                            <m:r>
+                              <a:rPr lang="en-US" b="0" i="1" smtClean="0">
+                                <a:latin typeface="Cambria Math"/>
+                              </a:rPr>
+                              <m:t>1</m:t>
+                            </m:r>
+                          </m:sub>
+                        </m:sSub>
+                      </m:oMath>
+                    </m:oMathPara>
+                  </a14:m>
+                  <a:endParaRPr lang="en-US" dirty="0"/>
+                </a:p>
+              </p:txBody>
+            </p:sp>
+          </mc:Choice>
+          <mc:Fallback>
+            <p:sp>
+              <p:nvSpPr>
+                <p:cNvPr id="24" name="TextBox 23"/>
+                <p:cNvSpPr txBox="1">
+                  <a:spLocks noRot="1" noChangeAspect="1" noMove="1" noResize="1" noEditPoints="1" noAdjustHandles="1" noChangeArrowheads="1" noChangeShapeType="1" noTextEdit="1"/>
+                </p:cNvSpPr>
+                <p:nvPr/>
+              </p:nvSpPr>
+              <p:spPr>
+                <a:xfrm>
+                  <a:off x="5524500" y="2183368"/>
+                  <a:ext cx="533400" cy="369332"/>
+                </a:xfrm>
+                <a:prstGeom prst="rect">
+                  <a:avLst/>
+                </a:prstGeom>
+                <a:blipFill rotWithShape="1">
+                  <a:blip r:embed="rId5"/>
+                  <a:stretch>
+                    <a:fillRect/>
+                  </a:stretch>
+                </a:blipFill>
+              </p:spPr>
+              <p:txBody>
+                <a:bodyPr/>
+                <a:lstStyle/>
+                <a:p>
+                  <a:r>
+                    <a:rPr lang="en-US">
+                      <a:noFill/>
+                    </a:rPr>
+                    <a:t> </a:t>
+                  </a:r>
+                </a:p>
+              </p:txBody>
+            </p:sp>
+          </mc:Fallback>
+        </mc:AlternateContent>
+        <mc:AlternateContent xmlns:mc="http://schemas.openxmlformats.org/markup-compatibility/2006">
+          <mc:Choice xmlns:a14="http://schemas.microsoft.com/office/drawing/2010/main" Requires="a14">
+            <p:sp>
+              <p:nvSpPr>
+                <p:cNvPr id="25" name="TextBox 24"/>
+                <p:cNvSpPr txBox="1"/>
+                <p:nvPr/>
+              </p:nvSpPr>
+              <p:spPr>
+                <a:xfrm>
+                  <a:off x="4533900" y="2183368"/>
+                  <a:ext cx="533400" cy="369332"/>
+                </a:xfrm>
+                <a:prstGeom prst="rect">
+                  <a:avLst/>
+                </a:prstGeom>
+                <a:noFill/>
+              </p:spPr>
+              <p:txBody>
+                <a:bodyPr wrap="square" rtlCol="0">
+                  <a:spAutoFit/>
+                </a:bodyPr>
+                <a:lstStyle/>
+                <a:p>
+                  <a14:m>
+                    <m:oMathPara xmlns:m="http://schemas.openxmlformats.org/officeDocument/2006/math">
+                      <m:oMathParaPr>
+                        <m:jc m:val="centerGroup"/>
+                      </m:oMathParaPr>
+                      <m:oMath xmlns:m="http://schemas.openxmlformats.org/officeDocument/2006/math">
+                        <m:sSub>
+                          <m:sSubPr>
+                            <m:ctrlPr>
+                              <a:rPr lang="en-US" i="1" smtClean="0">
+                                <a:latin typeface="Cambria Math"/>
+                              </a:rPr>
+                            </m:ctrlPr>
+                          </m:sSubPr>
+                          <m:e>
+                            <m:r>
+                              <a:rPr lang="en-US" b="0" i="1" smtClean="0">
+                                <a:latin typeface="Cambria Math"/>
+                              </a:rPr>
+                              <m:t>𝐸</m:t>
+                            </m:r>
+                          </m:e>
+                          <m:sub>
+                            <m:r>
+                              <a:rPr lang="en-US" b="0" i="1" smtClean="0">
+                                <a:latin typeface="Cambria Math"/>
+                              </a:rPr>
+                              <m:t>2</m:t>
+                            </m:r>
+                          </m:sub>
+                        </m:sSub>
+                      </m:oMath>
+                    </m:oMathPara>
+                  </a14:m>
+                  <a:endParaRPr lang="en-US" dirty="0"/>
+                </a:p>
+              </p:txBody>
+            </p:sp>
+          </mc:Choice>
+          <mc:Fallback>
+            <p:sp>
+              <p:nvSpPr>
+                <p:cNvPr id="25" name="TextBox 24"/>
+                <p:cNvSpPr txBox="1">
+                  <a:spLocks noRot="1" noChangeAspect="1" noMove="1" noResize="1" noEditPoints="1" noAdjustHandles="1" noChangeArrowheads="1" noChangeShapeType="1" noTextEdit="1"/>
+                </p:cNvSpPr>
+                <p:nvPr/>
+              </p:nvSpPr>
+              <p:spPr>
+                <a:xfrm>
+                  <a:off x="4533900" y="2183368"/>
+                  <a:ext cx="533400" cy="369332"/>
+                </a:xfrm>
+                <a:prstGeom prst="rect">
+                  <a:avLst/>
+                </a:prstGeom>
+                <a:blipFill rotWithShape="1">
+                  <a:blip r:embed="rId6"/>
+                  <a:stretch>
+                    <a:fillRect/>
+                  </a:stretch>
+                </a:blipFill>
+              </p:spPr>
+              <p:txBody>
+                <a:bodyPr/>
+                <a:lstStyle/>
+                <a:p>
+                  <a:r>
+                    <a:rPr lang="en-US">
+                      <a:noFill/>
+                    </a:rPr>
+                    <a:t> </a:t>
+                  </a:r>
+                </a:p>
+              </p:txBody>
+            </p:sp>
+          </mc:Fallback>
+        </mc:AlternateContent>
+        <mc:AlternateContent xmlns:mc="http://schemas.openxmlformats.org/markup-compatibility/2006">
+          <mc:Choice xmlns:a14="http://schemas.microsoft.com/office/drawing/2010/main" Requires="a14">
+            <p:sp>
+              <p:nvSpPr>
+                <p:cNvPr id="26" name="TextBox 25"/>
+                <p:cNvSpPr txBox="1"/>
+                <p:nvPr/>
+              </p:nvSpPr>
+              <p:spPr>
+                <a:xfrm>
+                  <a:off x="6515100" y="2183998"/>
+                  <a:ext cx="533400" cy="369332"/>
+                </a:xfrm>
+                <a:prstGeom prst="rect">
+                  <a:avLst/>
+                </a:prstGeom>
+                <a:noFill/>
+              </p:spPr>
+              <p:txBody>
+                <a:bodyPr wrap="square" rtlCol="0">
+                  <a:spAutoFit/>
+                </a:bodyPr>
+                <a:lstStyle/>
+                <a:p>
+                  <a14:m>
+                    <m:oMathPara xmlns:m="http://schemas.openxmlformats.org/officeDocument/2006/math">
+                      <m:oMathParaPr>
+                        <m:jc m:val="centerGroup"/>
+                      </m:oMathParaPr>
+                      <m:oMath xmlns:m="http://schemas.openxmlformats.org/officeDocument/2006/math">
+                        <m:sSub>
+                          <m:sSubPr>
+                            <m:ctrlPr>
+                              <a:rPr lang="en-US" i="1" smtClean="0">
+                                <a:latin typeface="Cambria Math"/>
+                              </a:rPr>
+                            </m:ctrlPr>
+                          </m:sSubPr>
+                          <m:e>
+                            <m:r>
+                              <a:rPr lang="en-US" b="0" i="1" smtClean="0">
+                                <a:latin typeface="Cambria Math"/>
+                              </a:rPr>
+                              <m:t>𝐸</m:t>
+                            </m:r>
+                          </m:e>
+                          <m:sub>
+                            <m:r>
+                              <a:rPr lang="en-US" b="0" i="1" smtClean="0">
+                                <a:latin typeface="Cambria Math"/>
+                              </a:rPr>
+                              <m:t>0</m:t>
+                            </m:r>
+                          </m:sub>
+                        </m:sSub>
+                      </m:oMath>
+                    </m:oMathPara>
+                  </a14:m>
+                  <a:endParaRPr lang="en-US" dirty="0"/>
+                </a:p>
+              </p:txBody>
+            </p:sp>
+          </mc:Choice>
+          <mc:Fallback>
+            <p:sp>
+              <p:nvSpPr>
+                <p:cNvPr id="26" name="TextBox 25"/>
+                <p:cNvSpPr txBox="1">
+                  <a:spLocks noRot="1" noChangeAspect="1" noMove="1" noResize="1" noEditPoints="1" noAdjustHandles="1" noChangeArrowheads="1" noChangeShapeType="1" noTextEdit="1"/>
+                </p:cNvSpPr>
+                <p:nvPr/>
+              </p:nvSpPr>
+              <p:spPr>
+                <a:xfrm>
+                  <a:off x="6515100" y="2183998"/>
+                  <a:ext cx="533400" cy="369332"/>
+                </a:xfrm>
+                <a:prstGeom prst="rect">
+                  <a:avLst/>
+                </a:prstGeom>
+                <a:blipFill rotWithShape="1">
+                  <a:blip r:embed="rId7"/>
+                  <a:stretch>
+                    <a:fillRect/>
+                  </a:stretch>
+                </a:blipFill>
+              </p:spPr>
+              <p:txBody>
+                <a:bodyPr/>
+                <a:lstStyle/>
+                <a:p>
+                  <a:r>
+                    <a:rPr lang="en-US">
+                      <a:noFill/>
+                    </a:rPr>
+                    <a:t> </a:t>
+                  </a:r>
+                </a:p>
+              </p:txBody>
+            </p:sp>
+          </mc:Fallback>
+        </mc:AlternateContent>
+        <p:sp>
+          <p:nvSpPr>
+            <p:cNvPr id="28" name="Left Brace 27"/>
+            <p:cNvSpPr/>
+            <p:nvPr/>
+          </p:nvSpPr>
+          <p:spPr>
+            <a:xfrm rot="5400000">
+              <a:off x="6179117" y="1609005"/>
+              <a:ext cx="202800" cy="1002566"/>
+            </a:xfrm>
+            <a:prstGeom prst="leftBrace">
+              <a:avLst/>
+            </a:prstGeom>
+            <a:noFill/>
+            <a:ln w="28575">
+              <a:solidFill>
+                <a:schemeClr val="tx1"/>
+              </a:solidFill>
+            </a:ln>
+          </p:spPr>
+          <p:style>
+            <a:lnRef idx="1">
+              <a:schemeClr val="accent1"/>
+            </a:lnRef>
+            <a:fillRef idx="0">
+              <a:schemeClr val="accent1"/>
+            </a:fillRef>
+            <a:effectRef idx="0">
+              <a:schemeClr val="accent1"/>
+            </a:effectRef>
+            <a:fontRef idx="minor">
+              <a:schemeClr val="tx1"/>
+            </a:fontRef>
+          </p:style>
+          <p:txBody>
+            <a:bodyPr rtlCol="0" anchor="ctr"/>
+            <a:lstStyle/>
+            <a:p>
+              <a:pPr algn="ctr"/>
+              <a:endParaRPr lang="en-US"/>
+            </a:p>
+          </p:txBody>
+        </p:sp>
+        <p:sp>
+          <p:nvSpPr>
+            <p:cNvPr id="29" name="Left Brace 28"/>
+            <p:cNvSpPr/>
+            <p:nvPr/>
+          </p:nvSpPr>
+          <p:spPr>
+            <a:xfrm rot="5400000">
+              <a:off x="1727400" y="1600200"/>
+              <a:ext cx="202800" cy="1066800"/>
+            </a:xfrm>
+            <a:prstGeom prst="leftBrace">
+              <a:avLst/>
+            </a:prstGeom>
+            <a:noFill/>
+            <a:ln w="28575">
+              <a:solidFill>
+                <a:schemeClr val="tx1"/>
+              </a:solidFill>
+            </a:ln>
+          </p:spPr>
+          <p:style>
+            <a:lnRef idx="1">
+              <a:schemeClr val="accent1"/>
+            </a:lnRef>
+            <a:fillRef idx="0">
+              <a:schemeClr val="accent1"/>
+            </a:fillRef>
+            <a:effectRef idx="0">
+              <a:schemeClr val="accent1"/>
+            </a:effectRef>
+            <a:fontRef idx="minor">
+              <a:schemeClr val="tx1"/>
+            </a:fontRef>
+          </p:style>
+          <p:txBody>
+            <a:bodyPr rtlCol="0" anchor="ctr"/>
+            <a:lstStyle/>
+            <a:p>
+              <a:pPr algn="ctr"/>
+              <a:endParaRPr lang="en-US"/>
+            </a:p>
+          </p:txBody>
+        </p:sp>
+        <p:sp>
+          <p:nvSpPr>
+            <p:cNvPr id="30" name="TextBox 29"/>
+            <p:cNvSpPr txBox="1"/>
+            <p:nvPr/>
+          </p:nvSpPr>
+          <p:spPr>
+            <a:xfrm>
+              <a:off x="1343186" y="1682698"/>
+              <a:ext cx="971228" cy="369332"/>
+            </a:xfrm>
+            <a:prstGeom prst="rect">
+              <a:avLst/>
+            </a:prstGeom>
+            <a:noFill/>
+          </p:spPr>
+          <p:txBody>
+            <a:bodyPr wrap="none" rtlCol="0">
+              <a:spAutoFit/>
+            </a:bodyPr>
+            <a:lstStyle/>
+            <a:p>
+              <a:r>
+                <a:rPr lang="en-US" dirty="0" smtClean="0"/>
+                <a:t>Group G</a:t>
+              </a:r>
+              <a:endParaRPr lang="en-US" dirty="0"/>
+            </a:p>
+          </p:txBody>
+        </p:sp>
+        <p:sp>
+          <p:nvSpPr>
+            <p:cNvPr id="31" name="TextBox 30"/>
+            <p:cNvSpPr txBox="1"/>
+            <p:nvPr/>
+          </p:nvSpPr>
+          <p:spPr>
+            <a:xfrm>
+              <a:off x="5795608" y="1682698"/>
+              <a:ext cx="942374" cy="369332"/>
+            </a:xfrm>
+            <a:prstGeom prst="rect">
+              <a:avLst/>
+            </a:prstGeom>
+            <a:noFill/>
+          </p:spPr>
+          <p:txBody>
+            <a:bodyPr wrap="none" rtlCol="0">
+              <a:spAutoFit/>
+            </a:bodyPr>
+            <a:lstStyle/>
+            <a:p>
+              <a:r>
+                <a:rPr lang="en-US" dirty="0" smtClean="0"/>
+                <a:t>Group 1</a:t>
+              </a:r>
+              <a:endParaRPr lang="en-US" dirty="0"/>
+            </a:p>
+          </p:txBody>
+        </p:sp>
+      </p:grpSp>
+    </p:spTree>
+    <p:extLst>
+      <p:ext uri="{BB962C8B-B14F-4D97-AF65-F5344CB8AC3E}">
+        <p14:creationId xmlns:p14="http://schemas.microsoft.com/office/powerpoint/2010/main" val="653629455"/>
+      </p:ext>
+    </p:extLst>
+  </p:cSld>
+  <p:clrMapOvr>
+    <a:masterClrMapping/>
+  </p:clrMapOvr>
+</p:sld>
+</file>
+
 <file path=ppt/theme/theme1.xml><?xml version="1.0" encoding="utf-8"?>
 <a:theme xmlns:a="http://schemas.openxmlformats.org/drawingml/2006/main" name="Office Theme">
   <a:themeElements>

</xml_diff>

<commit_message>
Add sub-ray illustration picture
</commit_message>
<xml_diff>
--- a/Miscellaneous/Presentation1.pptx
+++ b/Miscellaneous/Presentation1.pptx
@@ -7,6 +7,7 @@
   <p:sldIdLst>
     <p:sldId id="257" r:id="rId2"/>
     <p:sldId id="258" r:id="rId3"/>
+    <p:sldId id="259" r:id="rId4"/>
   </p:sldIdLst>
   <p:sldSz cx="9144000" cy="6858000" type="screen4x3"/>
   <p:notesSz cx="6858000" cy="9144000"/>
@@ -105,6 +106,22 @@
       </a:defRPr>
     </a:lvl9pPr>
   </p:defaultTextStyle>
+  <p:extLst>
+    <p:ext uri="{EFAFB233-063F-42B5-8137-9DF3F51BA10A}">
+      <p15:sldGuideLst xmlns:p15="http://schemas.microsoft.com/office/powerpoint/2012/main">
+        <p15:guide id="1" orient="horz" pos="2160">
+          <p15:clr>
+            <a:srgbClr val="A4A3A4"/>
+          </p15:clr>
+        </p15:guide>
+        <p15:guide id="2" pos="2880">
+          <p15:clr>
+            <a:srgbClr val="A4A3A4"/>
+          </p15:clr>
+        </p15:guide>
+      </p15:sldGuideLst>
+    </p:ext>
+  </p:extLst>
 </p:presentation>
 </file>
 
@@ -146,10 +163,9 @@
           <a:lstStyle/>
           <a:p>
             <a:r>
-              <a:rPr lang="en-US" smtClean="0"/>
+              <a:rPr lang="en-US"/>
               <a:t>Click to edit Master title style</a:t>
             </a:r>
-            <a:endParaRPr lang="en-US"/>
           </a:p>
         </p:txBody>
       </p:sp>
@@ -265,10 +281,9 @@
           </a:lstStyle>
           <a:p>
             <a:r>
-              <a:rPr lang="en-US" smtClean="0"/>
+              <a:rPr lang="en-US"/>
               <a:t>Click to edit Master subtitle style</a:t>
             </a:r>
-            <a:endParaRPr lang="en-US"/>
           </a:p>
         </p:txBody>
       </p:sp>
@@ -289,7 +304,7 @@
           <a:p>
             <a:fld id="{1D5FC7BF-D5F9-4CD9-BD2A-D1C9342DD0BF}" type="datetimeFigureOut">
               <a:rPr lang="en-US" smtClean="0"/>
-              <a:t>10/20/2016</a:t>
+              <a:t>10/23/2016</a:t>
             </a:fld>
             <a:endParaRPr lang="en-US"/>
           </a:p>
@@ -383,10 +398,9 @@
           <a:lstStyle/>
           <a:p>
             <a:r>
-              <a:rPr lang="en-US" smtClean="0"/>
+              <a:rPr lang="en-US"/>
               <a:t>Click to edit Master title style</a:t>
             </a:r>
-            <a:endParaRPr lang="en-US"/>
           </a:p>
         </p:txBody>
       </p:sp>
@@ -407,38 +421,37 @@
           <a:p>
             <a:pPr lvl="0"/>
             <a:r>
-              <a:rPr lang="en-US" smtClean="0"/>
+              <a:rPr lang="en-US"/>
               <a:t>Click to edit Master text styles</a:t>
             </a:r>
           </a:p>
           <a:p>
             <a:pPr lvl="1"/>
             <a:r>
-              <a:rPr lang="en-US" smtClean="0"/>
+              <a:rPr lang="en-US"/>
               <a:t>Second level</a:t>
             </a:r>
           </a:p>
           <a:p>
             <a:pPr lvl="2"/>
             <a:r>
-              <a:rPr lang="en-US" smtClean="0"/>
+              <a:rPr lang="en-US"/>
               <a:t>Third level</a:t>
             </a:r>
           </a:p>
           <a:p>
             <a:pPr lvl="3"/>
             <a:r>
-              <a:rPr lang="en-US" smtClean="0"/>
+              <a:rPr lang="en-US"/>
               <a:t>Fourth level</a:t>
             </a:r>
           </a:p>
           <a:p>
             <a:pPr lvl="4"/>
             <a:r>
-              <a:rPr lang="en-US" smtClean="0"/>
+              <a:rPr lang="en-US"/>
               <a:t>Fifth level</a:t>
             </a:r>
-            <a:endParaRPr lang="en-US"/>
           </a:p>
         </p:txBody>
       </p:sp>
@@ -459,7 +472,7 @@
           <a:p>
             <a:fld id="{1D5FC7BF-D5F9-4CD9-BD2A-D1C9342DD0BF}" type="datetimeFigureOut">
               <a:rPr lang="en-US" smtClean="0"/>
-              <a:t>10/20/2016</a:t>
+              <a:t>10/23/2016</a:t>
             </a:fld>
             <a:endParaRPr lang="en-US"/>
           </a:p>
@@ -558,10 +571,9 @@
           <a:lstStyle/>
           <a:p>
             <a:r>
-              <a:rPr lang="en-US" smtClean="0"/>
+              <a:rPr lang="en-US"/>
               <a:t>Click to edit Master title style</a:t>
             </a:r>
-            <a:endParaRPr lang="en-US"/>
           </a:p>
         </p:txBody>
       </p:sp>
@@ -587,38 +599,37 @@
           <a:p>
             <a:pPr lvl="0"/>
             <a:r>
-              <a:rPr lang="en-US" smtClean="0"/>
+              <a:rPr lang="en-US"/>
               <a:t>Click to edit Master text styles</a:t>
             </a:r>
           </a:p>
           <a:p>
             <a:pPr lvl="1"/>
             <a:r>
-              <a:rPr lang="en-US" smtClean="0"/>
+              <a:rPr lang="en-US"/>
               <a:t>Second level</a:t>
             </a:r>
           </a:p>
           <a:p>
             <a:pPr lvl="2"/>
             <a:r>
-              <a:rPr lang="en-US" smtClean="0"/>
+              <a:rPr lang="en-US"/>
               <a:t>Third level</a:t>
             </a:r>
           </a:p>
           <a:p>
             <a:pPr lvl="3"/>
             <a:r>
-              <a:rPr lang="en-US" smtClean="0"/>
+              <a:rPr lang="en-US"/>
               <a:t>Fourth level</a:t>
             </a:r>
           </a:p>
           <a:p>
             <a:pPr lvl="4"/>
             <a:r>
-              <a:rPr lang="en-US" smtClean="0"/>
+              <a:rPr lang="en-US"/>
               <a:t>Fifth level</a:t>
             </a:r>
-            <a:endParaRPr lang="en-US"/>
           </a:p>
         </p:txBody>
       </p:sp>
@@ -639,7 +650,7 @@
           <a:p>
             <a:fld id="{1D5FC7BF-D5F9-4CD9-BD2A-D1C9342DD0BF}" type="datetimeFigureOut">
               <a:rPr lang="en-US" smtClean="0"/>
-              <a:t>10/20/2016</a:t>
+              <a:t>10/23/2016</a:t>
             </a:fld>
             <a:endParaRPr lang="en-US"/>
           </a:p>
@@ -733,10 +744,9 @@
           <a:lstStyle/>
           <a:p>
             <a:r>
-              <a:rPr lang="en-US" smtClean="0"/>
+              <a:rPr lang="en-US"/>
               <a:t>Click to edit Master title style</a:t>
             </a:r>
-            <a:endParaRPr lang="en-US"/>
           </a:p>
         </p:txBody>
       </p:sp>
@@ -757,38 +767,37 @@
           <a:p>
             <a:pPr lvl="0"/>
             <a:r>
-              <a:rPr lang="en-US" smtClean="0"/>
+              <a:rPr lang="en-US"/>
               <a:t>Click to edit Master text styles</a:t>
             </a:r>
           </a:p>
           <a:p>
             <a:pPr lvl="1"/>
             <a:r>
-              <a:rPr lang="en-US" smtClean="0"/>
+              <a:rPr lang="en-US"/>
               <a:t>Second level</a:t>
             </a:r>
           </a:p>
           <a:p>
             <a:pPr lvl="2"/>
             <a:r>
-              <a:rPr lang="en-US" smtClean="0"/>
+              <a:rPr lang="en-US"/>
               <a:t>Third level</a:t>
             </a:r>
           </a:p>
           <a:p>
             <a:pPr lvl="3"/>
             <a:r>
-              <a:rPr lang="en-US" smtClean="0"/>
+              <a:rPr lang="en-US"/>
               <a:t>Fourth level</a:t>
             </a:r>
           </a:p>
           <a:p>
             <a:pPr lvl="4"/>
             <a:r>
-              <a:rPr lang="en-US" smtClean="0"/>
+              <a:rPr lang="en-US"/>
               <a:t>Fifth level</a:t>
             </a:r>
-            <a:endParaRPr lang="en-US"/>
           </a:p>
         </p:txBody>
       </p:sp>
@@ -809,7 +818,7 @@
           <a:p>
             <a:fld id="{1D5FC7BF-D5F9-4CD9-BD2A-D1C9342DD0BF}" type="datetimeFigureOut">
               <a:rPr lang="en-US" smtClean="0"/>
-              <a:t>10/20/2016</a:t>
+              <a:t>10/23/2016</a:t>
             </a:fld>
             <a:endParaRPr lang="en-US"/>
           </a:p>
@@ -912,10 +921,9 @@
           </a:lstStyle>
           <a:p>
             <a:r>
-              <a:rPr lang="en-US" smtClean="0"/>
+              <a:rPr lang="en-US"/>
               <a:t>Click to edit Master title style</a:t>
             </a:r>
-            <a:endParaRPr lang="en-US"/>
           </a:p>
         </p:txBody>
       </p:sp>
@@ -1032,7 +1040,7 @@
           <a:p>
             <a:pPr lvl="0"/>
             <a:r>
-              <a:rPr lang="en-US" smtClean="0"/>
+              <a:rPr lang="en-US"/>
               <a:t>Click to edit Master text styles</a:t>
             </a:r>
           </a:p>
@@ -1055,7 +1063,7 @@
           <a:p>
             <a:fld id="{1D5FC7BF-D5F9-4CD9-BD2A-D1C9342DD0BF}" type="datetimeFigureOut">
               <a:rPr lang="en-US" smtClean="0"/>
-              <a:t>10/20/2016</a:t>
+              <a:t>10/23/2016</a:t>
             </a:fld>
             <a:endParaRPr lang="en-US"/>
           </a:p>
@@ -1149,10 +1157,9 @@
           <a:lstStyle/>
           <a:p>
             <a:r>
-              <a:rPr lang="en-US" smtClean="0"/>
+              <a:rPr lang="en-US"/>
               <a:t>Click to edit Master title style</a:t>
             </a:r>
-            <a:endParaRPr lang="en-US"/>
           </a:p>
         </p:txBody>
       </p:sp>
@@ -1206,38 +1213,37 @@
           <a:p>
             <a:pPr lvl="0"/>
             <a:r>
-              <a:rPr lang="en-US" smtClean="0"/>
+              <a:rPr lang="en-US"/>
               <a:t>Click to edit Master text styles</a:t>
             </a:r>
           </a:p>
           <a:p>
             <a:pPr lvl="1"/>
             <a:r>
-              <a:rPr lang="en-US" smtClean="0"/>
+              <a:rPr lang="en-US"/>
               <a:t>Second level</a:t>
             </a:r>
           </a:p>
           <a:p>
             <a:pPr lvl="2"/>
             <a:r>
-              <a:rPr lang="en-US" smtClean="0"/>
+              <a:rPr lang="en-US"/>
               <a:t>Third level</a:t>
             </a:r>
           </a:p>
           <a:p>
             <a:pPr lvl="3"/>
             <a:r>
-              <a:rPr lang="en-US" smtClean="0"/>
+              <a:rPr lang="en-US"/>
               <a:t>Fourth level</a:t>
             </a:r>
           </a:p>
           <a:p>
             <a:pPr lvl="4"/>
             <a:r>
-              <a:rPr lang="en-US" smtClean="0"/>
+              <a:rPr lang="en-US"/>
               <a:t>Fifth level</a:t>
             </a:r>
-            <a:endParaRPr lang="en-US"/>
           </a:p>
         </p:txBody>
       </p:sp>
@@ -1291,38 +1297,37 @@
           <a:p>
             <a:pPr lvl="0"/>
             <a:r>
-              <a:rPr lang="en-US" smtClean="0"/>
+              <a:rPr lang="en-US"/>
               <a:t>Click to edit Master text styles</a:t>
             </a:r>
           </a:p>
           <a:p>
             <a:pPr lvl="1"/>
             <a:r>
-              <a:rPr lang="en-US" smtClean="0"/>
+              <a:rPr lang="en-US"/>
               <a:t>Second level</a:t>
             </a:r>
           </a:p>
           <a:p>
             <a:pPr lvl="2"/>
             <a:r>
-              <a:rPr lang="en-US" smtClean="0"/>
+              <a:rPr lang="en-US"/>
               <a:t>Third level</a:t>
             </a:r>
           </a:p>
           <a:p>
             <a:pPr lvl="3"/>
             <a:r>
-              <a:rPr lang="en-US" smtClean="0"/>
+              <a:rPr lang="en-US"/>
               <a:t>Fourth level</a:t>
             </a:r>
           </a:p>
           <a:p>
             <a:pPr lvl="4"/>
             <a:r>
-              <a:rPr lang="en-US" smtClean="0"/>
+              <a:rPr lang="en-US"/>
               <a:t>Fifth level</a:t>
             </a:r>
-            <a:endParaRPr lang="en-US"/>
           </a:p>
         </p:txBody>
       </p:sp>
@@ -1343,7 +1348,7 @@
           <a:p>
             <a:fld id="{1D5FC7BF-D5F9-4CD9-BD2A-D1C9342DD0BF}" type="datetimeFigureOut">
               <a:rPr lang="en-US" smtClean="0"/>
-              <a:t>10/20/2016</a:t>
+              <a:t>10/23/2016</a:t>
             </a:fld>
             <a:endParaRPr lang="en-US"/>
           </a:p>
@@ -1441,10 +1446,9 @@
           </a:lstStyle>
           <a:p>
             <a:r>
-              <a:rPr lang="en-US" smtClean="0"/>
+              <a:rPr lang="en-US"/>
               <a:t>Click to edit Master title style</a:t>
             </a:r>
-            <a:endParaRPr lang="en-US"/>
           </a:p>
         </p:txBody>
       </p:sp>
@@ -1507,7 +1511,7 @@
           <a:p>
             <a:pPr lvl="0"/>
             <a:r>
-              <a:rPr lang="en-US" smtClean="0"/>
+              <a:rPr lang="en-US"/>
               <a:t>Click to edit Master text styles</a:t>
             </a:r>
           </a:p>
@@ -1563,38 +1567,37 @@
           <a:p>
             <a:pPr lvl="0"/>
             <a:r>
-              <a:rPr lang="en-US" smtClean="0"/>
+              <a:rPr lang="en-US"/>
               <a:t>Click to edit Master text styles</a:t>
             </a:r>
           </a:p>
           <a:p>
             <a:pPr lvl="1"/>
             <a:r>
-              <a:rPr lang="en-US" smtClean="0"/>
+              <a:rPr lang="en-US"/>
               <a:t>Second level</a:t>
             </a:r>
           </a:p>
           <a:p>
             <a:pPr lvl="2"/>
             <a:r>
-              <a:rPr lang="en-US" smtClean="0"/>
+              <a:rPr lang="en-US"/>
               <a:t>Third level</a:t>
             </a:r>
           </a:p>
           <a:p>
             <a:pPr lvl="3"/>
             <a:r>
-              <a:rPr lang="en-US" smtClean="0"/>
+              <a:rPr lang="en-US"/>
               <a:t>Fourth level</a:t>
             </a:r>
           </a:p>
           <a:p>
             <a:pPr lvl="4"/>
             <a:r>
-              <a:rPr lang="en-US" smtClean="0"/>
+              <a:rPr lang="en-US"/>
               <a:t>Fifth level</a:t>
             </a:r>
-            <a:endParaRPr lang="en-US"/>
           </a:p>
         </p:txBody>
       </p:sp>
@@ -1657,7 +1660,7 @@
           <a:p>
             <a:pPr lvl="0"/>
             <a:r>
-              <a:rPr lang="en-US" smtClean="0"/>
+              <a:rPr lang="en-US"/>
               <a:t>Click to edit Master text styles</a:t>
             </a:r>
           </a:p>
@@ -1713,38 +1716,37 @@
           <a:p>
             <a:pPr lvl="0"/>
             <a:r>
-              <a:rPr lang="en-US" smtClean="0"/>
+              <a:rPr lang="en-US"/>
               <a:t>Click to edit Master text styles</a:t>
             </a:r>
           </a:p>
           <a:p>
             <a:pPr lvl="1"/>
             <a:r>
-              <a:rPr lang="en-US" smtClean="0"/>
+              <a:rPr lang="en-US"/>
               <a:t>Second level</a:t>
             </a:r>
           </a:p>
           <a:p>
             <a:pPr lvl="2"/>
             <a:r>
-              <a:rPr lang="en-US" smtClean="0"/>
+              <a:rPr lang="en-US"/>
               <a:t>Third level</a:t>
             </a:r>
           </a:p>
           <a:p>
             <a:pPr lvl="3"/>
             <a:r>
-              <a:rPr lang="en-US" smtClean="0"/>
+              <a:rPr lang="en-US"/>
               <a:t>Fourth level</a:t>
             </a:r>
           </a:p>
           <a:p>
             <a:pPr lvl="4"/>
             <a:r>
-              <a:rPr lang="en-US" smtClean="0"/>
+              <a:rPr lang="en-US"/>
               <a:t>Fifth level</a:t>
             </a:r>
-            <a:endParaRPr lang="en-US"/>
           </a:p>
         </p:txBody>
       </p:sp>
@@ -1765,7 +1767,7 @@
           <a:p>
             <a:fld id="{1D5FC7BF-D5F9-4CD9-BD2A-D1C9342DD0BF}" type="datetimeFigureOut">
               <a:rPr lang="en-US" smtClean="0"/>
-              <a:t>10/20/2016</a:t>
+              <a:t>10/23/2016</a:t>
             </a:fld>
             <a:endParaRPr lang="en-US"/>
           </a:p>
@@ -1859,10 +1861,9 @@
           <a:lstStyle/>
           <a:p>
             <a:r>
-              <a:rPr lang="en-US" smtClean="0"/>
+              <a:rPr lang="en-US"/>
               <a:t>Click to edit Master title style</a:t>
             </a:r>
-            <a:endParaRPr lang="en-US"/>
           </a:p>
         </p:txBody>
       </p:sp>
@@ -1883,7 +1884,7 @@
           <a:p>
             <a:fld id="{1D5FC7BF-D5F9-4CD9-BD2A-D1C9342DD0BF}" type="datetimeFigureOut">
               <a:rPr lang="en-US" smtClean="0"/>
-              <a:t>10/20/2016</a:t>
+              <a:t>10/23/2016</a:t>
             </a:fld>
             <a:endParaRPr lang="en-US"/>
           </a:p>
@@ -1978,7 +1979,7 @@
           <a:p>
             <a:fld id="{1D5FC7BF-D5F9-4CD9-BD2A-D1C9342DD0BF}" type="datetimeFigureOut">
               <a:rPr lang="en-US" smtClean="0"/>
-              <a:t>10/20/2016</a:t>
+              <a:t>10/23/2016</a:t>
             </a:fld>
             <a:endParaRPr lang="en-US"/>
           </a:p>
@@ -2081,10 +2082,9 @@
           </a:lstStyle>
           <a:p>
             <a:r>
-              <a:rPr lang="en-US" smtClean="0"/>
+              <a:rPr lang="en-US"/>
               <a:t>Click to edit Master title style</a:t>
             </a:r>
-            <a:endParaRPr lang="en-US"/>
           </a:p>
         </p:txBody>
       </p:sp>
@@ -2138,38 +2138,37 @@
           <a:p>
             <a:pPr lvl="0"/>
             <a:r>
-              <a:rPr lang="en-US" smtClean="0"/>
+              <a:rPr lang="en-US"/>
               <a:t>Click to edit Master text styles</a:t>
             </a:r>
           </a:p>
           <a:p>
             <a:pPr lvl="1"/>
             <a:r>
-              <a:rPr lang="en-US" smtClean="0"/>
+              <a:rPr lang="en-US"/>
               <a:t>Second level</a:t>
             </a:r>
           </a:p>
           <a:p>
             <a:pPr lvl="2"/>
             <a:r>
-              <a:rPr lang="en-US" smtClean="0"/>
+              <a:rPr lang="en-US"/>
               <a:t>Third level</a:t>
             </a:r>
           </a:p>
           <a:p>
             <a:pPr lvl="3"/>
             <a:r>
-              <a:rPr lang="en-US" smtClean="0"/>
+              <a:rPr lang="en-US"/>
               <a:t>Fourth level</a:t>
             </a:r>
           </a:p>
           <a:p>
             <a:pPr lvl="4"/>
             <a:r>
-              <a:rPr lang="en-US" smtClean="0"/>
+              <a:rPr lang="en-US"/>
               <a:t>Fifth level</a:t>
             </a:r>
-            <a:endParaRPr lang="en-US"/>
           </a:p>
         </p:txBody>
       </p:sp>
@@ -2232,7 +2231,7 @@
           <a:p>
             <a:pPr lvl="0"/>
             <a:r>
-              <a:rPr lang="en-US" smtClean="0"/>
+              <a:rPr lang="en-US"/>
               <a:t>Click to edit Master text styles</a:t>
             </a:r>
           </a:p>
@@ -2255,7 +2254,7 @@
           <a:p>
             <a:fld id="{1D5FC7BF-D5F9-4CD9-BD2A-D1C9342DD0BF}" type="datetimeFigureOut">
               <a:rPr lang="en-US" smtClean="0"/>
-              <a:t>10/20/2016</a:t>
+              <a:t>10/23/2016</a:t>
             </a:fld>
             <a:endParaRPr lang="en-US"/>
           </a:p>
@@ -2358,10 +2357,9 @@
           </a:lstStyle>
           <a:p>
             <a:r>
-              <a:rPr lang="en-US" smtClean="0"/>
+              <a:rPr lang="en-US"/>
               <a:t>Click to edit Master title style</a:t>
             </a:r>
-            <a:endParaRPr lang="en-US"/>
           </a:p>
         </p:txBody>
       </p:sp>
@@ -2485,7 +2483,7 @@
           <a:p>
             <a:pPr lvl="0"/>
             <a:r>
-              <a:rPr lang="en-US" smtClean="0"/>
+              <a:rPr lang="en-US"/>
               <a:t>Click to edit Master text styles</a:t>
             </a:r>
           </a:p>
@@ -2508,7 +2506,7 @@
           <a:p>
             <a:fld id="{1D5FC7BF-D5F9-4CD9-BD2A-D1C9342DD0BF}" type="datetimeFigureOut">
               <a:rPr lang="en-US" smtClean="0"/>
-              <a:t>10/20/2016</a:t>
+              <a:t>10/23/2016</a:t>
             </a:fld>
             <a:endParaRPr lang="en-US"/>
           </a:p>
@@ -2617,10 +2615,9 @@
           <a:lstStyle/>
           <a:p>
             <a:r>
-              <a:rPr lang="en-US" smtClean="0"/>
+              <a:rPr lang="en-US"/>
               <a:t>Click to edit Master title style</a:t>
             </a:r>
-            <a:endParaRPr lang="en-US"/>
           </a:p>
         </p:txBody>
       </p:sp>
@@ -2651,38 +2648,37 @@
           <a:p>
             <a:pPr lvl="0"/>
             <a:r>
-              <a:rPr lang="en-US" smtClean="0"/>
+              <a:rPr lang="en-US"/>
               <a:t>Click to edit Master text styles</a:t>
             </a:r>
           </a:p>
           <a:p>
             <a:pPr lvl="1"/>
             <a:r>
-              <a:rPr lang="en-US" smtClean="0"/>
+              <a:rPr lang="en-US"/>
               <a:t>Second level</a:t>
             </a:r>
           </a:p>
           <a:p>
             <a:pPr lvl="2"/>
             <a:r>
-              <a:rPr lang="en-US" smtClean="0"/>
+              <a:rPr lang="en-US"/>
               <a:t>Third level</a:t>
             </a:r>
           </a:p>
           <a:p>
             <a:pPr lvl="3"/>
             <a:r>
-              <a:rPr lang="en-US" smtClean="0"/>
+              <a:rPr lang="en-US"/>
               <a:t>Fourth level</a:t>
             </a:r>
           </a:p>
           <a:p>
             <a:pPr lvl="4"/>
             <a:r>
-              <a:rPr lang="en-US" smtClean="0"/>
+              <a:rPr lang="en-US"/>
               <a:t>Fifth level</a:t>
             </a:r>
-            <a:endParaRPr lang="en-US"/>
           </a:p>
         </p:txBody>
       </p:sp>
@@ -2721,7 +2717,7 @@
           <a:p>
             <a:fld id="{1D5FC7BF-D5F9-4CD9-BD2A-D1C9342DD0BF}" type="datetimeFigureOut">
               <a:rPr lang="en-US" smtClean="0"/>
-              <a:t>10/20/2016</a:t>
+              <a:t>10/23/2016</a:t>
             </a:fld>
             <a:endParaRPr lang="en-US"/>
           </a:p>
@@ -4238,10 +4234,9 @@
                 <a:lstStyle/>
                 <a:p>
                   <a:r>
-                    <a:rPr lang="en-US" dirty="0" smtClean="0"/>
+                    <a:rPr lang="en-US" dirty="0"/>
                     <a:t>Rodded CP</a:t>
                   </a:r>
-                  <a:endParaRPr lang="en-US" dirty="0"/>
                 </a:p>
               </p:txBody>
             </p:sp>
@@ -4268,10 +4263,9 @@
                 <a:lstStyle/>
                 <a:p>
                   <a:r>
-                    <a:rPr lang="en-US" dirty="0" smtClean="0"/>
+                    <a:rPr lang="en-US" dirty="0"/>
                     <a:t>Unrodded CP</a:t>
                   </a:r>
-                  <a:endParaRPr lang="en-US" dirty="0"/>
                 </a:p>
               </p:txBody>
             </p:sp>
@@ -4399,7 +4393,7 @@
                               <m:sSubSupPr>
                                 <m:ctrlPr>
                                   <a:rPr lang="en-US" i="1">
-                                    <a:latin typeface="Cambria Math"/>
+                                    <a:latin typeface="Cambria Math" panose="02040503050406030204" pitchFamily="18" charset="0"/>
                                   </a:rPr>
                                 </m:ctrlPr>
                               </m:sSubSupPr>
@@ -4513,7 +4507,7 @@
                               <m:sSubSupPr>
                                 <m:ctrlPr>
                                   <a:rPr lang="en-US" i="1" smtClean="0">
-                                    <a:latin typeface="Cambria Math"/>
+                                    <a:latin typeface="Cambria Math" panose="02040503050406030204" pitchFamily="18" charset="0"/>
                                   </a:rPr>
                                 </m:ctrlPr>
                               </m:sSubSupPr>
@@ -4756,7 +4750,7 @@
               <a:lstStyle/>
               <a:p>
                 <a:r>
-                  <a:rPr lang="en-US" sz="1200" dirty="0" smtClean="0"/>
+                  <a:rPr lang="en-US" sz="1200" dirty="0"/>
                   <a:t>Moderator</a:t>
                 </a:r>
                 <a:endParaRPr lang="en-US" dirty="0"/>
@@ -4786,7 +4780,7 @@
               <a:lstStyle/>
               <a:p>
                 <a:r>
-                  <a:rPr lang="en-US" sz="1200" dirty="0" smtClean="0"/>
+                  <a:rPr lang="en-US" sz="1200" dirty="0"/>
                   <a:t>Buffer</a:t>
                 </a:r>
                 <a:endParaRPr lang="en-US" dirty="0"/>
@@ -4816,7 +4810,7 @@
               <a:lstStyle/>
               <a:p>
                 <a:r>
-                  <a:rPr lang="en-US" sz="1200" dirty="0" smtClean="0"/>
+                  <a:rPr lang="en-US" sz="1200" dirty="0"/>
                   <a:t>Control Rod</a:t>
                 </a:r>
                 <a:endParaRPr lang="en-US" dirty="0"/>
@@ -4951,7 +4945,7 @@
               <a:lstStyle/>
               <a:p>
                 <a:r>
-                  <a:rPr lang="en-US" sz="1200" dirty="0" smtClean="0"/>
+                  <a:rPr lang="en-US" sz="1200" dirty="0"/>
                   <a:t>Moderator</a:t>
                 </a:r>
                 <a:endParaRPr lang="en-US" dirty="0"/>
@@ -4981,7 +4975,7 @@
               <a:lstStyle/>
               <a:p>
                 <a:r>
-                  <a:rPr lang="en-US" sz="1200" dirty="0" smtClean="0"/>
+                  <a:rPr lang="en-US" sz="1200" dirty="0"/>
                   <a:t>Buffer</a:t>
                 </a:r>
                 <a:endParaRPr lang="en-US" dirty="0"/>
@@ -5018,7 +5012,7 @@
                         <m:sSubSupPr>
                           <m:ctrlPr>
                             <a:rPr lang="en-US" i="1">
-                              <a:latin typeface="Cambria Math"/>
+                              <a:latin typeface="Cambria Math" panose="02040503050406030204" pitchFamily="18" charset="0"/>
                             </a:rPr>
                           </m:ctrlPr>
                         </m:sSubSupPr>
@@ -5053,10 +5047,9 @@
                     </m:oMath>
                   </a14:m>
                   <a:r>
-                    <a:rPr lang="en-US" dirty="0" smtClean="0"/>
+                    <a:rPr lang="en-US" dirty="0"/>
                     <a:t>(r)</a:t>
                   </a:r>
-                  <a:endParaRPr lang="en-US" dirty="0"/>
                 </a:p>
               </p:txBody>
             </p:sp>
@@ -5129,7 +5122,7 @@
                         <m:sSubSupPr>
                           <m:ctrlPr>
                             <a:rPr lang="en-US" i="1" smtClean="0">
-                              <a:latin typeface="Cambria Math"/>
+                              <a:latin typeface="Cambria Math" panose="02040503050406030204" pitchFamily="18" charset="0"/>
                             </a:rPr>
                           </m:ctrlPr>
                         </m:sSubSupPr>
@@ -5164,10 +5157,9 @@
                     </m:oMath>
                   </a14:m>
                   <a:r>
-                    <a:rPr lang="en-US" dirty="0" smtClean="0"/>
+                    <a:rPr lang="en-US" dirty="0"/>
                     <a:t>(r)</a:t>
                   </a:r>
-                  <a:endParaRPr lang="en-US" dirty="0"/>
                 </a:p>
               </p:txBody>
             </p:sp>
@@ -5639,8 +5631,8 @@
             </a:p>
           </p:txBody>
         </p:sp>
-        <mc:AlternateContent xmlns:mc="http://schemas.openxmlformats.org/markup-compatibility/2006">
-          <mc:Choice xmlns:a14="http://schemas.microsoft.com/office/drawing/2010/main" Requires="a14">
+        <mc:AlternateContent xmlns:mc="http://schemas.openxmlformats.org/markup-compatibility/2006" xmlns:a14="http://schemas.microsoft.com/office/drawing/2010/main">
+          <mc:Choice Requires="a14">
             <p:sp>
               <p:nvSpPr>
                 <p:cNvPr id="21" name="TextBox 20"/>
@@ -5663,6 +5655,7 @@
                 </a:bodyPr>
                 <a:lstStyle/>
                 <a:p>
+                  <a:pPr/>
                   <a14:m>
                     <m:oMathPara xmlns:m="http://schemas.openxmlformats.org/officeDocument/2006/math">
                       <m:oMathParaPr>
@@ -5673,7 +5666,7 @@
                           <m:sSubPr>
                             <m:ctrlPr>
                               <a:rPr lang="en-US" i="1" smtClean="0">
-                                <a:latin typeface="Cambria Math"/>
+                                <a:latin typeface="Cambria Math" panose="02040503050406030204" pitchFamily="18" charset="0"/>
                               </a:rPr>
                             </m:ctrlPr>
                           </m:sSubPr>
@@ -5702,7 +5695,7 @@
               </p:txBody>
             </p:sp>
           </mc:Choice>
-          <mc:Fallback>
+          <mc:Fallback xmlns="">
             <p:sp>
               <p:nvSpPr>
                 <p:cNvPr id="21" name="TextBox 20"/>
@@ -5741,8 +5734,8 @@
             </p:sp>
           </mc:Fallback>
         </mc:AlternateContent>
-        <mc:AlternateContent xmlns:mc="http://schemas.openxmlformats.org/markup-compatibility/2006">
-          <mc:Choice xmlns:a14="http://schemas.microsoft.com/office/drawing/2010/main" Requires="a14">
+        <mc:AlternateContent xmlns:mc="http://schemas.openxmlformats.org/markup-compatibility/2006" xmlns:a14="http://schemas.microsoft.com/office/drawing/2010/main">
+          <mc:Choice Requires="a14">
             <p:sp>
               <p:nvSpPr>
                 <p:cNvPr id="22" name="TextBox 21"/>
@@ -5765,6 +5758,7 @@
                 </a:bodyPr>
                 <a:lstStyle/>
                 <a:p>
+                  <a:pPr/>
                   <a14:m>
                     <m:oMathPara xmlns:m="http://schemas.openxmlformats.org/officeDocument/2006/math">
                       <m:oMathParaPr>
@@ -5775,7 +5769,7 @@
                           <m:sSubPr>
                             <m:ctrlPr>
                               <a:rPr lang="en-US" i="1" smtClean="0">
-                                <a:latin typeface="Cambria Math"/>
+                                <a:latin typeface="Cambria Math" panose="02040503050406030204" pitchFamily="18" charset="0"/>
                               </a:rPr>
                             </m:ctrlPr>
                           </m:sSubPr>
@@ -5810,7 +5804,7 @@
               </p:txBody>
             </p:sp>
           </mc:Choice>
-          <mc:Fallback>
+          <mc:Fallback xmlns="">
             <p:sp>
               <p:nvSpPr>
                 <p:cNvPr id="22" name="TextBox 21"/>
@@ -5849,8 +5843,8 @@
             </p:sp>
           </mc:Fallback>
         </mc:AlternateContent>
-        <mc:AlternateContent xmlns:mc="http://schemas.openxmlformats.org/markup-compatibility/2006">
-          <mc:Choice xmlns:a14="http://schemas.microsoft.com/office/drawing/2010/main" Requires="a14">
+        <mc:AlternateContent xmlns:mc="http://schemas.openxmlformats.org/markup-compatibility/2006" xmlns:a14="http://schemas.microsoft.com/office/drawing/2010/main">
+          <mc:Choice Requires="a14">
             <p:sp>
               <p:nvSpPr>
                 <p:cNvPr id="23" name="TextBox 22"/>
@@ -5873,6 +5867,7 @@
                 </a:bodyPr>
                 <a:lstStyle/>
                 <a:p>
+                  <a:pPr/>
                   <a14:m>
                     <m:oMathPara xmlns:m="http://schemas.openxmlformats.org/officeDocument/2006/math">
                       <m:oMathParaPr>
@@ -5883,7 +5878,7 @@
                           <m:sSubPr>
                             <m:ctrlPr>
                               <a:rPr lang="en-US" i="1" smtClean="0">
-                                <a:latin typeface="Cambria Math"/>
+                                <a:latin typeface="Cambria Math" panose="02040503050406030204" pitchFamily="18" charset="0"/>
                               </a:rPr>
                             </m:ctrlPr>
                           </m:sSubPr>
@@ -5918,7 +5913,7 @@
               </p:txBody>
             </p:sp>
           </mc:Choice>
-          <mc:Fallback>
+          <mc:Fallback xmlns="">
             <p:sp>
               <p:nvSpPr>
                 <p:cNvPr id="23" name="TextBox 22"/>
@@ -5957,8 +5952,8 @@
             </p:sp>
           </mc:Fallback>
         </mc:AlternateContent>
-        <mc:AlternateContent xmlns:mc="http://schemas.openxmlformats.org/markup-compatibility/2006">
-          <mc:Choice xmlns:a14="http://schemas.microsoft.com/office/drawing/2010/main" Requires="a14">
+        <mc:AlternateContent xmlns:mc="http://schemas.openxmlformats.org/markup-compatibility/2006" xmlns:a14="http://schemas.microsoft.com/office/drawing/2010/main">
+          <mc:Choice Requires="a14">
             <p:sp>
               <p:nvSpPr>
                 <p:cNvPr id="24" name="TextBox 23"/>
@@ -5981,6 +5976,7 @@
                 </a:bodyPr>
                 <a:lstStyle/>
                 <a:p>
+                  <a:pPr/>
                   <a14:m>
                     <m:oMathPara xmlns:m="http://schemas.openxmlformats.org/officeDocument/2006/math">
                       <m:oMathParaPr>
@@ -5991,7 +5987,7 @@
                           <m:sSubPr>
                             <m:ctrlPr>
                               <a:rPr lang="en-US" i="1" smtClean="0">
-                                <a:latin typeface="Cambria Math"/>
+                                <a:latin typeface="Cambria Math" panose="02040503050406030204" pitchFamily="18" charset="0"/>
                               </a:rPr>
                             </m:ctrlPr>
                           </m:sSubPr>
@@ -6020,7 +6016,7 @@
               </p:txBody>
             </p:sp>
           </mc:Choice>
-          <mc:Fallback>
+          <mc:Fallback xmlns="">
             <p:sp>
               <p:nvSpPr>
                 <p:cNvPr id="24" name="TextBox 23"/>
@@ -6059,8 +6055,8 @@
             </p:sp>
           </mc:Fallback>
         </mc:AlternateContent>
-        <mc:AlternateContent xmlns:mc="http://schemas.openxmlformats.org/markup-compatibility/2006">
-          <mc:Choice xmlns:a14="http://schemas.microsoft.com/office/drawing/2010/main" Requires="a14">
+        <mc:AlternateContent xmlns:mc="http://schemas.openxmlformats.org/markup-compatibility/2006" xmlns:a14="http://schemas.microsoft.com/office/drawing/2010/main">
+          <mc:Choice Requires="a14">
             <p:sp>
               <p:nvSpPr>
                 <p:cNvPr id="25" name="TextBox 24"/>
@@ -6083,6 +6079,7 @@
                 </a:bodyPr>
                 <a:lstStyle/>
                 <a:p>
+                  <a:pPr/>
                   <a14:m>
                     <m:oMathPara xmlns:m="http://schemas.openxmlformats.org/officeDocument/2006/math">
                       <m:oMathParaPr>
@@ -6093,7 +6090,7 @@
                           <m:sSubPr>
                             <m:ctrlPr>
                               <a:rPr lang="en-US" i="1" smtClean="0">
-                                <a:latin typeface="Cambria Math"/>
+                                <a:latin typeface="Cambria Math" panose="02040503050406030204" pitchFamily="18" charset="0"/>
                               </a:rPr>
                             </m:ctrlPr>
                           </m:sSubPr>
@@ -6122,7 +6119,7 @@
               </p:txBody>
             </p:sp>
           </mc:Choice>
-          <mc:Fallback>
+          <mc:Fallback xmlns="">
             <p:sp>
               <p:nvSpPr>
                 <p:cNvPr id="25" name="TextBox 24"/>
@@ -6161,8 +6158,8 @@
             </p:sp>
           </mc:Fallback>
         </mc:AlternateContent>
-        <mc:AlternateContent xmlns:mc="http://schemas.openxmlformats.org/markup-compatibility/2006">
-          <mc:Choice xmlns:a14="http://schemas.microsoft.com/office/drawing/2010/main" Requires="a14">
+        <mc:AlternateContent xmlns:mc="http://schemas.openxmlformats.org/markup-compatibility/2006" xmlns:a14="http://schemas.microsoft.com/office/drawing/2010/main">
+          <mc:Choice Requires="a14">
             <p:sp>
               <p:nvSpPr>
                 <p:cNvPr id="26" name="TextBox 25"/>
@@ -6185,6 +6182,7 @@
                 </a:bodyPr>
                 <a:lstStyle/>
                 <a:p>
+                  <a:pPr/>
                   <a14:m>
                     <m:oMathPara xmlns:m="http://schemas.openxmlformats.org/officeDocument/2006/math">
                       <m:oMathParaPr>
@@ -6195,7 +6193,7 @@
                           <m:sSubPr>
                             <m:ctrlPr>
                               <a:rPr lang="en-US" i="1" smtClean="0">
-                                <a:latin typeface="Cambria Math"/>
+                                <a:latin typeface="Cambria Math" panose="02040503050406030204" pitchFamily="18" charset="0"/>
                               </a:rPr>
                             </m:ctrlPr>
                           </m:sSubPr>
@@ -6224,7 +6222,7 @@
               </p:txBody>
             </p:sp>
           </mc:Choice>
-          <mc:Fallback>
+          <mc:Fallback xmlns="">
             <p:sp>
               <p:nvSpPr>
                 <p:cNvPr id="26" name="TextBox 25"/>
@@ -6374,10 +6372,9 @@
             <a:lstStyle/>
             <a:p>
               <a:r>
-                <a:rPr lang="en-US" dirty="0" smtClean="0"/>
+                <a:rPr lang="en-US" dirty="0"/>
                 <a:t>Group G</a:t>
               </a:r>
-              <a:endParaRPr lang="en-US" dirty="0"/>
             </a:p>
           </p:txBody>
         </p:sp>
@@ -6404,10 +6401,9 @@
             <a:lstStyle/>
             <a:p>
               <a:r>
-                <a:rPr lang="en-US" dirty="0" smtClean="0"/>
+                <a:rPr lang="en-US" dirty="0"/>
                 <a:t>Group 1</a:t>
               </a:r>
-              <a:endParaRPr lang="en-US" dirty="0"/>
             </a:p>
           </p:txBody>
         </p:sp>
@@ -6416,6 +6412,1117 @@
     <p:extLst>
       <p:ext uri="{BB962C8B-B14F-4D97-AF65-F5344CB8AC3E}">
         <p14:creationId xmlns:p14="http://schemas.microsoft.com/office/powerpoint/2010/main" val="653629455"/>
+      </p:ext>
+    </p:extLst>
+  </p:cSld>
+  <p:clrMapOvr>
+    <a:masterClrMapping/>
+  </p:clrMapOvr>
+</p:sld>
+</file>
+
+<file path=ppt/slides/slide3.xml><?xml version="1.0" encoding="utf-8"?>
+<p:sld xmlns:a="http://schemas.openxmlformats.org/drawingml/2006/main" xmlns:r="http://schemas.openxmlformats.org/officeDocument/2006/relationships" xmlns:p="http://schemas.openxmlformats.org/presentationml/2006/main">
+  <p:cSld>
+    <p:spTree>
+      <p:nvGrpSpPr>
+        <p:cNvPr id="1" name=""/>
+        <p:cNvGrpSpPr/>
+        <p:nvPr/>
+      </p:nvGrpSpPr>
+      <p:grpSpPr>
+        <a:xfrm>
+          <a:off x="0" y="0"/>
+          <a:ext cx="0" cy="0"/>
+          <a:chOff x="0" y="0"/>
+          <a:chExt cx="0" cy="0"/>
+        </a:xfrm>
+      </p:grpSpPr>
+      <p:grpSp>
+        <p:nvGrpSpPr>
+          <p:cNvPr id="36" name="Group 35"/>
+          <p:cNvGrpSpPr/>
+          <p:nvPr/>
+        </p:nvGrpSpPr>
+        <p:grpSpPr>
+          <a:xfrm>
+            <a:off x="1143000" y="1066800"/>
+            <a:ext cx="6826404" cy="4198434"/>
+            <a:chOff x="282498" y="1059366"/>
+            <a:chExt cx="6826404" cy="4198434"/>
+          </a:xfrm>
+        </p:grpSpPr>
+        <p:cxnSp>
+          <p:nvCxnSpPr>
+            <p:cNvPr id="5" name="Straight Connector 4"/>
+            <p:cNvCxnSpPr/>
+            <p:nvPr/>
+          </p:nvCxnSpPr>
+          <p:spPr>
+            <a:xfrm>
+              <a:off x="304800" y="1066800"/>
+              <a:ext cx="0" cy="4191000"/>
+            </a:xfrm>
+            <a:prstGeom prst="line">
+              <a:avLst/>
+            </a:prstGeom>
+            <a:ln w="22225">
+              <a:solidFill>
+                <a:schemeClr val="tx1"/>
+              </a:solidFill>
+            </a:ln>
+          </p:spPr>
+          <p:style>
+            <a:lnRef idx="1">
+              <a:schemeClr val="accent1"/>
+            </a:lnRef>
+            <a:fillRef idx="0">
+              <a:schemeClr val="accent1"/>
+            </a:fillRef>
+            <a:effectRef idx="0">
+              <a:schemeClr val="accent1"/>
+            </a:effectRef>
+            <a:fontRef idx="minor">
+              <a:schemeClr val="tx1"/>
+            </a:fontRef>
+          </p:style>
+        </p:cxnSp>
+        <p:cxnSp>
+          <p:nvCxnSpPr>
+            <p:cNvPr id="6" name="Straight Connector 5"/>
+            <p:cNvCxnSpPr/>
+            <p:nvPr/>
+          </p:nvCxnSpPr>
+          <p:spPr>
+            <a:xfrm>
+              <a:off x="2514600" y="1066800"/>
+              <a:ext cx="0" cy="4191000"/>
+            </a:xfrm>
+            <a:prstGeom prst="line">
+              <a:avLst/>
+            </a:prstGeom>
+            <a:ln w="22225">
+              <a:solidFill>
+                <a:schemeClr val="tx1"/>
+              </a:solidFill>
+            </a:ln>
+          </p:spPr>
+          <p:style>
+            <a:lnRef idx="1">
+              <a:schemeClr val="accent1"/>
+            </a:lnRef>
+            <a:fillRef idx="0">
+              <a:schemeClr val="accent1"/>
+            </a:fillRef>
+            <a:effectRef idx="0">
+              <a:schemeClr val="accent1"/>
+            </a:effectRef>
+            <a:fontRef idx="minor">
+              <a:schemeClr val="tx1"/>
+            </a:fontRef>
+          </p:style>
+        </p:cxnSp>
+        <p:cxnSp>
+          <p:nvCxnSpPr>
+            <p:cNvPr id="7" name="Straight Connector 6"/>
+            <p:cNvCxnSpPr/>
+            <p:nvPr/>
+          </p:nvCxnSpPr>
+          <p:spPr>
+            <a:xfrm>
+              <a:off x="4800600" y="1066800"/>
+              <a:ext cx="0" cy="4191000"/>
+            </a:xfrm>
+            <a:prstGeom prst="line">
+              <a:avLst/>
+            </a:prstGeom>
+            <a:ln w="22225">
+              <a:solidFill>
+                <a:schemeClr val="tx1"/>
+              </a:solidFill>
+            </a:ln>
+          </p:spPr>
+          <p:style>
+            <a:lnRef idx="1">
+              <a:schemeClr val="accent1"/>
+            </a:lnRef>
+            <a:fillRef idx="0">
+              <a:schemeClr val="accent1"/>
+            </a:fillRef>
+            <a:effectRef idx="0">
+              <a:schemeClr val="accent1"/>
+            </a:effectRef>
+            <a:fontRef idx="minor">
+              <a:schemeClr val="tx1"/>
+            </a:fontRef>
+          </p:style>
+        </p:cxnSp>
+        <p:cxnSp>
+          <p:nvCxnSpPr>
+            <p:cNvPr id="8" name="Straight Connector 7"/>
+            <p:cNvCxnSpPr/>
+            <p:nvPr/>
+          </p:nvCxnSpPr>
+          <p:spPr>
+            <a:xfrm>
+              <a:off x="7086600" y="1066800"/>
+              <a:ext cx="0" cy="4191000"/>
+            </a:xfrm>
+            <a:prstGeom prst="line">
+              <a:avLst/>
+            </a:prstGeom>
+            <a:ln w="22225">
+              <a:solidFill>
+                <a:schemeClr val="tx1"/>
+              </a:solidFill>
+            </a:ln>
+          </p:spPr>
+          <p:style>
+            <a:lnRef idx="1">
+              <a:schemeClr val="accent1"/>
+            </a:lnRef>
+            <a:fillRef idx="0">
+              <a:schemeClr val="accent1"/>
+            </a:fillRef>
+            <a:effectRef idx="0">
+              <a:schemeClr val="accent1"/>
+            </a:effectRef>
+            <a:fontRef idx="minor">
+              <a:schemeClr val="tx1"/>
+            </a:fontRef>
+          </p:style>
+        </p:cxnSp>
+        <p:cxnSp>
+          <p:nvCxnSpPr>
+            <p:cNvPr id="9" name="Straight Connector 8"/>
+            <p:cNvCxnSpPr/>
+            <p:nvPr/>
+          </p:nvCxnSpPr>
+          <p:spPr>
+            <a:xfrm>
+              <a:off x="304800" y="1066800"/>
+              <a:ext cx="6804102" cy="0"/>
+            </a:xfrm>
+            <a:prstGeom prst="line">
+              <a:avLst/>
+            </a:prstGeom>
+            <a:ln w="22225">
+              <a:solidFill>
+                <a:schemeClr val="tx1"/>
+              </a:solidFill>
+            </a:ln>
+          </p:spPr>
+          <p:style>
+            <a:lnRef idx="1">
+              <a:schemeClr val="accent1"/>
+            </a:lnRef>
+            <a:fillRef idx="0">
+              <a:schemeClr val="accent1"/>
+            </a:fillRef>
+            <a:effectRef idx="0">
+              <a:schemeClr val="accent1"/>
+            </a:effectRef>
+            <a:fontRef idx="minor">
+              <a:schemeClr val="tx1"/>
+            </a:fontRef>
+          </p:style>
+        </p:cxnSp>
+        <p:cxnSp>
+          <p:nvCxnSpPr>
+            <p:cNvPr id="13" name="Straight Connector 12"/>
+            <p:cNvCxnSpPr/>
+            <p:nvPr/>
+          </p:nvCxnSpPr>
+          <p:spPr>
+            <a:xfrm>
+              <a:off x="304800" y="5257800"/>
+              <a:ext cx="6804102" cy="0"/>
+            </a:xfrm>
+            <a:prstGeom prst="line">
+              <a:avLst/>
+            </a:prstGeom>
+            <a:ln w="22225">
+              <a:solidFill>
+                <a:schemeClr val="tx1"/>
+              </a:solidFill>
+            </a:ln>
+          </p:spPr>
+          <p:style>
+            <a:lnRef idx="1">
+              <a:schemeClr val="accent1"/>
+            </a:lnRef>
+            <a:fillRef idx="0">
+              <a:schemeClr val="accent1"/>
+            </a:fillRef>
+            <a:effectRef idx="0">
+              <a:schemeClr val="accent1"/>
+            </a:effectRef>
+            <a:fontRef idx="minor">
+              <a:schemeClr val="tx1"/>
+            </a:fontRef>
+          </p:style>
+        </p:cxnSp>
+        <p:cxnSp>
+          <p:nvCxnSpPr>
+            <p:cNvPr id="14" name="Straight Connector 13"/>
+            <p:cNvCxnSpPr/>
+            <p:nvPr/>
+          </p:nvCxnSpPr>
+          <p:spPr>
+            <a:xfrm>
+              <a:off x="304800" y="3200400"/>
+              <a:ext cx="6804102" cy="0"/>
+            </a:xfrm>
+            <a:prstGeom prst="line">
+              <a:avLst/>
+            </a:prstGeom>
+            <a:ln w="22225">
+              <a:solidFill>
+                <a:schemeClr val="tx1"/>
+              </a:solidFill>
+              <a:prstDash val="dash"/>
+            </a:ln>
+          </p:spPr>
+          <p:style>
+            <a:lnRef idx="1">
+              <a:schemeClr val="accent1"/>
+            </a:lnRef>
+            <a:fillRef idx="0">
+              <a:schemeClr val="accent1"/>
+            </a:fillRef>
+            <a:effectRef idx="0">
+              <a:schemeClr val="accent1"/>
+            </a:effectRef>
+            <a:fontRef idx="minor">
+              <a:schemeClr val="tx1"/>
+            </a:fontRef>
+          </p:style>
+        </p:cxnSp>
+        <p:cxnSp>
+          <p:nvCxnSpPr>
+            <p:cNvPr id="18" name="Straight Connector 17"/>
+            <p:cNvCxnSpPr/>
+            <p:nvPr/>
+          </p:nvCxnSpPr>
+          <p:spPr>
+            <a:xfrm>
+              <a:off x="2971800" y="3200400"/>
+              <a:ext cx="1447800" cy="0"/>
+            </a:xfrm>
+            <a:prstGeom prst="line">
+              <a:avLst/>
+            </a:prstGeom>
+            <a:ln w="31750">
+              <a:solidFill>
+                <a:schemeClr val="tx1"/>
+              </a:solidFill>
+              <a:prstDash val="solid"/>
+            </a:ln>
+          </p:spPr>
+          <p:style>
+            <a:lnRef idx="1">
+              <a:schemeClr val="accent1"/>
+            </a:lnRef>
+            <a:fillRef idx="0">
+              <a:schemeClr val="accent1"/>
+            </a:fillRef>
+            <a:effectRef idx="0">
+              <a:schemeClr val="accent1"/>
+            </a:effectRef>
+            <a:fontRef idx="minor">
+              <a:schemeClr val="tx1"/>
+            </a:fontRef>
+          </p:style>
+        </p:cxnSp>
+        <p:cxnSp>
+          <p:nvCxnSpPr>
+            <p:cNvPr id="22" name="Straight Connector 21"/>
+            <p:cNvCxnSpPr/>
+            <p:nvPr/>
+          </p:nvCxnSpPr>
+          <p:spPr>
+            <a:xfrm flipV="1">
+              <a:off x="2971800" y="1059366"/>
+              <a:ext cx="0" cy="2133600"/>
+            </a:xfrm>
+            <a:prstGeom prst="line">
+              <a:avLst/>
+            </a:prstGeom>
+            <a:ln w="31750">
+              <a:solidFill>
+                <a:schemeClr val="tx1"/>
+              </a:solidFill>
+              <a:prstDash val="solid"/>
+            </a:ln>
+          </p:spPr>
+          <p:style>
+            <a:lnRef idx="1">
+              <a:schemeClr val="accent1"/>
+            </a:lnRef>
+            <a:fillRef idx="0">
+              <a:schemeClr val="accent1"/>
+            </a:fillRef>
+            <a:effectRef idx="0">
+              <a:schemeClr val="accent1"/>
+            </a:effectRef>
+            <a:fontRef idx="minor">
+              <a:schemeClr val="tx1"/>
+            </a:fontRef>
+          </p:style>
+        </p:cxnSp>
+        <p:cxnSp>
+          <p:nvCxnSpPr>
+            <p:cNvPr id="24" name="Straight Connector 23"/>
+            <p:cNvCxnSpPr/>
+            <p:nvPr/>
+          </p:nvCxnSpPr>
+          <p:spPr>
+            <a:xfrm flipV="1">
+              <a:off x="4419600" y="1066800"/>
+              <a:ext cx="0" cy="2133600"/>
+            </a:xfrm>
+            <a:prstGeom prst="line">
+              <a:avLst/>
+            </a:prstGeom>
+            <a:ln w="31750">
+              <a:solidFill>
+                <a:schemeClr val="tx1"/>
+              </a:solidFill>
+              <a:prstDash val="solid"/>
+            </a:ln>
+          </p:spPr>
+          <p:style>
+            <a:lnRef idx="1">
+              <a:schemeClr val="accent1"/>
+            </a:lnRef>
+            <a:fillRef idx="0">
+              <a:schemeClr val="accent1"/>
+            </a:fillRef>
+            <a:effectRef idx="0">
+              <a:schemeClr val="accent1"/>
+            </a:effectRef>
+            <a:fontRef idx="minor">
+              <a:schemeClr val="tx1"/>
+            </a:fontRef>
+          </p:style>
+        </p:cxnSp>
+        <p:cxnSp>
+          <p:nvCxnSpPr>
+            <p:cNvPr id="28" name="Straight Arrow Connector 27"/>
+            <p:cNvCxnSpPr/>
+            <p:nvPr/>
+          </p:nvCxnSpPr>
+          <p:spPr>
+            <a:xfrm>
+              <a:off x="282498" y="3349080"/>
+              <a:ext cx="2232102" cy="0"/>
+            </a:xfrm>
+            <a:prstGeom prst="straightConnector1">
+              <a:avLst/>
+            </a:prstGeom>
+            <a:ln w="31750">
+              <a:tailEnd type="triangle"/>
+            </a:ln>
+          </p:spPr>
+          <p:style>
+            <a:lnRef idx="1">
+              <a:schemeClr val="accent1"/>
+            </a:lnRef>
+            <a:fillRef idx="0">
+              <a:schemeClr val="accent1"/>
+            </a:fillRef>
+            <a:effectRef idx="0">
+              <a:schemeClr val="accent1"/>
+            </a:effectRef>
+            <a:fontRef idx="minor">
+              <a:schemeClr val="tx1"/>
+            </a:fontRef>
+          </p:style>
+        </p:cxnSp>
+        <p:cxnSp>
+          <p:nvCxnSpPr>
+            <p:cNvPr id="29" name="Straight Arrow Connector 28"/>
+            <p:cNvCxnSpPr/>
+            <p:nvPr/>
+          </p:nvCxnSpPr>
+          <p:spPr>
+            <a:xfrm>
+              <a:off x="2568498" y="3345363"/>
+              <a:ext cx="2232102" cy="0"/>
+            </a:xfrm>
+            <a:prstGeom prst="straightConnector1">
+              <a:avLst/>
+            </a:prstGeom>
+            <a:ln w="31750">
+              <a:prstDash val="dash"/>
+              <a:tailEnd type="triangle"/>
+            </a:ln>
+          </p:spPr>
+          <p:style>
+            <a:lnRef idx="1">
+              <a:schemeClr val="accent1"/>
+            </a:lnRef>
+            <a:fillRef idx="0">
+              <a:schemeClr val="accent1"/>
+            </a:fillRef>
+            <a:effectRef idx="0">
+              <a:schemeClr val="accent1"/>
+            </a:effectRef>
+            <a:fontRef idx="minor">
+              <a:schemeClr val="tx1"/>
+            </a:fontRef>
+          </p:style>
+        </p:cxnSp>
+        <p:cxnSp>
+          <p:nvCxnSpPr>
+            <p:cNvPr id="30" name="Straight Arrow Connector 29"/>
+            <p:cNvCxnSpPr/>
+            <p:nvPr/>
+          </p:nvCxnSpPr>
+          <p:spPr>
+            <a:xfrm>
+              <a:off x="2568498" y="2286000"/>
+              <a:ext cx="2232102" cy="0"/>
+            </a:xfrm>
+            <a:prstGeom prst="straightConnector1">
+              <a:avLst/>
+            </a:prstGeom>
+            <a:ln w="31750">
+              <a:tailEnd type="triangle"/>
+            </a:ln>
+          </p:spPr>
+          <p:style>
+            <a:lnRef idx="1">
+              <a:schemeClr val="accent1"/>
+            </a:lnRef>
+            <a:fillRef idx="0">
+              <a:schemeClr val="accent1"/>
+            </a:fillRef>
+            <a:effectRef idx="0">
+              <a:schemeClr val="accent1"/>
+            </a:effectRef>
+            <a:fontRef idx="minor">
+              <a:schemeClr val="tx1"/>
+            </a:fontRef>
+          </p:style>
+        </p:cxnSp>
+        <p:cxnSp>
+          <p:nvCxnSpPr>
+            <p:cNvPr id="31" name="Straight Arrow Connector 30"/>
+            <p:cNvCxnSpPr/>
+            <p:nvPr/>
+          </p:nvCxnSpPr>
+          <p:spPr>
+            <a:xfrm>
+              <a:off x="2568498" y="4343400"/>
+              <a:ext cx="2232102" cy="0"/>
+            </a:xfrm>
+            <a:prstGeom prst="straightConnector1">
+              <a:avLst/>
+            </a:prstGeom>
+            <a:ln w="31750">
+              <a:tailEnd type="triangle"/>
+            </a:ln>
+          </p:spPr>
+          <p:style>
+            <a:lnRef idx="1">
+              <a:schemeClr val="accent1"/>
+            </a:lnRef>
+            <a:fillRef idx="0">
+              <a:schemeClr val="accent1"/>
+            </a:fillRef>
+            <a:effectRef idx="0">
+              <a:schemeClr val="accent1"/>
+            </a:effectRef>
+            <a:fontRef idx="minor">
+              <a:schemeClr val="tx1"/>
+            </a:fontRef>
+          </p:style>
+        </p:cxnSp>
+        <p:cxnSp>
+          <p:nvCxnSpPr>
+            <p:cNvPr id="32" name="Straight Arrow Connector 31"/>
+            <p:cNvCxnSpPr/>
+            <p:nvPr/>
+          </p:nvCxnSpPr>
+          <p:spPr>
+            <a:xfrm>
+              <a:off x="4854498" y="3345363"/>
+              <a:ext cx="2232102" cy="0"/>
+            </a:xfrm>
+            <a:prstGeom prst="straightConnector1">
+              <a:avLst/>
+            </a:prstGeom>
+            <a:ln w="31750">
+              <a:tailEnd type="triangle"/>
+            </a:ln>
+          </p:spPr>
+          <p:style>
+            <a:lnRef idx="1">
+              <a:schemeClr val="accent1"/>
+            </a:lnRef>
+            <a:fillRef idx="0">
+              <a:schemeClr val="accent1"/>
+            </a:fillRef>
+            <a:effectRef idx="0">
+              <a:schemeClr val="accent1"/>
+            </a:effectRef>
+            <a:fontRef idx="minor">
+              <a:schemeClr val="tx1"/>
+            </a:fontRef>
+          </p:style>
+        </p:cxnSp>
+        <mc:AlternateContent xmlns:mc="http://schemas.openxmlformats.org/markup-compatibility/2006">
+          <mc:Choice xmlns:a14="http://schemas.microsoft.com/office/drawing/2010/main" Requires="a14">
+            <p:sp>
+              <p:nvSpPr>
+                <p:cNvPr id="33" name="TextBox 32"/>
+                <p:cNvSpPr txBox="1"/>
+                <p:nvPr/>
+              </p:nvSpPr>
+              <p:spPr>
+                <a:xfrm>
+                  <a:off x="3161291" y="1864039"/>
+                  <a:ext cx="1068818" cy="276999"/>
+                </a:xfrm>
+                <a:prstGeom prst="rect">
+                  <a:avLst/>
+                </a:prstGeom>
+                <a:noFill/>
+              </p:spPr>
+              <p:txBody>
+                <a:bodyPr wrap="none" lIns="0" tIns="0" rIns="0" bIns="0" rtlCol="0">
+                  <a:spAutoFit/>
+                </a:bodyPr>
+                <a:lstStyle/>
+                <a:p>
+                  <a14:m>
+                    <m:oMathPara xmlns:m="http://schemas.openxmlformats.org/officeDocument/2006/math">
+                      <m:oMathParaPr>
+                        <m:jc m:val="centerGroup"/>
+                      </m:oMathParaPr>
+                      <m:oMath xmlns:m="http://schemas.openxmlformats.org/officeDocument/2006/math">
+                        <m:sSup>
+                          <m:sSupPr>
+                            <m:ctrlPr>
+                              <a:rPr lang="en-US" i="1" smtClean="0">
+                                <a:latin typeface="Cambria Math" panose="02040503050406030204" pitchFamily="18" charset="0"/>
+                              </a:rPr>
+                            </m:ctrlPr>
+                          </m:sSupPr>
+                          <m:e>
+                            <m:r>
+                              <a:rPr lang="en-US" i="1" smtClean="0">
+                                <a:latin typeface="Cambria Math" panose="02040503050406030204" pitchFamily="18" charset="0"/>
+                                <a:ea typeface="Cambria Math" panose="02040503050406030204" pitchFamily="18" charset="0"/>
+                              </a:rPr>
+                              <m:t>𝜓</m:t>
+                            </m:r>
+                          </m:e>
+                          <m:sup>
+                            <m:r>
+                              <a:rPr lang="en-US" b="0" i="1" smtClean="0">
+                                <a:latin typeface="Cambria Math" panose="02040503050406030204" pitchFamily="18" charset="0"/>
+                              </a:rPr>
+                              <m:t>𝑅</m:t>
+                            </m:r>
+                          </m:sup>
+                        </m:sSup>
+                        <m:r>
+                          <a:rPr lang="en-US" b="0" i="1" smtClean="0">
+                            <a:latin typeface="Cambria Math" panose="02040503050406030204" pitchFamily="18" charset="0"/>
+                          </a:rPr>
+                          <m:t>,</m:t>
+                        </m:r>
+                        <m:sSup>
+                          <m:sSupPr>
+                            <m:ctrlPr>
+                              <a:rPr lang="en-US" b="0" i="1" smtClean="0">
+                                <a:latin typeface="Cambria Math" panose="02040503050406030204" pitchFamily="18" charset="0"/>
+                              </a:rPr>
+                            </m:ctrlPr>
+                          </m:sSupPr>
+                          <m:e>
+                            <m:r>
+                              <m:rPr>
+                                <m:sty m:val="p"/>
+                              </m:rPr>
+                              <a:rPr lang="el-GR" b="0" i="1" smtClean="0">
+                                <a:latin typeface="Cambria Math" panose="02040503050406030204" pitchFamily="18" charset="0"/>
+                                <a:ea typeface="Cambria Math" panose="02040503050406030204" pitchFamily="18" charset="0"/>
+                              </a:rPr>
+                              <m:t>Σ</m:t>
+                            </m:r>
+                          </m:e>
+                          <m:sup>
+                            <m:r>
+                              <a:rPr lang="en-US" b="0" i="1" smtClean="0">
+                                <a:latin typeface="Cambria Math" panose="02040503050406030204" pitchFamily="18" charset="0"/>
+                              </a:rPr>
+                              <m:t>𝑅</m:t>
+                            </m:r>
+                          </m:sup>
+                        </m:sSup>
+                        <m:r>
+                          <a:rPr lang="en-US" b="0" i="1" smtClean="0">
+                            <a:latin typeface="Cambria Math" panose="02040503050406030204" pitchFamily="18" charset="0"/>
+                          </a:rPr>
+                          <m:t>,</m:t>
+                        </m:r>
+                        <m:sSup>
+                          <m:sSupPr>
+                            <m:ctrlPr>
+                              <a:rPr lang="en-US" b="0" i="1" smtClean="0">
+                                <a:latin typeface="Cambria Math" panose="02040503050406030204" pitchFamily="18" charset="0"/>
+                              </a:rPr>
+                            </m:ctrlPr>
+                          </m:sSupPr>
+                          <m:e>
+                            <m:r>
+                              <a:rPr lang="en-US" b="0" i="1" smtClean="0">
+                                <a:latin typeface="Cambria Math" panose="02040503050406030204" pitchFamily="18" charset="0"/>
+                              </a:rPr>
+                              <m:t>𝑄</m:t>
+                            </m:r>
+                          </m:e>
+                          <m:sup>
+                            <m:r>
+                              <a:rPr lang="en-US" b="0" i="1" smtClean="0">
+                                <a:latin typeface="Cambria Math" panose="02040503050406030204" pitchFamily="18" charset="0"/>
+                              </a:rPr>
+                              <m:t>𝑅</m:t>
+                            </m:r>
+                          </m:sup>
+                        </m:sSup>
+                      </m:oMath>
+                    </m:oMathPara>
+                  </a14:m>
+                  <a:endParaRPr lang="en-US" dirty="0"/>
+                </a:p>
+              </p:txBody>
+            </p:sp>
+          </mc:Choice>
+          <mc:Fallback>
+            <p:sp>
+              <p:nvSpPr>
+                <p:cNvPr id="33" name="TextBox 32"/>
+                <p:cNvSpPr txBox="1">
+                  <a:spLocks noRot="1" noChangeAspect="1" noMove="1" noResize="1" noEditPoints="1" noAdjustHandles="1" noChangeArrowheads="1" noChangeShapeType="1" noTextEdit="1"/>
+                </p:cNvSpPr>
+                <p:nvPr/>
+              </p:nvSpPr>
+              <p:spPr>
+                <a:xfrm>
+                  <a:off x="3161291" y="1864039"/>
+                  <a:ext cx="1068818" cy="276999"/>
+                </a:xfrm>
+                <a:prstGeom prst="rect">
+                  <a:avLst/>
+                </a:prstGeom>
+                <a:blipFill>
+                  <a:blip r:embed="rId2"/>
+                  <a:stretch>
+                    <a:fillRect l="-7429" t="-4444" r="-1143" b="-35556"/>
+                  </a:stretch>
+                </a:blipFill>
+              </p:spPr>
+              <p:txBody>
+                <a:bodyPr/>
+                <a:lstStyle/>
+                <a:p>
+                  <a:r>
+                    <a:rPr lang="en-US">
+                      <a:noFill/>
+                    </a:rPr>
+                    <a:t> </a:t>
+                  </a:r>
+                </a:p>
+              </p:txBody>
+            </p:sp>
+          </mc:Fallback>
+        </mc:AlternateContent>
+        <mc:AlternateContent xmlns:mc="http://schemas.openxmlformats.org/markup-compatibility/2006">
+          <mc:Choice xmlns:a14="http://schemas.microsoft.com/office/drawing/2010/main" Requires="a14">
+            <p:sp>
+              <p:nvSpPr>
+                <p:cNvPr id="34" name="TextBox 33"/>
+                <p:cNvSpPr txBox="1"/>
+                <p:nvPr/>
+              </p:nvSpPr>
+              <p:spPr>
+                <a:xfrm>
+                  <a:off x="3123191" y="4419600"/>
+                  <a:ext cx="1100173" cy="276999"/>
+                </a:xfrm>
+                <a:prstGeom prst="rect">
+                  <a:avLst/>
+                </a:prstGeom>
+                <a:noFill/>
+              </p:spPr>
+              <p:txBody>
+                <a:bodyPr wrap="none" lIns="0" tIns="0" rIns="0" bIns="0" rtlCol="0">
+                  <a:spAutoFit/>
+                </a:bodyPr>
+                <a:lstStyle/>
+                <a:p>
+                  <a14:m>
+                    <m:oMathPara xmlns:m="http://schemas.openxmlformats.org/officeDocument/2006/math">
+                      <m:oMathParaPr>
+                        <m:jc m:val="centerGroup"/>
+                      </m:oMathParaPr>
+                      <m:oMath xmlns:m="http://schemas.openxmlformats.org/officeDocument/2006/math">
+                        <m:sSup>
+                          <m:sSupPr>
+                            <m:ctrlPr>
+                              <a:rPr lang="en-US" i="1" smtClean="0">
+                                <a:latin typeface="Cambria Math" panose="02040503050406030204" pitchFamily="18" charset="0"/>
+                              </a:rPr>
+                            </m:ctrlPr>
+                          </m:sSupPr>
+                          <m:e>
+                            <m:r>
+                              <a:rPr lang="en-US" i="1" smtClean="0">
+                                <a:latin typeface="Cambria Math" panose="02040503050406030204" pitchFamily="18" charset="0"/>
+                                <a:ea typeface="Cambria Math" panose="02040503050406030204" pitchFamily="18" charset="0"/>
+                              </a:rPr>
+                              <m:t>𝜓</m:t>
+                            </m:r>
+                          </m:e>
+                          <m:sup>
+                            <m:r>
+                              <a:rPr lang="en-US" b="0" i="1" smtClean="0">
+                                <a:latin typeface="Cambria Math" panose="02040503050406030204" pitchFamily="18" charset="0"/>
+                              </a:rPr>
+                              <m:t>𝑈</m:t>
+                            </m:r>
+                          </m:sup>
+                        </m:sSup>
+                        <m:r>
+                          <a:rPr lang="en-US" b="0" i="1" smtClean="0">
+                            <a:latin typeface="Cambria Math" panose="02040503050406030204" pitchFamily="18" charset="0"/>
+                          </a:rPr>
+                          <m:t>,</m:t>
+                        </m:r>
+                        <m:sSup>
+                          <m:sSupPr>
+                            <m:ctrlPr>
+                              <a:rPr lang="en-US" b="0" i="1" smtClean="0">
+                                <a:latin typeface="Cambria Math" panose="02040503050406030204" pitchFamily="18" charset="0"/>
+                              </a:rPr>
+                            </m:ctrlPr>
+                          </m:sSupPr>
+                          <m:e>
+                            <m:r>
+                              <m:rPr>
+                                <m:sty m:val="p"/>
+                              </m:rPr>
+                              <a:rPr lang="el-GR" b="0" i="1" smtClean="0">
+                                <a:latin typeface="Cambria Math" panose="02040503050406030204" pitchFamily="18" charset="0"/>
+                                <a:ea typeface="Cambria Math" panose="02040503050406030204" pitchFamily="18" charset="0"/>
+                              </a:rPr>
+                              <m:t>Σ</m:t>
+                            </m:r>
+                          </m:e>
+                          <m:sup>
+                            <m:r>
+                              <a:rPr lang="en-US" b="0" i="1" smtClean="0">
+                                <a:latin typeface="Cambria Math" panose="02040503050406030204" pitchFamily="18" charset="0"/>
+                              </a:rPr>
+                              <m:t>𝑈</m:t>
+                            </m:r>
+                          </m:sup>
+                        </m:sSup>
+                        <m:r>
+                          <a:rPr lang="en-US" b="0" i="1" smtClean="0">
+                            <a:latin typeface="Cambria Math" panose="02040503050406030204" pitchFamily="18" charset="0"/>
+                          </a:rPr>
+                          <m:t>,</m:t>
+                        </m:r>
+                        <m:sSup>
+                          <m:sSupPr>
+                            <m:ctrlPr>
+                              <a:rPr lang="en-US" b="0" i="1" smtClean="0">
+                                <a:latin typeface="Cambria Math" panose="02040503050406030204" pitchFamily="18" charset="0"/>
+                              </a:rPr>
+                            </m:ctrlPr>
+                          </m:sSupPr>
+                          <m:e>
+                            <m:r>
+                              <a:rPr lang="en-US" b="0" i="1" smtClean="0">
+                                <a:latin typeface="Cambria Math" panose="02040503050406030204" pitchFamily="18" charset="0"/>
+                              </a:rPr>
+                              <m:t>𝑄</m:t>
+                            </m:r>
+                          </m:e>
+                          <m:sup>
+                            <m:r>
+                              <a:rPr lang="en-US" b="0" i="1" smtClean="0">
+                                <a:latin typeface="Cambria Math" panose="02040503050406030204" pitchFamily="18" charset="0"/>
+                              </a:rPr>
+                              <m:t>𝑈</m:t>
+                            </m:r>
+                          </m:sup>
+                        </m:sSup>
+                      </m:oMath>
+                    </m:oMathPara>
+                  </a14:m>
+                  <a:endParaRPr lang="en-US" dirty="0"/>
+                </a:p>
+              </p:txBody>
+            </p:sp>
+          </mc:Choice>
+          <mc:Fallback>
+            <p:sp>
+              <p:nvSpPr>
+                <p:cNvPr id="34" name="TextBox 33"/>
+                <p:cNvSpPr txBox="1">
+                  <a:spLocks noRot="1" noChangeAspect="1" noMove="1" noResize="1" noEditPoints="1" noAdjustHandles="1" noChangeArrowheads="1" noChangeShapeType="1" noTextEdit="1"/>
+                </p:cNvSpPr>
+                <p:nvPr/>
+              </p:nvSpPr>
+              <p:spPr>
+                <a:xfrm>
+                  <a:off x="3123191" y="4419600"/>
+                  <a:ext cx="1100173" cy="276999"/>
+                </a:xfrm>
+                <a:prstGeom prst="rect">
+                  <a:avLst/>
+                </a:prstGeom>
+                <a:blipFill>
+                  <a:blip r:embed="rId3"/>
+                  <a:stretch>
+                    <a:fillRect l="-7182" t="-4348" r="-1657" b="-32609"/>
+                  </a:stretch>
+                </a:blipFill>
+              </p:spPr>
+              <p:txBody>
+                <a:bodyPr/>
+                <a:lstStyle/>
+                <a:p>
+                  <a:r>
+                    <a:rPr lang="en-US">
+                      <a:noFill/>
+                    </a:rPr>
+                    <a:t> </a:t>
+                  </a:r>
+                </a:p>
+              </p:txBody>
+            </p:sp>
+          </mc:Fallback>
+        </mc:AlternateContent>
+        <mc:AlternateContent xmlns:mc="http://schemas.openxmlformats.org/markup-compatibility/2006">
+          <mc:Choice xmlns:a14="http://schemas.microsoft.com/office/drawing/2010/main" Requires="a14">
+            <p:sp>
+              <p:nvSpPr>
+                <p:cNvPr id="35" name="TextBox 34"/>
+                <p:cNvSpPr txBox="1"/>
+                <p:nvPr/>
+              </p:nvSpPr>
+              <p:spPr>
+                <a:xfrm>
+                  <a:off x="2851745" y="3442547"/>
+                  <a:ext cx="1710212" cy="279885"/>
+                </a:xfrm>
+                <a:prstGeom prst="rect">
+                  <a:avLst/>
+                </a:prstGeom>
+                <a:noFill/>
+              </p:spPr>
+              <p:txBody>
+                <a:bodyPr wrap="none" lIns="0" tIns="0" rIns="0" bIns="0" rtlCol="0">
+                  <a:spAutoFit/>
+                </a:bodyPr>
+                <a:lstStyle/>
+                <a:p>
+                  <a14:m>
+                    <m:oMath xmlns:m="http://schemas.openxmlformats.org/officeDocument/2006/math">
+                      <m:acc>
+                        <m:accPr>
+                          <m:chr m:val="̅"/>
+                          <m:ctrlPr>
+                            <a:rPr lang="en-US" i="1" smtClean="0">
+                              <a:latin typeface="Cambria Math" panose="02040503050406030204" pitchFamily="18" charset="0"/>
+                            </a:rPr>
+                          </m:ctrlPr>
+                        </m:accPr>
+                        <m:e>
+                          <m:r>
+                            <a:rPr lang="en-US" i="1" smtClean="0">
+                              <a:latin typeface="Cambria Math" panose="02040503050406030204" pitchFamily="18" charset="0"/>
+                              <a:ea typeface="Cambria Math" panose="02040503050406030204" pitchFamily="18" charset="0"/>
+                            </a:rPr>
+                            <m:t>𝜓</m:t>
+                          </m:r>
+                        </m:e>
+                      </m:acc>
+                      <m:r>
+                        <a:rPr lang="en-US" b="0" i="1" smtClean="0">
+                          <a:latin typeface="Cambria Math" panose="02040503050406030204" pitchFamily="18" charset="0"/>
+                        </a:rPr>
+                        <m:t>=</m:t>
+                      </m:r>
+                      <m:sSup>
+                        <m:sSupPr>
+                          <m:ctrlPr>
+                            <a:rPr lang="en-US" i="1">
+                              <a:latin typeface="Cambria Math" panose="02040503050406030204" pitchFamily="18" charset="0"/>
+                            </a:rPr>
+                          </m:ctrlPr>
+                        </m:sSupPr>
+                        <m:e>
+                          <m:r>
+                            <a:rPr lang="en-US" i="1">
+                              <a:latin typeface="Cambria Math" panose="02040503050406030204" pitchFamily="18" charset="0"/>
+                            </a:rPr>
+                            <m:t>h</m:t>
+                          </m:r>
+                        </m:e>
+                        <m:sup>
+                          <m:r>
+                            <a:rPr lang="en-US" i="1">
+                              <a:latin typeface="Cambria Math" panose="02040503050406030204" pitchFamily="18" charset="0"/>
+                            </a:rPr>
+                            <m:t>𝑅</m:t>
+                          </m:r>
+                        </m:sup>
+                      </m:sSup>
+                      <m:sSup>
+                        <m:sSupPr>
+                          <m:ctrlPr>
+                            <a:rPr lang="en-US" i="1">
+                              <a:latin typeface="Cambria Math" panose="02040503050406030204" pitchFamily="18" charset="0"/>
+                            </a:rPr>
+                          </m:ctrlPr>
+                        </m:sSupPr>
+                        <m:e>
+                          <m:r>
+                            <a:rPr lang="en-US" i="1">
+                              <a:latin typeface="Cambria Math" panose="02040503050406030204" pitchFamily="18" charset="0"/>
+                              <a:ea typeface="Cambria Math" panose="02040503050406030204" pitchFamily="18" charset="0"/>
+                            </a:rPr>
+                            <m:t>𝜓</m:t>
+                          </m:r>
+                        </m:e>
+                        <m:sup>
+                          <m:r>
+                            <a:rPr lang="en-US" i="1">
+                              <a:latin typeface="Cambria Math" panose="02040503050406030204" pitchFamily="18" charset="0"/>
+                            </a:rPr>
+                            <m:t>𝑅</m:t>
+                          </m:r>
+                        </m:sup>
+                      </m:sSup>
+                    </m:oMath>
+                  </a14:m>
+                  <a:r>
+                    <a:rPr lang="en-US" dirty="0"/>
+                    <a:t>+</a:t>
+                  </a:r>
+                  <a14:m>
+                    <m:oMath xmlns:m="http://schemas.openxmlformats.org/officeDocument/2006/math">
+                      <m:sSup>
+                        <m:sSupPr>
+                          <m:ctrlPr>
+                            <a:rPr lang="en-US" i="1">
+                              <a:latin typeface="Cambria Math" panose="02040503050406030204" pitchFamily="18" charset="0"/>
+                            </a:rPr>
+                          </m:ctrlPr>
+                        </m:sSupPr>
+                        <m:e>
+                          <m:r>
+                            <a:rPr lang="en-US" i="1">
+                              <a:latin typeface="Cambria Math" panose="02040503050406030204" pitchFamily="18" charset="0"/>
+                            </a:rPr>
+                            <m:t>h</m:t>
+                          </m:r>
+                        </m:e>
+                        <m:sup>
+                          <m:r>
+                            <a:rPr lang="en-US" b="0" i="1" smtClean="0">
+                              <a:latin typeface="Cambria Math" panose="02040503050406030204" pitchFamily="18" charset="0"/>
+                            </a:rPr>
+                            <m:t>𝑈</m:t>
+                          </m:r>
+                        </m:sup>
+                      </m:sSup>
+                      <m:sSup>
+                        <m:sSupPr>
+                          <m:ctrlPr>
+                            <a:rPr lang="en-US" i="1">
+                              <a:latin typeface="Cambria Math" panose="02040503050406030204" pitchFamily="18" charset="0"/>
+                            </a:rPr>
+                          </m:ctrlPr>
+                        </m:sSupPr>
+                        <m:e>
+                          <m:r>
+                            <a:rPr lang="en-US" i="1">
+                              <a:latin typeface="Cambria Math" panose="02040503050406030204" pitchFamily="18" charset="0"/>
+                              <a:ea typeface="Cambria Math" panose="02040503050406030204" pitchFamily="18" charset="0"/>
+                            </a:rPr>
+                            <m:t>𝜓</m:t>
+                          </m:r>
+                        </m:e>
+                        <m:sup>
+                          <m:r>
+                            <a:rPr lang="en-US" b="0" i="1" smtClean="0">
+                              <a:latin typeface="Cambria Math" panose="02040503050406030204" pitchFamily="18" charset="0"/>
+                              <a:ea typeface="Cambria Math" panose="02040503050406030204" pitchFamily="18" charset="0"/>
+                            </a:rPr>
+                            <m:t>𝑈</m:t>
+                          </m:r>
+                        </m:sup>
+                      </m:sSup>
+                    </m:oMath>
+                  </a14:m>
+                  <a:endParaRPr lang="en-US" dirty="0"/>
+                </a:p>
+              </p:txBody>
+            </p:sp>
+          </mc:Choice>
+          <mc:Fallback>
+            <p:sp>
+              <p:nvSpPr>
+                <p:cNvPr id="35" name="TextBox 34"/>
+                <p:cNvSpPr txBox="1">
+                  <a:spLocks noRot="1" noChangeAspect="1" noMove="1" noResize="1" noEditPoints="1" noAdjustHandles="1" noChangeArrowheads="1" noChangeShapeType="1" noTextEdit="1"/>
+                </p:cNvSpPr>
+                <p:nvPr/>
+              </p:nvSpPr>
+              <p:spPr>
+                <a:xfrm>
+                  <a:off x="2851745" y="3442547"/>
+                  <a:ext cx="1710212" cy="279885"/>
+                </a:xfrm>
+                <a:prstGeom prst="rect">
+                  <a:avLst/>
+                </a:prstGeom>
+                <a:blipFill>
+                  <a:blip r:embed="rId4"/>
+                  <a:stretch>
+                    <a:fillRect l="-6406" t="-26087" r="-1779" b="-50000"/>
+                  </a:stretch>
+                </a:blipFill>
+              </p:spPr>
+              <p:txBody>
+                <a:bodyPr/>
+                <a:lstStyle/>
+                <a:p>
+                  <a:r>
+                    <a:rPr lang="en-US">
+                      <a:noFill/>
+                    </a:rPr>
+                    <a:t> </a:t>
+                  </a:r>
+                </a:p>
+              </p:txBody>
+            </p:sp>
+          </mc:Fallback>
+        </mc:AlternateContent>
+      </p:grpSp>
+    </p:spTree>
+    <p:extLst>
+      <p:ext uri="{BB962C8B-B14F-4D97-AF65-F5344CB8AC3E}">
+        <p14:creationId xmlns:p14="http://schemas.microsoft.com/office/powerpoint/2010/main" val="1528627210"/>
       </p:ext>
     </p:extLst>
   </p:cSld>

</xml_diff>

<commit_message>
Add rod insertion figures to show next to my 1D MOC results
</commit_message>
<xml_diff>
--- a/Miscellaneous/Presentation1.pptx
+++ b/Miscellaneous/Presentation1.pptx
@@ -8,6 +8,9 @@
     <p:sldId id="257" r:id="rId2"/>
     <p:sldId id="258" r:id="rId3"/>
     <p:sldId id="259" r:id="rId4"/>
+    <p:sldId id="260" r:id="rId5"/>
+    <p:sldId id="261" r:id="rId6"/>
+    <p:sldId id="262" r:id="rId7"/>
   </p:sldIdLst>
   <p:sldSz cx="9144000" cy="6858000" type="screen4x3"/>
   <p:notesSz cx="6858000" cy="9144000"/>
@@ -304,7 +307,7 @@
           <a:p>
             <a:fld id="{1D5FC7BF-D5F9-4CD9-BD2A-D1C9342DD0BF}" type="datetimeFigureOut">
               <a:rPr lang="en-US" smtClean="0"/>
-              <a:t>10/23/2016</a:t>
+              <a:t>10/25/2016</a:t>
             </a:fld>
             <a:endParaRPr lang="en-US"/>
           </a:p>
@@ -472,7 +475,7 @@
           <a:p>
             <a:fld id="{1D5FC7BF-D5F9-4CD9-BD2A-D1C9342DD0BF}" type="datetimeFigureOut">
               <a:rPr lang="en-US" smtClean="0"/>
-              <a:t>10/23/2016</a:t>
+              <a:t>10/25/2016</a:t>
             </a:fld>
             <a:endParaRPr lang="en-US"/>
           </a:p>
@@ -650,7 +653,7 @@
           <a:p>
             <a:fld id="{1D5FC7BF-D5F9-4CD9-BD2A-D1C9342DD0BF}" type="datetimeFigureOut">
               <a:rPr lang="en-US" smtClean="0"/>
-              <a:t>10/23/2016</a:t>
+              <a:t>10/25/2016</a:t>
             </a:fld>
             <a:endParaRPr lang="en-US"/>
           </a:p>
@@ -818,7 +821,7 @@
           <a:p>
             <a:fld id="{1D5FC7BF-D5F9-4CD9-BD2A-D1C9342DD0BF}" type="datetimeFigureOut">
               <a:rPr lang="en-US" smtClean="0"/>
-              <a:t>10/23/2016</a:t>
+              <a:t>10/25/2016</a:t>
             </a:fld>
             <a:endParaRPr lang="en-US"/>
           </a:p>
@@ -1063,7 +1066,7 @@
           <a:p>
             <a:fld id="{1D5FC7BF-D5F9-4CD9-BD2A-D1C9342DD0BF}" type="datetimeFigureOut">
               <a:rPr lang="en-US" smtClean="0"/>
-              <a:t>10/23/2016</a:t>
+              <a:t>10/25/2016</a:t>
             </a:fld>
             <a:endParaRPr lang="en-US"/>
           </a:p>
@@ -1348,7 +1351,7 @@
           <a:p>
             <a:fld id="{1D5FC7BF-D5F9-4CD9-BD2A-D1C9342DD0BF}" type="datetimeFigureOut">
               <a:rPr lang="en-US" smtClean="0"/>
-              <a:t>10/23/2016</a:t>
+              <a:t>10/25/2016</a:t>
             </a:fld>
             <a:endParaRPr lang="en-US"/>
           </a:p>
@@ -1767,7 +1770,7 @@
           <a:p>
             <a:fld id="{1D5FC7BF-D5F9-4CD9-BD2A-D1C9342DD0BF}" type="datetimeFigureOut">
               <a:rPr lang="en-US" smtClean="0"/>
-              <a:t>10/23/2016</a:t>
+              <a:t>10/25/2016</a:t>
             </a:fld>
             <a:endParaRPr lang="en-US"/>
           </a:p>
@@ -1884,7 +1887,7 @@
           <a:p>
             <a:fld id="{1D5FC7BF-D5F9-4CD9-BD2A-D1C9342DD0BF}" type="datetimeFigureOut">
               <a:rPr lang="en-US" smtClean="0"/>
-              <a:t>10/23/2016</a:t>
+              <a:t>10/25/2016</a:t>
             </a:fld>
             <a:endParaRPr lang="en-US"/>
           </a:p>
@@ -1979,7 +1982,7 @@
           <a:p>
             <a:fld id="{1D5FC7BF-D5F9-4CD9-BD2A-D1C9342DD0BF}" type="datetimeFigureOut">
               <a:rPr lang="en-US" smtClean="0"/>
-              <a:t>10/23/2016</a:t>
+              <a:t>10/25/2016</a:t>
             </a:fld>
             <a:endParaRPr lang="en-US"/>
           </a:p>
@@ -2254,7 +2257,7 @@
           <a:p>
             <a:fld id="{1D5FC7BF-D5F9-4CD9-BD2A-D1C9342DD0BF}" type="datetimeFigureOut">
               <a:rPr lang="en-US" smtClean="0"/>
-              <a:t>10/23/2016</a:t>
+              <a:t>10/25/2016</a:t>
             </a:fld>
             <a:endParaRPr lang="en-US"/>
           </a:p>
@@ -2506,7 +2509,7 @@
           <a:p>
             <a:fld id="{1D5FC7BF-D5F9-4CD9-BD2A-D1C9342DD0BF}" type="datetimeFigureOut">
               <a:rPr lang="en-US" smtClean="0"/>
-              <a:t>10/23/2016</a:t>
+              <a:t>10/25/2016</a:t>
             </a:fld>
             <a:endParaRPr lang="en-US"/>
           </a:p>
@@ -2717,7 +2720,7 @@
           <a:p>
             <a:fld id="{1D5FC7BF-D5F9-4CD9-BD2A-D1C9342DD0BF}" type="datetimeFigureOut">
               <a:rPr lang="en-US" smtClean="0"/>
-              <a:t>10/23/2016</a:t>
+              <a:t>10/25/2016</a:t>
             </a:fld>
             <a:endParaRPr lang="en-US"/>
           </a:p>
@@ -6972,8 +6975,8 @@
             </a:fontRef>
           </p:style>
         </p:cxnSp>
-        <mc:AlternateContent xmlns:mc="http://schemas.openxmlformats.org/markup-compatibility/2006">
-          <mc:Choice xmlns:a14="http://schemas.microsoft.com/office/drawing/2010/main" Requires="a14">
+        <mc:AlternateContent xmlns:mc="http://schemas.openxmlformats.org/markup-compatibility/2006" xmlns:a14="http://schemas.microsoft.com/office/drawing/2010/main">
+          <mc:Choice Requires="a14">
             <p:sp>
               <p:nvSpPr>
                 <p:cNvPr id="33" name="TextBox 32"/>
@@ -6996,6 +6999,7 @@
                 </a:bodyPr>
                 <a:lstStyle/>
                 <a:p>
+                  <a:pPr/>
                   <a14:m>
                     <m:oMathPara xmlns:m="http://schemas.openxmlformats.org/officeDocument/2006/math">
                       <m:oMathParaPr>
@@ -7102,7 +7106,7 @@
               </p:txBody>
             </p:sp>
           </mc:Choice>
-          <mc:Fallback>
+          <mc:Fallback xmlns="">
             <p:sp>
               <p:nvSpPr>
                 <p:cNvPr id="33" name="TextBox 32"/>
@@ -7141,8 +7145,8 @@
             </p:sp>
           </mc:Fallback>
         </mc:AlternateContent>
-        <mc:AlternateContent xmlns:mc="http://schemas.openxmlformats.org/markup-compatibility/2006">
-          <mc:Choice xmlns:a14="http://schemas.microsoft.com/office/drawing/2010/main" Requires="a14">
+        <mc:AlternateContent xmlns:mc="http://schemas.openxmlformats.org/markup-compatibility/2006" xmlns:a14="http://schemas.microsoft.com/office/drawing/2010/main">
+          <mc:Choice Requires="a14">
             <p:sp>
               <p:nvSpPr>
                 <p:cNvPr id="34" name="TextBox 33"/>
@@ -7165,6 +7169,7 @@
                 </a:bodyPr>
                 <a:lstStyle/>
                 <a:p>
+                  <a:pPr/>
                   <a14:m>
                     <m:oMathPara xmlns:m="http://schemas.openxmlformats.org/officeDocument/2006/math">
                       <m:oMathParaPr>
@@ -7271,7 +7276,7 @@
               </p:txBody>
             </p:sp>
           </mc:Choice>
-          <mc:Fallback>
+          <mc:Fallback xmlns="">
             <p:sp>
               <p:nvSpPr>
                 <p:cNvPr id="34" name="TextBox 33"/>
@@ -7310,8 +7315,8 @@
             </p:sp>
           </mc:Fallback>
         </mc:AlternateContent>
-        <mc:AlternateContent xmlns:mc="http://schemas.openxmlformats.org/markup-compatibility/2006">
-          <mc:Choice xmlns:a14="http://schemas.microsoft.com/office/drawing/2010/main" Requires="a14">
+        <mc:AlternateContent xmlns:mc="http://schemas.openxmlformats.org/markup-compatibility/2006" xmlns:a14="http://schemas.microsoft.com/office/drawing/2010/main">
+          <mc:Choice Requires="a14">
             <p:sp>
               <p:nvSpPr>
                 <p:cNvPr id="35" name="TextBox 34"/>
@@ -7479,7 +7484,7 @@
               </p:txBody>
             </p:sp>
           </mc:Choice>
-          <mc:Fallback>
+          <mc:Fallback xmlns="">
             <p:sp>
               <p:nvSpPr>
                 <p:cNvPr id="35" name="TextBox 34"/>
@@ -7523,6 +7528,1038 @@
     <p:extLst>
       <p:ext uri="{BB962C8B-B14F-4D97-AF65-F5344CB8AC3E}">
         <p14:creationId xmlns:p14="http://schemas.microsoft.com/office/powerpoint/2010/main" val="1528627210"/>
+      </p:ext>
+    </p:extLst>
+  </p:cSld>
+  <p:clrMapOvr>
+    <a:masterClrMapping/>
+  </p:clrMapOvr>
+</p:sld>
+</file>
+
+<file path=ppt/slides/slide4.xml><?xml version="1.0" encoding="utf-8"?>
+<p:sld xmlns:a="http://schemas.openxmlformats.org/drawingml/2006/main" xmlns:r="http://schemas.openxmlformats.org/officeDocument/2006/relationships" xmlns:p="http://schemas.openxmlformats.org/presentationml/2006/main">
+  <p:cSld>
+    <p:spTree>
+      <p:nvGrpSpPr>
+        <p:cNvPr id="1" name=""/>
+        <p:cNvGrpSpPr/>
+        <p:nvPr/>
+      </p:nvGrpSpPr>
+      <p:grpSpPr>
+        <a:xfrm>
+          <a:off x="0" y="0"/>
+          <a:ext cx="0" cy="0"/>
+          <a:chOff x="0" y="0"/>
+          <a:chExt cx="0" cy="0"/>
+        </a:xfrm>
+      </p:grpSpPr>
+      <p:grpSp>
+        <p:nvGrpSpPr>
+          <p:cNvPr id="15" name="Group 14"/>
+          <p:cNvGrpSpPr/>
+          <p:nvPr/>
+        </p:nvGrpSpPr>
+        <p:grpSpPr>
+          <a:xfrm>
+            <a:off x="3048000" y="1066800"/>
+            <a:ext cx="2322386" cy="3276600"/>
+            <a:chOff x="3048000" y="1066800"/>
+            <a:chExt cx="2322386" cy="3276600"/>
+          </a:xfrm>
+        </p:grpSpPr>
+        <p:cxnSp>
+          <p:nvCxnSpPr>
+            <p:cNvPr id="5" name="Straight Connector 4"/>
+            <p:cNvCxnSpPr/>
+            <p:nvPr/>
+          </p:nvCxnSpPr>
+          <p:spPr>
+            <a:xfrm>
+              <a:off x="3048000" y="2057400"/>
+              <a:ext cx="2286000" cy="0"/>
+            </a:xfrm>
+            <a:prstGeom prst="line">
+              <a:avLst/>
+            </a:prstGeom>
+            <a:ln w="28575">
+              <a:solidFill>
+                <a:schemeClr val="tx1"/>
+              </a:solidFill>
+            </a:ln>
+          </p:spPr>
+          <p:style>
+            <a:lnRef idx="1">
+              <a:schemeClr val="accent1"/>
+            </a:lnRef>
+            <a:fillRef idx="0">
+              <a:schemeClr val="accent1"/>
+            </a:fillRef>
+            <a:effectRef idx="0">
+              <a:schemeClr val="accent1"/>
+            </a:effectRef>
+            <a:fontRef idx="minor">
+              <a:schemeClr val="tx1"/>
+            </a:fontRef>
+          </p:style>
+        </p:cxnSp>
+        <p:cxnSp>
+          <p:nvCxnSpPr>
+            <p:cNvPr id="6" name="Straight Connector 5"/>
+            <p:cNvCxnSpPr/>
+            <p:nvPr/>
+          </p:nvCxnSpPr>
+          <p:spPr>
+            <a:xfrm>
+              <a:off x="3048000" y="4343400"/>
+              <a:ext cx="2286000" cy="0"/>
+            </a:xfrm>
+            <a:prstGeom prst="line">
+              <a:avLst/>
+            </a:prstGeom>
+            <a:ln w="28575">
+              <a:solidFill>
+                <a:schemeClr val="tx1"/>
+              </a:solidFill>
+            </a:ln>
+          </p:spPr>
+          <p:style>
+            <a:lnRef idx="1">
+              <a:schemeClr val="accent1"/>
+            </a:lnRef>
+            <a:fillRef idx="0">
+              <a:schemeClr val="accent1"/>
+            </a:fillRef>
+            <a:effectRef idx="0">
+              <a:schemeClr val="accent1"/>
+            </a:effectRef>
+            <a:fontRef idx="minor">
+              <a:schemeClr val="tx1"/>
+            </a:fontRef>
+          </p:style>
+        </p:cxnSp>
+        <p:sp>
+          <p:nvSpPr>
+            <p:cNvPr id="9" name="Rectangle 8"/>
+            <p:cNvSpPr/>
+            <p:nvPr/>
+          </p:nvSpPr>
+          <p:spPr>
+            <a:xfrm>
+              <a:off x="3581400" y="1066800"/>
+              <a:ext cx="1295400" cy="990600"/>
+            </a:xfrm>
+            <a:prstGeom prst="rect">
+              <a:avLst/>
+            </a:prstGeom>
+            <a:solidFill>
+              <a:schemeClr val="accent2"/>
+            </a:solidFill>
+            <a:ln>
+              <a:noFill/>
+            </a:ln>
+          </p:spPr>
+          <p:style>
+            <a:lnRef idx="2">
+              <a:schemeClr val="accent1">
+                <a:shade val="50000"/>
+              </a:schemeClr>
+            </a:lnRef>
+            <a:fillRef idx="1">
+              <a:schemeClr val="accent1"/>
+            </a:fillRef>
+            <a:effectRef idx="0">
+              <a:schemeClr val="accent1"/>
+            </a:effectRef>
+            <a:fontRef idx="minor">
+              <a:schemeClr val="lt1"/>
+            </a:fontRef>
+          </p:style>
+          <p:txBody>
+            <a:bodyPr rtlCol="0" anchor="ctr"/>
+            <a:lstStyle/>
+            <a:p>
+              <a:pPr algn="ctr"/>
+              <a:endParaRPr lang="en-US"/>
+            </a:p>
+          </p:txBody>
+        </p:sp>
+        <p:sp>
+          <p:nvSpPr>
+            <p:cNvPr id="10" name="Down Arrow 9"/>
+            <p:cNvSpPr/>
+            <p:nvPr/>
+          </p:nvSpPr>
+          <p:spPr>
+            <a:xfrm>
+              <a:off x="4038600" y="1066800"/>
+              <a:ext cx="381000" cy="1600200"/>
+            </a:xfrm>
+            <a:prstGeom prst="downArrow">
+              <a:avLst/>
+            </a:prstGeom>
+            <a:solidFill>
+              <a:schemeClr val="accent2"/>
+            </a:solidFill>
+            <a:ln>
+              <a:noFill/>
+            </a:ln>
+          </p:spPr>
+          <p:style>
+            <a:lnRef idx="2">
+              <a:schemeClr val="accent1">
+                <a:shade val="50000"/>
+              </a:schemeClr>
+            </a:lnRef>
+            <a:fillRef idx="1">
+              <a:schemeClr val="accent1"/>
+            </a:fillRef>
+            <a:effectRef idx="0">
+              <a:schemeClr val="accent1"/>
+            </a:effectRef>
+            <a:fontRef idx="minor">
+              <a:schemeClr val="lt1"/>
+            </a:fontRef>
+          </p:style>
+          <p:txBody>
+            <a:bodyPr rtlCol="0" anchor="ctr"/>
+            <a:lstStyle/>
+            <a:p>
+              <a:pPr algn="ctr"/>
+              <a:endParaRPr lang="en-US"/>
+            </a:p>
+          </p:txBody>
+        </p:sp>
+        <p:cxnSp>
+          <p:nvCxnSpPr>
+            <p:cNvPr id="11" name="Straight Connector 10"/>
+            <p:cNvCxnSpPr/>
+            <p:nvPr/>
+          </p:nvCxnSpPr>
+          <p:spPr>
+            <a:xfrm>
+              <a:off x="3048000" y="3200400"/>
+              <a:ext cx="2286000" cy="0"/>
+            </a:xfrm>
+            <a:prstGeom prst="line">
+              <a:avLst/>
+            </a:prstGeom>
+            <a:ln w="19050">
+              <a:solidFill>
+                <a:schemeClr val="tx1"/>
+              </a:solidFill>
+              <a:prstDash val="dash"/>
+            </a:ln>
+          </p:spPr>
+          <p:style>
+            <a:lnRef idx="1">
+              <a:schemeClr val="accent1"/>
+            </a:lnRef>
+            <a:fillRef idx="0">
+              <a:schemeClr val="accent1"/>
+            </a:fillRef>
+            <a:effectRef idx="0">
+              <a:schemeClr val="accent1"/>
+            </a:effectRef>
+            <a:fontRef idx="minor">
+              <a:schemeClr val="tx1"/>
+            </a:fontRef>
+          </p:style>
+        </p:cxnSp>
+        <p:cxnSp>
+          <p:nvCxnSpPr>
+            <p:cNvPr id="12" name="Straight Connector 11"/>
+            <p:cNvCxnSpPr/>
+            <p:nvPr/>
+          </p:nvCxnSpPr>
+          <p:spPr>
+            <a:xfrm>
+              <a:off x="3048000" y="3792416"/>
+              <a:ext cx="2286000" cy="0"/>
+            </a:xfrm>
+            <a:prstGeom prst="line">
+              <a:avLst/>
+            </a:prstGeom>
+            <a:ln w="19050">
+              <a:solidFill>
+                <a:schemeClr val="tx1"/>
+              </a:solidFill>
+              <a:prstDash val="dash"/>
+            </a:ln>
+          </p:spPr>
+          <p:style>
+            <a:lnRef idx="1">
+              <a:schemeClr val="accent1"/>
+            </a:lnRef>
+            <a:fillRef idx="0">
+              <a:schemeClr val="accent1"/>
+            </a:fillRef>
+            <a:effectRef idx="0">
+              <a:schemeClr val="accent1"/>
+            </a:effectRef>
+            <a:fontRef idx="minor">
+              <a:schemeClr val="tx1"/>
+            </a:fontRef>
+          </p:style>
+        </p:cxnSp>
+        <p:cxnSp>
+          <p:nvCxnSpPr>
+            <p:cNvPr id="13" name="Straight Connector 12"/>
+            <p:cNvCxnSpPr/>
+            <p:nvPr/>
+          </p:nvCxnSpPr>
+          <p:spPr>
+            <a:xfrm>
+              <a:off x="3048000" y="2667000"/>
+              <a:ext cx="2286000" cy="0"/>
+            </a:xfrm>
+            <a:prstGeom prst="line">
+              <a:avLst/>
+            </a:prstGeom>
+            <a:ln w="19050">
+              <a:solidFill>
+                <a:schemeClr val="tx1"/>
+              </a:solidFill>
+              <a:prstDash val="dash"/>
+            </a:ln>
+          </p:spPr>
+          <p:style>
+            <a:lnRef idx="1">
+              <a:schemeClr val="accent1"/>
+            </a:lnRef>
+            <a:fillRef idx="0">
+              <a:schemeClr val="accent1"/>
+            </a:fillRef>
+            <a:effectRef idx="0">
+              <a:schemeClr val="accent1"/>
+            </a:effectRef>
+            <a:fontRef idx="minor">
+              <a:schemeClr val="tx1"/>
+            </a:fontRef>
+          </p:style>
+        </p:cxnSp>
+        <p:sp>
+          <p:nvSpPr>
+            <p:cNvPr id="14" name="TextBox 13"/>
+            <p:cNvSpPr txBox="1"/>
+            <p:nvPr/>
+          </p:nvSpPr>
+          <p:spPr>
+            <a:xfrm>
+              <a:off x="4406661" y="2177533"/>
+              <a:ext cx="963725" cy="369332"/>
+            </a:xfrm>
+            <a:prstGeom prst="rect">
+              <a:avLst/>
+            </a:prstGeom>
+            <a:noFill/>
+          </p:spPr>
+          <p:txBody>
+            <a:bodyPr wrap="none" rtlCol="0">
+              <a:spAutoFit/>
+            </a:bodyPr>
+            <a:lstStyle/>
+            <a:p>
+              <a:r>
+                <a:rPr lang="en-US" dirty="0"/>
+                <a:t>25% Ins.</a:t>
+              </a:r>
+            </a:p>
+          </p:txBody>
+        </p:sp>
+      </p:grpSp>
+    </p:spTree>
+    <p:extLst>
+      <p:ext uri="{BB962C8B-B14F-4D97-AF65-F5344CB8AC3E}">
+        <p14:creationId xmlns:p14="http://schemas.microsoft.com/office/powerpoint/2010/main" val="2952105554"/>
+      </p:ext>
+    </p:extLst>
+  </p:cSld>
+  <p:clrMapOvr>
+    <a:masterClrMapping/>
+  </p:clrMapOvr>
+</p:sld>
+</file>
+
+<file path=ppt/slides/slide5.xml><?xml version="1.0" encoding="utf-8"?>
+<p:sld xmlns:a="http://schemas.openxmlformats.org/drawingml/2006/main" xmlns:r="http://schemas.openxmlformats.org/officeDocument/2006/relationships" xmlns:p="http://schemas.openxmlformats.org/presentationml/2006/main">
+  <p:cSld>
+    <p:spTree>
+      <p:nvGrpSpPr>
+        <p:cNvPr id="1" name=""/>
+        <p:cNvGrpSpPr/>
+        <p:nvPr/>
+      </p:nvGrpSpPr>
+      <p:grpSpPr>
+        <a:xfrm>
+          <a:off x="0" y="0"/>
+          <a:ext cx="0" cy="0"/>
+          <a:chOff x="0" y="0"/>
+          <a:chExt cx="0" cy="0"/>
+        </a:xfrm>
+      </p:grpSpPr>
+      <p:grpSp>
+        <p:nvGrpSpPr>
+          <p:cNvPr id="2" name="Group 1"/>
+          <p:cNvGrpSpPr/>
+          <p:nvPr/>
+        </p:nvGrpSpPr>
+        <p:grpSpPr>
+          <a:xfrm>
+            <a:off x="3048000" y="1066800"/>
+            <a:ext cx="2310662" cy="3276600"/>
+            <a:chOff x="3048000" y="1066800"/>
+            <a:chExt cx="2310662" cy="3276600"/>
+          </a:xfrm>
+        </p:grpSpPr>
+        <p:cxnSp>
+          <p:nvCxnSpPr>
+            <p:cNvPr id="5" name="Straight Connector 4"/>
+            <p:cNvCxnSpPr/>
+            <p:nvPr/>
+          </p:nvCxnSpPr>
+          <p:spPr>
+            <a:xfrm>
+              <a:off x="3048000" y="2057400"/>
+              <a:ext cx="2286000" cy="0"/>
+            </a:xfrm>
+            <a:prstGeom prst="line">
+              <a:avLst/>
+            </a:prstGeom>
+            <a:ln w="28575">
+              <a:solidFill>
+                <a:schemeClr val="tx1"/>
+              </a:solidFill>
+            </a:ln>
+          </p:spPr>
+          <p:style>
+            <a:lnRef idx="1">
+              <a:schemeClr val="accent1"/>
+            </a:lnRef>
+            <a:fillRef idx="0">
+              <a:schemeClr val="accent1"/>
+            </a:fillRef>
+            <a:effectRef idx="0">
+              <a:schemeClr val="accent1"/>
+            </a:effectRef>
+            <a:fontRef idx="minor">
+              <a:schemeClr val="tx1"/>
+            </a:fontRef>
+          </p:style>
+        </p:cxnSp>
+        <p:cxnSp>
+          <p:nvCxnSpPr>
+            <p:cNvPr id="6" name="Straight Connector 5"/>
+            <p:cNvCxnSpPr/>
+            <p:nvPr/>
+          </p:nvCxnSpPr>
+          <p:spPr>
+            <a:xfrm>
+              <a:off x="3048000" y="4343400"/>
+              <a:ext cx="2286000" cy="0"/>
+            </a:xfrm>
+            <a:prstGeom prst="line">
+              <a:avLst/>
+            </a:prstGeom>
+            <a:ln w="28575">
+              <a:solidFill>
+                <a:schemeClr val="tx1"/>
+              </a:solidFill>
+            </a:ln>
+          </p:spPr>
+          <p:style>
+            <a:lnRef idx="1">
+              <a:schemeClr val="accent1"/>
+            </a:lnRef>
+            <a:fillRef idx="0">
+              <a:schemeClr val="accent1"/>
+            </a:fillRef>
+            <a:effectRef idx="0">
+              <a:schemeClr val="accent1"/>
+            </a:effectRef>
+            <a:fontRef idx="minor">
+              <a:schemeClr val="tx1"/>
+            </a:fontRef>
+          </p:style>
+        </p:cxnSp>
+        <p:sp>
+          <p:nvSpPr>
+            <p:cNvPr id="9" name="Rectangle 8"/>
+            <p:cNvSpPr/>
+            <p:nvPr/>
+          </p:nvSpPr>
+          <p:spPr>
+            <a:xfrm>
+              <a:off x="3581400" y="1066800"/>
+              <a:ext cx="1295400" cy="990600"/>
+            </a:xfrm>
+            <a:prstGeom prst="rect">
+              <a:avLst/>
+            </a:prstGeom>
+            <a:solidFill>
+              <a:schemeClr val="accent2"/>
+            </a:solidFill>
+            <a:ln>
+              <a:noFill/>
+            </a:ln>
+          </p:spPr>
+          <p:style>
+            <a:lnRef idx="2">
+              <a:schemeClr val="accent1">
+                <a:shade val="50000"/>
+              </a:schemeClr>
+            </a:lnRef>
+            <a:fillRef idx="1">
+              <a:schemeClr val="accent1"/>
+            </a:fillRef>
+            <a:effectRef idx="0">
+              <a:schemeClr val="accent1"/>
+            </a:effectRef>
+            <a:fontRef idx="minor">
+              <a:schemeClr val="lt1"/>
+            </a:fontRef>
+          </p:style>
+          <p:txBody>
+            <a:bodyPr rtlCol="0" anchor="ctr"/>
+            <a:lstStyle/>
+            <a:p>
+              <a:pPr algn="ctr"/>
+              <a:endParaRPr lang="en-US"/>
+            </a:p>
+          </p:txBody>
+        </p:sp>
+        <p:sp>
+          <p:nvSpPr>
+            <p:cNvPr id="10" name="Down Arrow 9"/>
+            <p:cNvSpPr/>
+            <p:nvPr/>
+          </p:nvSpPr>
+          <p:spPr>
+            <a:xfrm>
+              <a:off x="4038600" y="1600200"/>
+              <a:ext cx="381000" cy="1600200"/>
+            </a:xfrm>
+            <a:prstGeom prst="downArrow">
+              <a:avLst/>
+            </a:prstGeom>
+            <a:solidFill>
+              <a:schemeClr val="accent2"/>
+            </a:solidFill>
+            <a:ln>
+              <a:noFill/>
+            </a:ln>
+          </p:spPr>
+          <p:style>
+            <a:lnRef idx="2">
+              <a:schemeClr val="accent1">
+                <a:shade val="50000"/>
+              </a:schemeClr>
+            </a:lnRef>
+            <a:fillRef idx="1">
+              <a:schemeClr val="accent1"/>
+            </a:fillRef>
+            <a:effectRef idx="0">
+              <a:schemeClr val="accent1"/>
+            </a:effectRef>
+            <a:fontRef idx="minor">
+              <a:schemeClr val="lt1"/>
+            </a:fontRef>
+          </p:style>
+          <p:txBody>
+            <a:bodyPr rtlCol="0" anchor="ctr"/>
+            <a:lstStyle/>
+            <a:p>
+              <a:pPr algn="ctr"/>
+              <a:endParaRPr lang="en-US" dirty="0"/>
+            </a:p>
+          </p:txBody>
+        </p:sp>
+        <p:cxnSp>
+          <p:nvCxnSpPr>
+            <p:cNvPr id="11" name="Straight Connector 10"/>
+            <p:cNvCxnSpPr/>
+            <p:nvPr/>
+          </p:nvCxnSpPr>
+          <p:spPr>
+            <a:xfrm>
+              <a:off x="3048000" y="3200400"/>
+              <a:ext cx="2286000" cy="0"/>
+            </a:xfrm>
+            <a:prstGeom prst="line">
+              <a:avLst/>
+            </a:prstGeom>
+            <a:ln w="19050">
+              <a:solidFill>
+                <a:schemeClr val="tx1"/>
+              </a:solidFill>
+              <a:prstDash val="dash"/>
+            </a:ln>
+          </p:spPr>
+          <p:style>
+            <a:lnRef idx="1">
+              <a:schemeClr val="accent1"/>
+            </a:lnRef>
+            <a:fillRef idx="0">
+              <a:schemeClr val="accent1"/>
+            </a:fillRef>
+            <a:effectRef idx="0">
+              <a:schemeClr val="accent1"/>
+            </a:effectRef>
+            <a:fontRef idx="minor">
+              <a:schemeClr val="tx1"/>
+            </a:fontRef>
+          </p:style>
+        </p:cxnSp>
+        <p:cxnSp>
+          <p:nvCxnSpPr>
+            <p:cNvPr id="12" name="Straight Connector 11"/>
+            <p:cNvCxnSpPr/>
+            <p:nvPr/>
+          </p:nvCxnSpPr>
+          <p:spPr>
+            <a:xfrm>
+              <a:off x="3048000" y="3792416"/>
+              <a:ext cx="2286000" cy="0"/>
+            </a:xfrm>
+            <a:prstGeom prst="line">
+              <a:avLst/>
+            </a:prstGeom>
+            <a:ln w="19050">
+              <a:solidFill>
+                <a:schemeClr val="tx1"/>
+              </a:solidFill>
+              <a:prstDash val="dash"/>
+            </a:ln>
+          </p:spPr>
+          <p:style>
+            <a:lnRef idx="1">
+              <a:schemeClr val="accent1"/>
+            </a:lnRef>
+            <a:fillRef idx="0">
+              <a:schemeClr val="accent1"/>
+            </a:fillRef>
+            <a:effectRef idx="0">
+              <a:schemeClr val="accent1"/>
+            </a:effectRef>
+            <a:fontRef idx="minor">
+              <a:schemeClr val="tx1"/>
+            </a:fontRef>
+          </p:style>
+        </p:cxnSp>
+        <p:cxnSp>
+          <p:nvCxnSpPr>
+            <p:cNvPr id="13" name="Straight Connector 12"/>
+            <p:cNvCxnSpPr/>
+            <p:nvPr/>
+          </p:nvCxnSpPr>
+          <p:spPr>
+            <a:xfrm>
+              <a:off x="3048000" y="2667000"/>
+              <a:ext cx="2286000" cy="0"/>
+            </a:xfrm>
+            <a:prstGeom prst="line">
+              <a:avLst/>
+            </a:prstGeom>
+            <a:ln w="19050">
+              <a:solidFill>
+                <a:schemeClr val="tx1"/>
+              </a:solidFill>
+              <a:prstDash val="dash"/>
+            </a:ln>
+          </p:spPr>
+          <p:style>
+            <a:lnRef idx="1">
+              <a:schemeClr val="accent1"/>
+            </a:lnRef>
+            <a:fillRef idx="0">
+              <a:schemeClr val="accent1"/>
+            </a:fillRef>
+            <a:effectRef idx="0">
+              <a:schemeClr val="accent1"/>
+            </a:effectRef>
+            <a:fontRef idx="minor">
+              <a:schemeClr val="tx1"/>
+            </a:fontRef>
+          </p:style>
+        </p:cxnSp>
+        <p:sp>
+          <p:nvSpPr>
+            <p:cNvPr id="14" name="TextBox 13"/>
+            <p:cNvSpPr txBox="1"/>
+            <p:nvPr/>
+          </p:nvSpPr>
+          <p:spPr>
+            <a:xfrm>
+              <a:off x="4394937" y="2749034"/>
+              <a:ext cx="963725" cy="369332"/>
+            </a:xfrm>
+            <a:prstGeom prst="rect">
+              <a:avLst/>
+            </a:prstGeom>
+            <a:noFill/>
+          </p:spPr>
+          <p:txBody>
+            <a:bodyPr wrap="none" rtlCol="0">
+              <a:spAutoFit/>
+            </a:bodyPr>
+            <a:lstStyle/>
+            <a:p>
+              <a:r>
+                <a:rPr lang="en-US" dirty="0"/>
+                <a:t>50% Ins.</a:t>
+              </a:r>
+            </a:p>
+          </p:txBody>
+        </p:sp>
+      </p:grpSp>
+    </p:spTree>
+    <p:extLst>
+      <p:ext uri="{BB962C8B-B14F-4D97-AF65-F5344CB8AC3E}">
+        <p14:creationId xmlns:p14="http://schemas.microsoft.com/office/powerpoint/2010/main" val="2396190475"/>
+      </p:ext>
+    </p:extLst>
+  </p:cSld>
+  <p:clrMapOvr>
+    <a:masterClrMapping/>
+  </p:clrMapOvr>
+</p:sld>
+</file>
+
+<file path=ppt/slides/slide6.xml><?xml version="1.0" encoding="utf-8"?>
+<p:sld xmlns:a="http://schemas.openxmlformats.org/drawingml/2006/main" xmlns:r="http://schemas.openxmlformats.org/officeDocument/2006/relationships" xmlns:p="http://schemas.openxmlformats.org/presentationml/2006/main">
+  <p:cSld>
+    <p:spTree>
+      <p:nvGrpSpPr>
+        <p:cNvPr id="1" name=""/>
+        <p:cNvGrpSpPr/>
+        <p:nvPr/>
+      </p:nvGrpSpPr>
+      <p:grpSpPr>
+        <a:xfrm>
+          <a:off x="0" y="0"/>
+          <a:ext cx="0" cy="0"/>
+          <a:chOff x="0" y="0"/>
+          <a:chExt cx="0" cy="0"/>
+        </a:xfrm>
+      </p:grpSpPr>
+      <p:grpSp>
+        <p:nvGrpSpPr>
+          <p:cNvPr id="2" name="Group 1"/>
+          <p:cNvGrpSpPr/>
+          <p:nvPr/>
+        </p:nvGrpSpPr>
+        <p:grpSpPr>
+          <a:xfrm>
+            <a:off x="3048000" y="1066800"/>
+            <a:ext cx="2313594" cy="3276600"/>
+            <a:chOff x="3048000" y="1066800"/>
+            <a:chExt cx="2313594" cy="3276600"/>
+          </a:xfrm>
+        </p:grpSpPr>
+        <p:cxnSp>
+          <p:nvCxnSpPr>
+            <p:cNvPr id="5" name="Straight Connector 4"/>
+            <p:cNvCxnSpPr/>
+            <p:nvPr/>
+          </p:nvCxnSpPr>
+          <p:spPr>
+            <a:xfrm>
+              <a:off x="3048000" y="2057400"/>
+              <a:ext cx="2286000" cy="0"/>
+            </a:xfrm>
+            <a:prstGeom prst="line">
+              <a:avLst/>
+            </a:prstGeom>
+            <a:ln w="28575">
+              <a:solidFill>
+                <a:schemeClr val="tx1"/>
+              </a:solidFill>
+            </a:ln>
+          </p:spPr>
+          <p:style>
+            <a:lnRef idx="1">
+              <a:schemeClr val="accent1"/>
+            </a:lnRef>
+            <a:fillRef idx="0">
+              <a:schemeClr val="accent1"/>
+            </a:fillRef>
+            <a:effectRef idx="0">
+              <a:schemeClr val="accent1"/>
+            </a:effectRef>
+            <a:fontRef idx="minor">
+              <a:schemeClr val="tx1"/>
+            </a:fontRef>
+          </p:style>
+        </p:cxnSp>
+        <p:cxnSp>
+          <p:nvCxnSpPr>
+            <p:cNvPr id="6" name="Straight Connector 5"/>
+            <p:cNvCxnSpPr/>
+            <p:nvPr/>
+          </p:nvCxnSpPr>
+          <p:spPr>
+            <a:xfrm>
+              <a:off x="3048000" y="4343400"/>
+              <a:ext cx="2286000" cy="0"/>
+            </a:xfrm>
+            <a:prstGeom prst="line">
+              <a:avLst/>
+            </a:prstGeom>
+            <a:ln w="28575">
+              <a:solidFill>
+                <a:schemeClr val="tx1"/>
+              </a:solidFill>
+            </a:ln>
+          </p:spPr>
+          <p:style>
+            <a:lnRef idx="1">
+              <a:schemeClr val="accent1"/>
+            </a:lnRef>
+            <a:fillRef idx="0">
+              <a:schemeClr val="accent1"/>
+            </a:fillRef>
+            <a:effectRef idx="0">
+              <a:schemeClr val="accent1"/>
+            </a:effectRef>
+            <a:fontRef idx="minor">
+              <a:schemeClr val="tx1"/>
+            </a:fontRef>
+          </p:style>
+        </p:cxnSp>
+        <p:sp>
+          <p:nvSpPr>
+            <p:cNvPr id="9" name="Rectangle 8"/>
+            <p:cNvSpPr/>
+            <p:nvPr/>
+          </p:nvSpPr>
+          <p:spPr>
+            <a:xfrm>
+              <a:off x="3581400" y="1066800"/>
+              <a:ext cx="1295400" cy="990600"/>
+            </a:xfrm>
+            <a:prstGeom prst="rect">
+              <a:avLst/>
+            </a:prstGeom>
+            <a:solidFill>
+              <a:schemeClr val="accent2"/>
+            </a:solidFill>
+            <a:ln>
+              <a:noFill/>
+            </a:ln>
+          </p:spPr>
+          <p:style>
+            <a:lnRef idx="2">
+              <a:schemeClr val="accent1">
+                <a:shade val="50000"/>
+              </a:schemeClr>
+            </a:lnRef>
+            <a:fillRef idx="1">
+              <a:schemeClr val="accent1"/>
+            </a:fillRef>
+            <a:effectRef idx="0">
+              <a:schemeClr val="accent1"/>
+            </a:effectRef>
+            <a:fontRef idx="minor">
+              <a:schemeClr val="lt1"/>
+            </a:fontRef>
+          </p:style>
+          <p:txBody>
+            <a:bodyPr rtlCol="0" anchor="ctr"/>
+            <a:lstStyle/>
+            <a:p>
+              <a:pPr algn="ctr"/>
+              <a:endParaRPr lang="en-US"/>
+            </a:p>
+          </p:txBody>
+        </p:sp>
+        <p:sp>
+          <p:nvSpPr>
+            <p:cNvPr id="10" name="Down Arrow 9"/>
+            <p:cNvSpPr/>
+            <p:nvPr/>
+          </p:nvSpPr>
+          <p:spPr>
+            <a:xfrm>
+              <a:off x="4038600" y="1828800"/>
+              <a:ext cx="381000" cy="1963616"/>
+            </a:xfrm>
+            <a:prstGeom prst="downArrow">
+              <a:avLst/>
+            </a:prstGeom>
+            <a:solidFill>
+              <a:schemeClr val="accent2"/>
+            </a:solidFill>
+            <a:ln>
+              <a:noFill/>
+            </a:ln>
+          </p:spPr>
+          <p:style>
+            <a:lnRef idx="2">
+              <a:schemeClr val="accent1">
+                <a:shade val="50000"/>
+              </a:schemeClr>
+            </a:lnRef>
+            <a:fillRef idx="1">
+              <a:schemeClr val="accent1"/>
+            </a:fillRef>
+            <a:effectRef idx="0">
+              <a:schemeClr val="accent1"/>
+            </a:effectRef>
+            <a:fontRef idx="minor">
+              <a:schemeClr val="lt1"/>
+            </a:fontRef>
+          </p:style>
+          <p:txBody>
+            <a:bodyPr rtlCol="0" anchor="ctr"/>
+            <a:lstStyle/>
+            <a:p>
+              <a:pPr algn="ctr"/>
+              <a:endParaRPr lang="en-US"/>
+            </a:p>
+          </p:txBody>
+        </p:sp>
+        <p:cxnSp>
+          <p:nvCxnSpPr>
+            <p:cNvPr id="11" name="Straight Connector 10"/>
+            <p:cNvCxnSpPr/>
+            <p:nvPr/>
+          </p:nvCxnSpPr>
+          <p:spPr>
+            <a:xfrm>
+              <a:off x="3048000" y="3200400"/>
+              <a:ext cx="2286000" cy="0"/>
+            </a:xfrm>
+            <a:prstGeom prst="line">
+              <a:avLst/>
+            </a:prstGeom>
+            <a:ln w="19050">
+              <a:solidFill>
+                <a:schemeClr val="tx1"/>
+              </a:solidFill>
+              <a:prstDash val="dash"/>
+            </a:ln>
+          </p:spPr>
+          <p:style>
+            <a:lnRef idx="1">
+              <a:schemeClr val="accent1"/>
+            </a:lnRef>
+            <a:fillRef idx="0">
+              <a:schemeClr val="accent1"/>
+            </a:fillRef>
+            <a:effectRef idx="0">
+              <a:schemeClr val="accent1"/>
+            </a:effectRef>
+            <a:fontRef idx="minor">
+              <a:schemeClr val="tx1"/>
+            </a:fontRef>
+          </p:style>
+        </p:cxnSp>
+        <p:cxnSp>
+          <p:nvCxnSpPr>
+            <p:cNvPr id="12" name="Straight Connector 11"/>
+            <p:cNvCxnSpPr/>
+            <p:nvPr/>
+          </p:nvCxnSpPr>
+          <p:spPr>
+            <a:xfrm>
+              <a:off x="3048000" y="3792416"/>
+              <a:ext cx="2286000" cy="0"/>
+            </a:xfrm>
+            <a:prstGeom prst="line">
+              <a:avLst/>
+            </a:prstGeom>
+            <a:ln w="19050">
+              <a:solidFill>
+                <a:schemeClr val="tx1"/>
+              </a:solidFill>
+              <a:prstDash val="dash"/>
+            </a:ln>
+          </p:spPr>
+          <p:style>
+            <a:lnRef idx="1">
+              <a:schemeClr val="accent1"/>
+            </a:lnRef>
+            <a:fillRef idx="0">
+              <a:schemeClr val="accent1"/>
+            </a:fillRef>
+            <a:effectRef idx="0">
+              <a:schemeClr val="accent1"/>
+            </a:effectRef>
+            <a:fontRef idx="minor">
+              <a:schemeClr val="tx1"/>
+            </a:fontRef>
+          </p:style>
+        </p:cxnSp>
+        <p:cxnSp>
+          <p:nvCxnSpPr>
+            <p:cNvPr id="13" name="Straight Connector 12"/>
+            <p:cNvCxnSpPr/>
+            <p:nvPr/>
+          </p:nvCxnSpPr>
+          <p:spPr>
+            <a:xfrm>
+              <a:off x="3048000" y="2667000"/>
+              <a:ext cx="2286000" cy="0"/>
+            </a:xfrm>
+            <a:prstGeom prst="line">
+              <a:avLst/>
+            </a:prstGeom>
+            <a:ln w="19050">
+              <a:solidFill>
+                <a:schemeClr val="tx1"/>
+              </a:solidFill>
+              <a:prstDash val="dash"/>
+            </a:ln>
+          </p:spPr>
+          <p:style>
+            <a:lnRef idx="1">
+              <a:schemeClr val="accent1"/>
+            </a:lnRef>
+            <a:fillRef idx="0">
+              <a:schemeClr val="accent1"/>
+            </a:fillRef>
+            <a:effectRef idx="0">
+              <a:schemeClr val="accent1"/>
+            </a:effectRef>
+            <a:fontRef idx="minor">
+              <a:schemeClr val="tx1"/>
+            </a:fontRef>
+          </p:style>
+        </p:cxnSp>
+        <p:sp>
+          <p:nvSpPr>
+            <p:cNvPr id="14" name="TextBox 13"/>
+            <p:cNvSpPr txBox="1"/>
+            <p:nvPr/>
+          </p:nvSpPr>
+          <p:spPr>
+            <a:xfrm>
+              <a:off x="4397869" y="3311742"/>
+              <a:ext cx="963725" cy="369332"/>
+            </a:xfrm>
+            <a:prstGeom prst="rect">
+              <a:avLst/>
+            </a:prstGeom>
+            <a:noFill/>
+          </p:spPr>
+          <p:txBody>
+            <a:bodyPr wrap="none" rtlCol="0">
+              <a:spAutoFit/>
+            </a:bodyPr>
+            <a:lstStyle/>
+            <a:p>
+              <a:r>
+                <a:rPr lang="en-US" dirty="0"/>
+                <a:t>75% Ins.</a:t>
+              </a:r>
+            </a:p>
+          </p:txBody>
+        </p:sp>
+      </p:grpSp>
+    </p:spTree>
+    <p:extLst>
+      <p:ext uri="{BB962C8B-B14F-4D97-AF65-F5344CB8AC3E}">
+        <p14:creationId xmlns:p14="http://schemas.microsoft.com/office/powerpoint/2010/main" val="2970425804"/>
       </p:ext>
     </p:extLst>
   </p:cSld>

</xml_diff>